<commit_message>
Another chart, adjusting space
</commit_message>
<xml_diff>
--- a/Presentations/Open Repositories 2016/Statistics/SweeneySarahORstatistics33x46.pptx
+++ b/Presentations/Open Repositories 2016/Statistics/SweeneySarahORstatistics33x46.pptx
@@ -4,6 +4,9 @@
   <p:sldMasterIdLst>
     <p:sldMasterId id="2147483660" r:id="rId1"/>
   </p:sldMasterIdLst>
+  <p:notesMasterIdLst>
+    <p:notesMasterId r:id="rId4"/>
+  </p:notesMasterIdLst>
   <p:sldIdLst>
     <p:sldId id="256" r:id="rId2"/>
     <p:sldId id="257" r:id="rId3"/>
@@ -624,250 +627,6 @@
   </mc:AlternateContent>
   <c:chart>
     <c:title>
-      <c:layout/>
-      <c:overlay val="0"/>
-      <c:spPr>
-        <a:noFill/>
-        <a:ln>
-          <a:noFill/>
-        </a:ln>
-        <a:effectLst/>
-      </c:spPr>
-      <c:txPr>
-        <a:bodyPr rot="0" spcFirstLastPara="1" vertOverflow="ellipsis" vert="horz" wrap="square" anchor="ctr" anchorCtr="1"/>
-        <a:lstStyle/>
-        <a:p>
-          <a:pPr>
-            <a:defRPr sz="1862" b="0" i="0" u="none" strike="noStrike" kern="1200" spc="0" baseline="0">
-              <a:solidFill>
-                <a:schemeClr val="tx1">
-                  <a:lumMod val="65000"/>
-                  <a:lumOff val="35000"/>
-                </a:schemeClr>
-              </a:solidFill>
-              <a:latin typeface="+mn-lt"/>
-              <a:ea typeface="+mn-ea"/>
-              <a:cs typeface="+mn-cs"/>
-            </a:defRPr>
-          </a:pPr>
-          <a:endParaRPr lang="en-US"/>
-        </a:p>
-      </c:txPr>
-    </c:title>
-    <c:autoTitleDeleted val="0"/>
-    <c:plotArea>
-      <c:layout/>
-      <c:pieChart>
-        <c:varyColors val="1"/>
-        <c:ser>
-          <c:idx val="0"/>
-          <c:order val="0"/>
-          <c:tx>
-            <c:strRef>
-              <c:f>Sheet1!$B$1</c:f>
-              <c:strCache>
-                <c:ptCount val="1"/>
-                <c:pt idx="0">
-                  <c:v>Sales</c:v>
-                </c:pt>
-              </c:strCache>
-            </c:strRef>
-          </c:tx>
-          <c:dPt>
-            <c:idx val="0"/>
-            <c:bubble3D val="0"/>
-            <c:spPr>
-              <a:solidFill>
-                <a:schemeClr val="accent1"/>
-              </a:solidFill>
-              <a:ln w="19050">
-                <a:solidFill>
-                  <a:schemeClr val="lt1"/>
-                </a:solidFill>
-              </a:ln>
-              <a:effectLst/>
-            </c:spPr>
-          </c:dPt>
-          <c:dPt>
-            <c:idx val="1"/>
-            <c:bubble3D val="0"/>
-            <c:spPr>
-              <a:solidFill>
-                <a:schemeClr val="accent2"/>
-              </a:solidFill>
-              <a:ln w="19050">
-                <a:solidFill>
-                  <a:schemeClr val="lt1"/>
-                </a:solidFill>
-              </a:ln>
-              <a:effectLst/>
-            </c:spPr>
-          </c:dPt>
-          <c:dPt>
-            <c:idx val="2"/>
-            <c:bubble3D val="0"/>
-            <c:spPr>
-              <a:solidFill>
-                <a:schemeClr val="accent3"/>
-              </a:solidFill>
-              <a:ln w="19050">
-                <a:solidFill>
-                  <a:schemeClr val="lt1"/>
-                </a:solidFill>
-              </a:ln>
-              <a:effectLst/>
-            </c:spPr>
-          </c:dPt>
-          <c:dPt>
-            <c:idx val="3"/>
-            <c:bubble3D val="0"/>
-            <c:spPr>
-              <a:solidFill>
-                <a:schemeClr val="accent4"/>
-              </a:solidFill>
-              <a:ln w="19050">
-                <a:solidFill>
-                  <a:schemeClr val="lt1"/>
-                </a:solidFill>
-              </a:ln>
-              <a:effectLst/>
-            </c:spPr>
-          </c:dPt>
-          <c:cat>
-            <c:strRef>
-              <c:f>Sheet1!$A$2:$A$5</c:f>
-              <c:strCache>
-                <c:ptCount val="4"/>
-                <c:pt idx="0">
-                  <c:v>1st Qtr</c:v>
-                </c:pt>
-                <c:pt idx="1">
-                  <c:v>2nd Qtr</c:v>
-                </c:pt>
-                <c:pt idx="2">
-                  <c:v>3rd Qtr</c:v>
-                </c:pt>
-                <c:pt idx="3">
-                  <c:v>4th Qtr</c:v>
-                </c:pt>
-              </c:strCache>
-            </c:strRef>
-          </c:cat>
-          <c:val>
-            <c:numRef>
-              <c:f>Sheet1!$B$2:$B$5</c:f>
-              <c:numCache>
-                <c:formatCode>General</c:formatCode>
-                <c:ptCount val="4"/>
-                <c:pt idx="0">
-                  <c:v>8.2</c:v>
-                </c:pt>
-                <c:pt idx="1">
-                  <c:v>3.2</c:v>
-                </c:pt>
-                <c:pt idx="2">
-                  <c:v>1.4</c:v>
-                </c:pt>
-                <c:pt idx="3">
-                  <c:v>1.2</c:v>
-                </c:pt>
-              </c:numCache>
-            </c:numRef>
-          </c:val>
-        </c:ser>
-        <c:dLbls>
-          <c:showLegendKey val="0"/>
-          <c:showVal val="0"/>
-          <c:showCatName val="0"/>
-          <c:showSerName val="0"/>
-          <c:showPercent val="0"/>
-          <c:showBubbleSize val="0"/>
-          <c:showLeaderLines val="1"/>
-        </c:dLbls>
-        <c:firstSliceAng val="0"/>
-      </c:pieChart>
-      <c:spPr>
-        <a:noFill/>
-        <a:ln>
-          <a:noFill/>
-        </a:ln>
-        <a:effectLst/>
-      </c:spPr>
-    </c:plotArea>
-    <c:legend>
-      <c:legendPos val="b"/>
-      <c:layout/>
-      <c:overlay val="0"/>
-      <c:spPr>
-        <a:noFill/>
-        <a:ln>
-          <a:noFill/>
-        </a:ln>
-        <a:effectLst/>
-      </c:spPr>
-      <c:txPr>
-        <a:bodyPr rot="0" spcFirstLastPara="1" vertOverflow="ellipsis" vert="horz" wrap="square" anchor="ctr" anchorCtr="1"/>
-        <a:lstStyle/>
-        <a:p>
-          <a:pPr>
-            <a:defRPr sz="1197" b="0" i="0" u="none" strike="noStrike" kern="1200" baseline="0">
-              <a:solidFill>
-                <a:schemeClr val="tx1">
-                  <a:lumMod val="65000"/>
-                  <a:lumOff val="35000"/>
-                </a:schemeClr>
-              </a:solidFill>
-              <a:latin typeface="+mn-lt"/>
-              <a:ea typeface="+mn-ea"/>
-              <a:cs typeface="+mn-cs"/>
-            </a:defRPr>
-          </a:pPr>
-          <a:endParaRPr lang="en-US"/>
-        </a:p>
-      </c:txPr>
-    </c:legend>
-    <c:plotVisOnly val="1"/>
-    <c:dispBlanksAs val="gap"/>
-    <c:showDLblsOverMax val="0"/>
-  </c:chart>
-  <c:spPr>
-    <a:noFill/>
-    <a:ln>
-      <a:noFill/>
-    </a:ln>
-    <a:effectLst/>
-  </c:spPr>
-  <c:txPr>
-    <a:bodyPr/>
-    <a:lstStyle/>
-    <a:p>
-      <a:pPr>
-        <a:defRPr/>
-      </a:pPr>
-      <a:endParaRPr lang="en-US"/>
-    </a:p>
-  </c:txPr>
-  <c:externalData r:id="rId3">
-    <c:autoUpdate val="0"/>
-  </c:externalData>
-</c:chartSpace>
-</file>
-
-<file path=ppt/charts/chart4.xml><?xml version="1.0" encoding="utf-8"?>
-<c:chartSpace xmlns:c="http://schemas.openxmlformats.org/drawingml/2006/chart" xmlns:a="http://schemas.openxmlformats.org/drawingml/2006/main" xmlns:r="http://schemas.openxmlformats.org/officeDocument/2006/relationships">
-  <c:date1904 val="0"/>
-  <c:lang val="en-US"/>
-  <c:roundedCorners val="0"/>
-  <mc:AlternateContent xmlns:mc="http://schemas.openxmlformats.org/markup-compatibility/2006">
-    <mc:Choice xmlns:c14="http://schemas.microsoft.com/office/drawing/2007/8/2/chart" Requires="c14">
-      <c14:style val="102"/>
-    </mc:Choice>
-    <mc:Fallback>
-      <c:style val="2"/>
-    </mc:Fallback>
-  </mc:AlternateContent>
-  <c:chart>
-    <c:title>
       <c:tx>
         <c:rich>
           <a:bodyPr rot="0" spcFirstLastPara="1" vertOverflow="ellipsis" vert="horz" wrap="square" anchor="ctr" anchorCtr="1"/>
@@ -1094,7 +853,7 @@
 </c:chartSpace>
 </file>
 
-<file path=ppt/charts/chart5.xml><?xml version="1.0" encoding="utf-8"?>
+<file path=ppt/charts/chart4.xml><?xml version="1.0" encoding="utf-8"?>
 <c:chartSpace xmlns:c="http://schemas.openxmlformats.org/drawingml/2006/chart" xmlns:a="http://schemas.openxmlformats.org/drawingml/2006/main" xmlns:r="http://schemas.openxmlformats.org/officeDocument/2006/relationships">
   <c:date1904 val="0"/>
   <c:lang val="en-US"/>
@@ -1327,7 +1086,7 @@
 </c:chartSpace>
 </file>
 
-<file path=ppt/charts/chart6.xml><?xml version="1.0" encoding="utf-8"?>
+<file path=ppt/charts/chart5.xml><?xml version="1.0" encoding="utf-8"?>
 <c:chartSpace xmlns:c="http://schemas.openxmlformats.org/drawingml/2006/chart" xmlns:a="http://schemas.openxmlformats.org/drawingml/2006/main" xmlns:r="http://schemas.openxmlformats.org/officeDocument/2006/relationships">
   <c:date1904 val="0"/>
   <c:lang val="en-US"/>
@@ -1703,46 +1462,6 @@
 </file>
 
 <file path=ppt/charts/colors5.xml><?xml version="1.0" encoding="utf-8"?>
-<cs:colorStyle xmlns:cs="http://schemas.microsoft.com/office/drawing/2012/chartStyle" xmlns:a="http://schemas.openxmlformats.org/drawingml/2006/main" meth="cycle" id="10">
-  <a:schemeClr val="accent1"/>
-  <a:schemeClr val="accent2"/>
-  <a:schemeClr val="accent3"/>
-  <a:schemeClr val="accent4"/>
-  <a:schemeClr val="accent5"/>
-  <a:schemeClr val="accent6"/>
-  <cs:variation/>
-  <cs:variation>
-    <a:lumMod val="60000"/>
-  </cs:variation>
-  <cs:variation>
-    <a:lumMod val="80000"/>
-    <a:lumOff val="20000"/>
-  </cs:variation>
-  <cs:variation>
-    <a:lumMod val="80000"/>
-  </cs:variation>
-  <cs:variation>
-    <a:lumMod val="60000"/>
-    <a:lumOff val="40000"/>
-  </cs:variation>
-  <cs:variation>
-    <a:lumMod val="50000"/>
-  </cs:variation>
-  <cs:variation>
-    <a:lumMod val="70000"/>
-    <a:lumOff val="30000"/>
-  </cs:variation>
-  <cs:variation>
-    <a:lumMod val="70000"/>
-  </cs:variation>
-  <cs:variation>
-    <a:lumMod val="50000"/>
-    <a:lumOff val="50000"/>
-  </cs:variation>
-</cs:colorStyle>
-</file>
-
-<file path=ppt/charts/colors6.xml><?xml version="1.0" encoding="utf-8"?>
 <cs:colorStyle xmlns:cs="http://schemas.microsoft.com/office/drawing/2012/chartStyle" xmlns:a="http://schemas.openxmlformats.org/drawingml/2006/main" meth="cycle" id="12">
   <a:schemeClr val="accent2"/>
   <a:schemeClr val="accent4"/>
@@ -4374,523 +4093,438 @@
 </cs:chartStyle>
 </file>
 
-<file path=ppt/charts/style6.xml><?xml version="1.0" encoding="utf-8"?>
-<cs:chartStyle xmlns:cs="http://schemas.microsoft.com/office/drawing/2012/chartStyle" xmlns:a="http://schemas.openxmlformats.org/drawingml/2006/main" id="251">
-  <cs:axisTitle>
-    <cs:lnRef idx="0"/>
-    <cs:fillRef idx="0"/>
-    <cs:effectRef idx="0"/>
-    <cs:fontRef idx="minor">
-      <a:schemeClr val="tx1">
-        <a:lumMod val="65000"/>
-        <a:lumOff val="35000"/>
-      </a:schemeClr>
-    </cs:fontRef>
-    <cs:defRPr sz="1330" kern="1200"/>
-  </cs:axisTitle>
-  <cs:categoryAxis>
-    <cs:lnRef idx="0"/>
-    <cs:fillRef idx="0"/>
-    <cs:effectRef idx="0"/>
-    <cs:fontRef idx="minor">
-      <a:schemeClr val="tx1">
-        <a:lumMod val="65000"/>
-        <a:lumOff val="35000"/>
-      </a:schemeClr>
-    </cs:fontRef>
-    <cs:spPr>
-      <a:ln w="9525" cap="flat" cmpd="sng" algn="ctr">
+<file path=ppt/notesMasters/notesMaster1.xml><?xml version="1.0" encoding="utf-8"?>
+<p:notesMaster xmlns:a="http://schemas.openxmlformats.org/drawingml/2006/main" xmlns:r="http://schemas.openxmlformats.org/officeDocument/2006/relationships" xmlns:p="http://schemas.openxmlformats.org/presentationml/2006/main">
+  <p:cSld>
+    <p:bg>
+      <p:bgRef idx="1001">
+        <a:schemeClr val="bg1"/>
+      </p:bgRef>
+    </p:bg>
+    <p:spTree>
+      <p:nvGrpSpPr>
+        <p:cNvPr id="1" name=""/>
+        <p:cNvGrpSpPr/>
+        <p:nvPr/>
+      </p:nvGrpSpPr>
+      <p:grpSpPr>
+        <a:xfrm>
+          <a:off x="0" y="0"/>
+          <a:ext cx="0" cy="0"/>
+          <a:chOff x="0" y="0"/>
+          <a:chExt cx="0" cy="0"/>
+        </a:xfrm>
+      </p:grpSpPr>
+      <p:sp>
+        <p:nvSpPr>
+          <p:cNvPr id="2" name="Header Placeholder 1"/>
+          <p:cNvSpPr>
+            <a:spLocks noGrp="1"/>
+          </p:cNvSpPr>
+          <p:nvPr>
+            <p:ph type="hdr" sz="quarter"/>
+          </p:nvPr>
+        </p:nvSpPr>
+        <p:spPr>
+          <a:xfrm>
+            <a:off x="0" y="0"/>
+            <a:ext cx="2971800" cy="458788"/>
+          </a:xfrm>
+          <a:prstGeom prst="rect">
+            <a:avLst/>
+          </a:prstGeom>
+        </p:spPr>
+        <p:txBody>
+          <a:bodyPr vert="horz" lIns="91440" tIns="45720" rIns="91440" bIns="45720" rtlCol="0"/>
+          <a:lstStyle>
+            <a:lvl1pPr algn="l">
+              <a:defRPr sz="1200"/>
+            </a:lvl1pPr>
+          </a:lstStyle>
+          <a:p>
+            <a:endParaRPr lang="en-US"/>
+          </a:p>
+        </p:txBody>
+      </p:sp>
+      <p:sp>
+        <p:nvSpPr>
+          <p:cNvPr id="3" name="Date Placeholder 2"/>
+          <p:cNvSpPr>
+            <a:spLocks noGrp="1"/>
+          </p:cNvSpPr>
+          <p:nvPr>
+            <p:ph type="dt" idx="1"/>
+          </p:nvPr>
+        </p:nvSpPr>
+        <p:spPr>
+          <a:xfrm>
+            <a:off x="3884613" y="0"/>
+            <a:ext cx="2971800" cy="458788"/>
+          </a:xfrm>
+          <a:prstGeom prst="rect">
+            <a:avLst/>
+          </a:prstGeom>
+        </p:spPr>
+        <p:txBody>
+          <a:bodyPr vert="horz" lIns="91440" tIns="45720" rIns="91440" bIns="45720" rtlCol="0"/>
+          <a:lstStyle>
+            <a:lvl1pPr algn="r">
+              <a:defRPr sz="1200"/>
+            </a:lvl1pPr>
+          </a:lstStyle>
+          <a:p>
+            <a:fld id="{7F7A6B22-0AC0-E647-B4AB-610E8EE21CF0}" type="datetimeFigureOut">
+              <a:rPr lang="en-US" smtClean="0"/>
+              <a:t>5/22/16</a:t>
+            </a:fld>
+            <a:endParaRPr lang="en-US"/>
+          </a:p>
+        </p:txBody>
+      </p:sp>
+      <p:sp>
+        <p:nvSpPr>
+          <p:cNvPr id="4" name="Slide Image Placeholder 3"/>
+          <p:cNvSpPr>
+            <a:spLocks noGrp="1" noRot="1" noChangeAspect="1"/>
+          </p:cNvSpPr>
+          <p:nvPr>
+            <p:ph type="sldImg" idx="2"/>
+          </p:nvPr>
+        </p:nvSpPr>
+        <p:spPr>
+          <a:xfrm>
+            <a:off x="2338388" y="1143000"/>
+            <a:ext cx="2181225" cy="3086100"/>
+          </a:xfrm>
+          <a:prstGeom prst="rect">
+            <a:avLst/>
+          </a:prstGeom>
+          <a:noFill/>
+          <a:ln w="12700">
+            <a:solidFill>
+              <a:prstClr val="black"/>
+            </a:solidFill>
+          </a:ln>
+        </p:spPr>
+        <p:txBody>
+          <a:bodyPr vert="horz" lIns="91440" tIns="45720" rIns="91440" bIns="45720" rtlCol="0" anchor="ctr"/>
+          <a:lstStyle/>
+          <a:p>
+            <a:endParaRPr lang="en-US"/>
+          </a:p>
+        </p:txBody>
+      </p:sp>
+      <p:sp>
+        <p:nvSpPr>
+          <p:cNvPr id="5" name="Notes Placeholder 4"/>
+          <p:cNvSpPr>
+            <a:spLocks noGrp="1"/>
+          </p:cNvSpPr>
+          <p:nvPr>
+            <p:ph type="body" sz="quarter" idx="3"/>
+          </p:nvPr>
+        </p:nvSpPr>
+        <p:spPr>
+          <a:xfrm>
+            <a:off x="685800" y="4400550"/>
+            <a:ext cx="5486400" cy="3600450"/>
+          </a:xfrm>
+          <a:prstGeom prst="rect">
+            <a:avLst/>
+          </a:prstGeom>
+        </p:spPr>
+        <p:txBody>
+          <a:bodyPr vert="horz" lIns="91440" tIns="45720" rIns="91440" bIns="45720" rtlCol="0"/>
+          <a:lstStyle/>
+          <a:p>
+            <a:pPr lvl="0"/>
+            <a:r>
+              <a:rPr lang="en-US" smtClean="0"/>
+              <a:t>Click to edit Master text styles</a:t>
+            </a:r>
+          </a:p>
+          <a:p>
+            <a:pPr lvl="1"/>
+            <a:r>
+              <a:rPr lang="en-US" smtClean="0"/>
+              <a:t>Second level</a:t>
+            </a:r>
+          </a:p>
+          <a:p>
+            <a:pPr lvl="2"/>
+            <a:r>
+              <a:rPr lang="en-US" smtClean="0"/>
+              <a:t>Third level</a:t>
+            </a:r>
+          </a:p>
+          <a:p>
+            <a:pPr lvl="3"/>
+            <a:r>
+              <a:rPr lang="en-US" smtClean="0"/>
+              <a:t>Fourth level</a:t>
+            </a:r>
+          </a:p>
+          <a:p>
+            <a:pPr lvl="4"/>
+            <a:r>
+              <a:rPr lang="en-US" smtClean="0"/>
+              <a:t>Fifth level</a:t>
+            </a:r>
+            <a:endParaRPr lang="en-US"/>
+          </a:p>
+        </p:txBody>
+      </p:sp>
+      <p:sp>
+        <p:nvSpPr>
+          <p:cNvPr id="6" name="Footer Placeholder 5"/>
+          <p:cNvSpPr>
+            <a:spLocks noGrp="1"/>
+          </p:cNvSpPr>
+          <p:nvPr>
+            <p:ph type="ftr" sz="quarter" idx="4"/>
+          </p:nvPr>
+        </p:nvSpPr>
+        <p:spPr>
+          <a:xfrm>
+            <a:off x="0" y="8685213"/>
+            <a:ext cx="2971800" cy="458787"/>
+          </a:xfrm>
+          <a:prstGeom prst="rect">
+            <a:avLst/>
+          </a:prstGeom>
+        </p:spPr>
+        <p:txBody>
+          <a:bodyPr vert="horz" lIns="91440" tIns="45720" rIns="91440" bIns="45720" rtlCol="0" anchor="b"/>
+          <a:lstStyle>
+            <a:lvl1pPr algn="l">
+              <a:defRPr sz="1200"/>
+            </a:lvl1pPr>
+          </a:lstStyle>
+          <a:p>
+            <a:endParaRPr lang="en-US"/>
+          </a:p>
+        </p:txBody>
+      </p:sp>
+      <p:sp>
+        <p:nvSpPr>
+          <p:cNvPr id="7" name="Slide Number Placeholder 6"/>
+          <p:cNvSpPr>
+            <a:spLocks noGrp="1"/>
+          </p:cNvSpPr>
+          <p:nvPr>
+            <p:ph type="sldNum" sz="quarter" idx="5"/>
+          </p:nvPr>
+        </p:nvSpPr>
+        <p:spPr>
+          <a:xfrm>
+            <a:off x="3884613" y="8685213"/>
+            <a:ext cx="2971800" cy="458787"/>
+          </a:xfrm>
+          <a:prstGeom prst="rect">
+            <a:avLst/>
+          </a:prstGeom>
+        </p:spPr>
+        <p:txBody>
+          <a:bodyPr vert="horz" lIns="91440" tIns="45720" rIns="91440" bIns="45720" rtlCol="0" anchor="b"/>
+          <a:lstStyle>
+            <a:lvl1pPr algn="r">
+              <a:defRPr sz="1200"/>
+            </a:lvl1pPr>
+          </a:lstStyle>
+          <a:p>
+            <a:fld id="{6A022B30-946F-2349-960C-96E93C564FDA}" type="slidenum">
+              <a:rPr lang="en-US" smtClean="0"/>
+              <a:t>‹#›</a:t>
+            </a:fld>
+            <a:endParaRPr lang="en-US"/>
+          </a:p>
+        </p:txBody>
+      </p:sp>
+    </p:spTree>
+    <p:extLst>
+      <p:ext uri="{BB962C8B-B14F-4D97-AF65-F5344CB8AC3E}">
+        <p14:creationId xmlns:p14="http://schemas.microsoft.com/office/powerpoint/2010/main" val="741070283"/>
+      </p:ext>
+    </p:extLst>
+  </p:cSld>
+  <p:clrMap bg1="lt1" tx1="dk1" bg2="lt2" tx2="dk2" accent1="accent1" accent2="accent2" accent3="accent3" accent4="accent4" accent5="accent5" accent6="accent6" hlink="hlink" folHlink="folHlink"/>
+  <p:notesStyle>
+    <a:lvl1pPr marL="0" algn="l" defTabSz="914400" rtl="0" eaLnBrk="1" latinLnBrk="0" hangingPunct="1">
+      <a:defRPr sz="1200" kern="1200">
         <a:solidFill>
-          <a:schemeClr val="tx1">
-            <a:lumMod val="15000"/>
-            <a:lumOff val="85000"/>
-          </a:schemeClr>
+          <a:schemeClr val="tx1"/>
         </a:solidFill>
-        <a:round/>
-      </a:ln>
-    </cs:spPr>
-    <cs:defRPr sz="1197" kern="1200"/>
-  </cs:categoryAxis>
-  <cs:chartArea mods="allowNoFillOverride allowNoLineOverride">
-    <cs:lnRef idx="0"/>
-    <cs:fillRef idx="0"/>
-    <cs:effectRef idx="0"/>
-    <cs:fontRef idx="minor">
-      <a:schemeClr val="tx1"/>
-    </cs:fontRef>
-    <cs:spPr>
-      <a:solidFill>
-        <a:schemeClr val="bg1"/>
-      </a:solidFill>
-      <a:ln w="9525" cap="flat" cmpd="sng" algn="ctr">
+        <a:latin typeface="+mn-lt"/>
+        <a:ea typeface="+mn-ea"/>
+        <a:cs typeface="+mn-cs"/>
+      </a:defRPr>
+    </a:lvl1pPr>
+    <a:lvl2pPr marL="457200" algn="l" defTabSz="914400" rtl="0" eaLnBrk="1" latinLnBrk="0" hangingPunct="1">
+      <a:defRPr sz="1200" kern="1200">
         <a:solidFill>
-          <a:schemeClr val="tx1">
-            <a:lumMod val="15000"/>
-            <a:lumOff val="85000"/>
-          </a:schemeClr>
+          <a:schemeClr val="tx1"/>
         </a:solidFill>
-        <a:round/>
-      </a:ln>
-    </cs:spPr>
-    <cs:defRPr sz="1197" kern="1200"/>
-  </cs:chartArea>
-  <cs:dataLabel>
-    <cs:lnRef idx="0"/>
-    <cs:fillRef idx="0"/>
-    <cs:effectRef idx="0"/>
-    <cs:fontRef idx="minor">
-      <a:schemeClr val="tx1">
-        <a:lumMod val="75000"/>
-        <a:lumOff val="25000"/>
-      </a:schemeClr>
-    </cs:fontRef>
-    <cs:defRPr sz="1197" kern="1200"/>
-  </cs:dataLabel>
-  <cs:dataLabelCallout>
-    <cs:lnRef idx="0"/>
-    <cs:fillRef idx="0"/>
-    <cs:effectRef idx="0"/>
-    <cs:fontRef idx="minor">
-      <a:schemeClr val="dk1">
-        <a:lumMod val="65000"/>
-        <a:lumOff val="35000"/>
-      </a:schemeClr>
-    </cs:fontRef>
-    <cs:spPr>
-      <a:solidFill>
-        <a:schemeClr val="lt1"/>
-      </a:solidFill>
-      <a:ln>
+        <a:latin typeface="+mn-lt"/>
+        <a:ea typeface="+mn-ea"/>
+        <a:cs typeface="+mn-cs"/>
+      </a:defRPr>
+    </a:lvl2pPr>
+    <a:lvl3pPr marL="914400" algn="l" defTabSz="914400" rtl="0" eaLnBrk="1" latinLnBrk="0" hangingPunct="1">
+      <a:defRPr sz="1200" kern="1200">
         <a:solidFill>
-          <a:schemeClr val="dk1">
-            <a:lumMod val="25000"/>
-            <a:lumOff val="75000"/>
-          </a:schemeClr>
+          <a:schemeClr val="tx1"/>
         </a:solidFill>
-      </a:ln>
-    </cs:spPr>
-    <cs:defRPr sz="1197" kern="1200"/>
-    <cs:bodyPr rot="0" spcFirstLastPara="1" vertOverflow="clip" horzOverflow="clip" vert="horz" wrap="square" lIns="36576" tIns="18288" rIns="36576" bIns="18288" anchor="ctr" anchorCtr="1">
-      <a:spAutoFit/>
-    </cs:bodyPr>
-  </cs:dataLabelCallout>
-  <cs:dataPoint>
-    <cs:lnRef idx="0"/>
-    <cs:fillRef idx="1">
-      <cs:styleClr val="auto"/>
-    </cs:fillRef>
-    <cs:effectRef idx="0"/>
-    <cs:fontRef idx="minor">
-      <a:schemeClr val="tx1"/>
-    </cs:fontRef>
-    <cs:spPr>
-      <a:ln w="19050">
+        <a:latin typeface="+mn-lt"/>
+        <a:ea typeface="+mn-ea"/>
+        <a:cs typeface="+mn-cs"/>
+      </a:defRPr>
+    </a:lvl3pPr>
+    <a:lvl4pPr marL="1371600" algn="l" defTabSz="914400" rtl="0" eaLnBrk="1" latinLnBrk="0" hangingPunct="1">
+      <a:defRPr sz="1200" kern="1200">
         <a:solidFill>
-          <a:schemeClr val="lt1"/>
+          <a:schemeClr val="tx1"/>
         </a:solidFill>
-      </a:ln>
-    </cs:spPr>
-  </cs:dataPoint>
-  <cs:dataPoint3D>
-    <cs:lnRef idx="0"/>
-    <cs:fillRef idx="1">
-      <cs:styleClr val="auto"/>
-    </cs:fillRef>
-    <cs:effectRef idx="0"/>
-    <cs:fontRef idx="minor">
-      <a:schemeClr val="tx1"/>
-    </cs:fontRef>
-    <cs:spPr>
-      <a:ln w="25400">
+        <a:latin typeface="+mn-lt"/>
+        <a:ea typeface="+mn-ea"/>
+        <a:cs typeface="+mn-cs"/>
+      </a:defRPr>
+    </a:lvl4pPr>
+    <a:lvl5pPr marL="1828800" algn="l" defTabSz="914400" rtl="0" eaLnBrk="1" latinLnBrk="0" hangingPunct="1">
+      <a:defRPr sz="1200" kern="1200">
         <a:solidFill>
-          <a:schemeClr val="lt1"/>
+          <a:schemeClr val="tx1"/>
         </a:solidFill>
-      </a:ln>
-    </cs:spPr>
-  </cs:dataPoint3D>
-  <cs:dataPointLine>
-    <cs:lnRef idx="0">
-      <cs:styleClr val="auto"/>
-    </cs:lnRef>
-    <cs:fillRef idx="0"/>
-    <cs:effectRef idx="0"/>
-    <cs:fontRef idx="minor">
-      <a:schemeClr val="tx1"/>
-    </cs:fontRef>
-    <cs:spPr>
-      <a:ln w="28575" cap="rnd">
+        <a:latin typeface="+mn-lt"/>
+        <a:ea typeface="+mn-ea"/>
+        <a:cs typeface="+mn-cs"/>
+      </a:defRPr>
+    </a:lvl5pPr>
+    <a:lvl6pPr marL="2286000" algn="l" defTabSz="914400" rtl="0" eaLnBrk="1" latinLnBrk="0" hangingPunct="1">
+      <a:defRPr sz="1200" kern="1200">
         <a:solidFill>
-          <a:schemeClr val="phClr"/>
+          <a:schemeClr val="tx1"/>
         </a:solidFill>
-        <a:round/>
-      </a:ln>
-    </cs:spPr>
-  </cs:dataPointLine>
-  <cs:dataPointMarker>
-    <cs:lnRef idx="0">
-      <cs:styleClr val="auto"/>
-    </cs:lnRef>
-    <cs:fillRef idx="1">
-      <cs:styleClr val="auto"/>
-    </cs:fillRef>
-    <cs:effectRef idx="0"/>
-    <cs:fontRef idx="minor">
-      <a:schemeClr val="tx1"/>
-    </cs:fontRef>
-    <cs:spPr>
-      <a:ln w="9525">
+        <a:latin typeface="+mn-lt"/>
+        <a:ea typeface="+mn-ea"/>
+        <a:cs typeface="+mn-cs"/>
+      </a:defRPr>
+    </a:lvl6pPr>
+    <a:lvl7pPr marL="2743200" algn="l" defTabSz="914400" rtl="0" eaLnBrk="1" latinLnBrk="0" hangingPunct="1">
+      <a:defRPr sz="1200" kern="1200">
         <a:solidFill>
-          <a:schemeClr val="phClr"/>
+          <a:schemeClr val="tx1"/>
         </a:solidFill>
-      </a:ln>
-    </cs:spPr>
-  </cs:dataPointMarker>
-  <cs:dataPointMarkerLayout symbol="circle" size="5"/>
-  <cs:dataPointWireframe>
-    <cs:lnRef idx="0">
-      <cs:styleClr val="auto"/>
-    </cs:lnRef>
-    <cs:fillRef idx="0"/>
-    <cs:effectRef idx="0"/>
-    <cs:fontRef idx="minor">
-      <a:schemeClr val="tx1"/>
-    </cs:fontRef>
-    <cs:spPr>
-      <a:ln w="9525" cap="rnd">
+        <a:latin typeface="+mn-lt"/>
+        <a:ea typeface="+mn-ea"/>
+        <a:cs typeface="+mn-cs"/>
+      </a:defRPr>
+    </a:lvl7pPr>
+    <a:lvl8pPr marL="3200400" algn="l" defTabSz="914400" rtl="0" eaLnBrk="1" latinLnBrk="0" hangingPunct="1">
+      <a:defRPr sz="1200" kern="1200">
         <a:solidFill>
-          <a:schemeClr val="phClr"/>
+          <a:schemeClr val="tx1"/>
         </a:solidFill>
-        <a:round/>
-      </a:ln>
-    </cs:spPr>
-  </cs:dataPointWireframe>
-  <cs:dataTable>
-    <cs:lnRef idx="0"/>
-    <cs:fillRef idx="0"/>
-    <cs:effectRef idx="0"/>
-    <cs:fontRef idx="minor">
-      <a:schemeClr val="tx1">
-        <a:lumMod val="65000"/>
-        <a:lumOff val="35000"/>
-      </a:schemeClr>
-    </cs:fontRef>
-    <cs:spPr>
-      <a:noFill/>
-      <a:ln w="9525" cap="flat" cmpd="sng" algn="ctr">
+        <a:latin typeface="+mn-lt"/>
+        <a:ea typeface="+mn-ea"/>
+        <a:cs typeface="+mn-cs"/>
+      </a:defRPr>
+    </a:lvl8pPr>
+    <a:lvl9pPr marL="3657600" algn="l" defTabSz="914400" rtl="0" eaLnBrk="1" latinLnBrk="0" hangingPunct="1">
+      <a:defRPr sz="1200" kern="1200">
         <a:solidFill>
-          <a:schemeClr val="tx1">
-            <a:lumMod val="15000"/>
-            <a:lumOff val="85000"/>
-          </a:schemeClr>
+          <a:schemeClr val="tx1"/>
         </a:solidFill>
-        <a:round/>
-      </a:ln>
-    </cs:spPr>
-    <cs:defRPr sz="1197" kern="1200"/>
-  </cs:dataTable>
-  <cs:downBar>
-    <cs:lnRef idx="0"/>
-    <cs:fillRef idx="0"/>
-    <cs:effectRef idx="0"/>
-    <cs:fontRef idx="minor">
-      <a:schemeClr val="tx1"/>
-    </cs:fontRef>
-    <cs:spPr>
-      <a:solidFill>
-        <a:schemeClr val="dk1">
-          <a:lumMod val="75000"/>
-          <a:lumOff val="25000"/>
-        </a:schemeClr>
-      </a:solidFill>
-      <a:ln w="9525" cap="flat" cmpd="sng" algn="ctr">
-        <a:solidFill>
-          <a:schemeClr val="tx1">
-            <a:lumMod val="65000"/>
-            <a:lumOff val="35000"/>
-          </a:schemeClr>
-        </a:solidFill>
-        <a:round/>
-      </a:ln>
-    </cs:spPr>
-  </cs:downBar>
-  <cs:dropLine>
-    <cs:lnRef idx="0"/>
-    <cs:fillRef idx="0"/>
-    <cs:effectRef idx="0"/>
-    <cs:fontRef idx="minor">
-      <a:schemeClr val="tx1"/>
-    </cs:fontRef>
-    <cs:spPr>
-      <a:ln w="9525" cap="flat" cmpd="sng" algn="ctr">
-        <a:solidFill>
-          <a:schemeClr val="tx1">
-            <a:lumMod val="35000"/>
-            <a:lumOff val="65000"/>
-          </a:schemeClr>
-        </a:solidFill>
-        <a:round/>
-      </a:ln>
-    </cs:spPr>
-  </cs:dropLine>
-  <cs:errorBar>
-    <cs:lnRef idx="0"/>
-    <cs:fillRef idx="0"/>
-    <cs:effectRef idx="0"/>
-    <cs:fontRef idx="minor">
-      <a:schemeClr val="tx1"/>
-    </cs:fontRef>
-    <cs:spPr>
-      <a:ln w="9525" cap="flat" cmpd="sng" algn="ctr">
-        <a:solidFill>
-          <a:schemeClr val="tx1">
-            <a:lumMod val="65000"/>
-            <a:lumOff val="35000"/>
-          </a:schemeClr>
-        </a:solidFill>
-        <a:round/>
-      </a:ln>
-    </cs:spPr>
-  </cs:errorBar>
-  <cs:floor>
-    <cs:lnRef idx="0"/>
-    <cs:fillRef idx="0"/>
-    <cs:effectRef idx="0"/>
-    <cs:fontRef idx="minor">
-      <a:schemeClr val="tx1"/>
-    </cs:fontRef>
-    <cs:spPr>
-      <a:noFill/>
-      <a:ln>
-        <a:noFill/>
-      </a:ln>
-    </cs:spPr>
-  </cs:floor>
-  <cs:gridlineMajor>
-    <cs:lnRef idx="0"/>
-    <cs:fillRef idx="0"/>
-    <cs:effectRef idx="0"/>
-    <cs:fontRef idx="minor">
-      <a:schemeClr val="tx1"/>
-    </cs:fontRef>
-    <cs:spPr>
-      <a:ln w="9525" cap="flat" cmpd="sng" algn="ctr">
-        <a:solidFill>
-          <a:schemeClr val="tx1">
-            <a:lumMod val="15000"/>
-            <a:lumOff val="85000"/>
-          </a:schemeClr>
-        </a:solidFill>
-        <a:round/>
-      </a:ln>
-    </cs:spPr>
-  </cs:gridlineMajor>
-  <cs:gridlineMinor>
-    <cs:lnRef idx="0"/>
-    <cs:fillRef idx="0"/>
-    <cs:effectRef idx="0"/>
-    <cs:fontRef idx="minor">
-      <a:schemeClr val="tx1"/>
-    </cs:fontRef>
-    <cs:spPr>
-      <a:ln w="9525" cap="flat" cmpd="sng" algn="ctr">
-        <a:solidFill>
-          <a:schemeClr val="tx1">
-            <a:lumMod val="5000"/>
-            <a:lumOff val="95000"/>
-          </a:schemeClr>
-        </a:solidFill>
-        <a:round/>
-      </a:ln>
-    </cs:spPr>
-  </cs:gridlineMinor>
-  <cs:hiLoLine>
-    <cs:lnRef idx="0"/>
-    <cs:fillRef idx="0"/>
-    <cs:effectRef idx="0"/>
-    <cs:fontRef idx="minor">
-      <a:schemeClr val="tx1"/>
-    </cs:fontRef>
-    <cs:spPr>
-      <a:ln w="9525" cap="flat" cmpd="sng" algn="ctr">
-        <a:solidFill>
-          <a:schemeClr val="tx1">
-            <a:lumMod val="50000"/>
-            <a:lumOff val="50000"/>
-          </a:schemeClr>
-        </a:solidFill>
-        <a:round/>
-      </a:ln>
-    </cs:spPr>
-  </cs:hiLoLine>
-  <cs:leaderLine>
-    <cs:lnRef idx="0"/>
-    <cs:fillRef idx="0"/>
-    <cs:effectRef idx="0"/>
-    <cs:fontRef idx="minor">
-      <a:schemeClr val="tx1"/>
-    </cs:fontRef>
-    <cs:spPr>
-      <a:ln w="9525" cap="flat" cmpd="sng" algn="ctr">
-        <a:solidFill>
-          <a:schemeClr val="tx1">
-            <a:lumMod val="35000"/>
-            <a:lumOff val="65000"/>
-          </a:schemeClr>
-        </a:solidFill>
-        <a:round/>
-      </a:ln>
-    </cs:spPr>
-  </cs:leaderLine>
-  <cs:legend>
-    <cs:lnRef idx="0"/>
-    <cs:fillRef idx="0"/>
-    <cs:effectRef idx="0"/>
-    <cs:fontRef idx="minor">
-      <a:schemeClr val="tx1">
-        <a:lumMod val="65000"/>
-        <a:lumOff val="35000"/>
-      </a:schemeClr>
-    </cs:fontRef>
-    <cs:defRPr sz="1197" kern="1200"/>
-  </cs:legend>
-  <cs:plotArea mods="allowNoFillOverride allowNoLineOverride">
-    <cs:lnRef idx="0"/>
-    <cs:fillRef idx="0"/>
-    <cs:effectRef idx="0"/>
-    <cs:fontRef idx="minor">
-      <a:schemeClr val="tx1"/>
-    </cs:fontRef>
-  </cs:plotArea>
-  <cs:plotArea3D mods="allowNoFillOverride allowNoLineOverride">
-    <cs:lnRef idx="0"/>
-    <cs:fillRef idx="0"/>
-    <cs:effectRef idx="0"/>
-    <cs:fontRef idx="minor">
-      <a:schemeClr val="tx1"/>
-    </cs:fontRef>
-  </cs:plotArea3D>
-  <cs:seriesAxis>
-    <cs:lnRef idx="0"/>
-    <cs:fillRef idx="0"/>
-    <cs:effectRef idx="0"/>
-    <cs:fontRef idx="minor">
-      <a:schemeClr val="tx1">
-        <a:lumMod val="65000"/>
-        <a:lumOff val="35000"/>
-      </a:schemeClr>
-    </cs:fontRef>
-    <cs:defRPr sz="1197" kern="1200"/>
-  </cs:seriesAxis>
-  <cs:seriesLine>
-    <cs:lnRef idx="0"/>
-    <cs:fillRef idx="0"/>
-    <cs:effectRef idx="0"/>
-    <cs:fontRef idx="minor">
-      <a:schemeClr val="tx1"/>
-    </cs:fontRef>
-    <cs:spPr>
-      <a:ln w="9525" cap="flat" cmpd="sng" algn="ctr">
-        <a:solidFill>
-          <a:schemeClr val="tx1">
-            <a:lumMod val="35000"/>
-            <a:lumOff val="65000"/>
-          </a:schemeClr>
-        </a:solidFill>
-        <a:round/>
-      </a:ln>
-    </cs:spPr>
-  </cs:seriesLine>
-  <cs:title>
-    <cs:lnRef idx="0"/>
-    <cs:fillRef idx="0"/>
-    <cs:effectRef idx="0"/>
-    <cs:fontRef idx="minor">
-      <a:schemeClr val="tx1">
-        <a:lumMod val="65000"/>
-        <a:lumOff val="35000"/>
-      </a:schemeClr>
-    </cs:fontRef>
-    <cs:defRPr sz="1862" b="0" kern="1200" spc="0" baseline="0"/>
-  </cs:title>
-  <cs:trendline>
-    <cs:lnRef idx="0">
-      <cs:styleClr val="auto"/>
-    </cs:lnRef>
-    <cs:fillRef idx="0"/>
-    <cs:effectRef idx="0"/>
-    <cs:fontRef idx="minor">
-      <a:schemeClr val="tx1"/>
-    </cs:fontRef>
-    <cs:spPr>
-      <a:ln w="19050" cap="rnd">
-        <a:solidFill>
-          <a:schemeClr val="phClr"/>
-        </a:solidFill>
-        <a:prstDash val="sysDot"/>
-      </a:ln>
-    </cs:spPr>
-  </cs:trendline>
-  <cs:trendlineLabel>
-    <cs:lnRef idx="0"/>
-    <cs:fillRef idx="0"/>
-    <cs:effectRef idx="0"/>
-    <cs:fontRef idx="minor">
-      <a:schemeClr val="tx1">
-        <a:lumMod val="65000"/>
-        <a:lumOff val="35000"/>
-      </a:schemeClr>
-    </cs:fontRef>
-    <cs:defRPr sz="1197" kern="1200"/>
-  </cs:trendlineLabel>
-  <cs:upBar>
-    <cs:lnRef idx="0"/>
-    <cs:fillRef idx="0"/>
-    <cs:effectRef idx="0"/>
-    <cs:fontRef idx="minor">
-      <a:schemeClr val="tx1"/>
-    </cs:fontRef>
-    <cs:spPr>
-      <a:solidFill>
-        <a:schemeClr val="lt1"/>
-      </a:solidFill>
-      <a:ln w="9525" cap="flat" cmpd="sng" algn="ctr">
-        <a:solidFill>
-          <a:schemeClr val="tx1">
-            <a:lumMod val="65000"/>
-            <a:lumOff val="35000"/>
-          </a:schemeClr>
-        </a:solidFill>
-        <a:round/>
-      </a:ln>
-    </cs:spPr>
-  </cs:upBar>
-  <cs:valueAxis>
-    <cs:lnRef idx="0"/>
-    <cs:fillRef idx="0"/>
-    <cs:effectRef idx="0"/>
-    <cs:fontRef idx="minor">
-      <a:schemeClr val="tx1">
-        <a:lumMod val="65000"/>
-        <a:lumOff val="35000"/>
-      </a:schemeClr>
-    </cs:fontRef>
-    <cs:defRPr sz="1197" kern="1200"/>
-  </cs:valueAxis>
-  <cs:wall>
-    <cs:lnRef idx="0"/>
-    <cs:fillRef idx="0"/>
-    <cs:effectRef idx="0"/>
-    <cs:fontRef idx="minor">
-      <a:schemeClr val="tx1"/>
-    </cs:fontRef>
-    <cs:spPr>
-      <a:noFill/>
-      <a:ln>
-        <a:noFill/>
-      </a:ln>
-    </cs:spPr>
-  </cs:wall>
-</cs:chartStyle>
+        <a:latin typeface="+mn-lt"/>
+        <a:ea typeface="+mn-ea"/>
+        <a:cs typeface="+mn-cs"/>
+      </a:defRPr>
+    </a:lvl9pPr>
+  </p:notesStyle>
+</p:notesMaster>
+</file>
+
+<file path=ppt/notesSlides/notesSlide1.xml><?xml version="1.0" encoding="utf-8"?>
+<p:notes xmlns:a="http://schemas.openxmlformats.org/drawingml/2006/main" xmlns:r="http://schemas.openxmlformats.org/officeDocument/2006/relationships" xmlns:p="http://schemas.openxmlformats.org/presentationml/2006/main">
+  <p:cSld>
+    <p:spTree>
+      <p:nvGrpSpPr>
+        <p:cNvPr id="1" name=""/>
+        <p:cNvGrpSpPr/>
+        <p:nvPr/>
+      </p:nvGrpSpPr>
+      <p:grpSpPr>
+        <a:xfrm>
+          <a:off x="0" y="0"/>
+          <a:ext cx="0" cy="0"/>
+          <a:chOff x="0" y="0"/>
+          <a:chExt cx="0" cy="0"/>
+        </a:xfrm>
+      </p:grpSpPr>
+      <p:sp>
+        <p:nvSpPr>
+          <p:cNvPr id="2" name="Slide Image Placeholder 1"/>
+          <p:cNvSpPr>
+            <a:spLocks noGrp="1" noRot="1" noChangeAspect="1"/>
+          </p:cNvSpPr>
+          <p:nvPr>
+            <p:ph type="sldImg"/>
+          </p:nvPr>
+        </p:nvSpPr>
+        <p:spPr/>
+      </p:sp>
+      <p:sp>
+        <p:nvSpPr>
+          <p:cNvPr id="3" name="Notes Placeholder 2"/>
+          <p:cNvSpPr>
+            <a:spLocks noGrp="1"/>
+          </p:cNvSpPr>
+          <p:nvPr>
+            <p:ph type="body" idx="1"/>
+          </p:nvPr>
+        </p:nvSpPr>
+        <p:spPr/>
+        <p:txBody>
+          <a:bodyPr/>
+          <a:lstStyle/>
+          <a:p>
+            <a:endParaRPr lang="en-US" dirty="0"/>
+          </a:p>
+        </p:txBody>
+      </p:sp>
+      <p:sp>
+        <p:nvSpPr>
+          <p:cNvPr id="4" name="Slide Number Placeholder 3"/>
+          <p:cNvSpPr>
+            <a:spLocks noGrp="1"/>
+          </p:cNvSpPr>
+          <p:nvPr>
+            <p:ph type="sldNum" sz="quarter" idx="10"/>
+          </p:nvPr>
+        </p:nvSpPr>
+        <p:spPr/>
+        <p:txBody>
+          <a:bodyPr/>
+          <a:lstStyle/>
+          <a:p>
+            <a:fld id="{6A022B30-946F-2349-960C-96E93C564FDA}" type="slidenum">
+              <a:rPr lang="en-US" smtClean="0"/>
+              <a:t>1</a:t>
+            </a:fld>
+            <a:endParaRPr lang="en-US"/>
+          </a:p>
+        </p:txBody>
+      </p:sp>
+    </p:spTree>
+    <p:extLst>
+      <p:ext uri="{BB962C8B-B14F-4D97-AF65-F5344CB8AC3E}">
+        <p14:creationId xmlns:p14="http://schemas.microsoft.com/office/powerpoint/2010/main" val="1910577428"/>
+      </p:ext>
+    </p:extLst>
+  </p:cSld>
+  <p:clrMapOvr>
+    <a:masterClrMapping/>
+  </p:clrMapOvr>
+</p:notes>
 </file>
 
 <file path=ppt/slideLayouts/slideLayout1.xml><?xml version="1.0" encoding="utf-8"?>
@@ -7767,18 +7401,18 @@
           <p:nvPr>
             <p:extLst>
               <p:ext uri="{D42A27DB-BD31-4B8C-83A1-F6EECF244321}">
-                <p14:modId xmlns:p14="http://schemas.microsoft.com/office/powerpoint/2010/main" val="1605698979"/>
+                <p14:modId xmlns:p14="http://schemas.microsoft.com/office/powerpoint/2010/main" val="1250036488"/>
               </p:ext>
             </p:extLst>
           </p:nvPr>
         </p:nvGraphicFramePr>
         <p:xfrm>
-          <a:off x="10551705" y="7029276"/>
+          <a:off x="10551705" y="7464706"/>
           <a:ext cx="6124196" cy="6074228"/>
         </p:xfrm>
         <a:graphic>
           <a:graphicData uri="http://schemas.openxmlformats.org/drawingml/2006/chart">
-            <c:chart xmlns:c="http://schemas.openxmlformats.org/drawingml/2006/chart" xmlns:r="http://schemas.openxmlformats.org/officeDocument/2006/relationships" r:id="rId2"/>
+            <c:chart xmlns:c="http://schemas.openxmlformats.org/drawingml/2006/chart" xmlns:r="http://schemas.openxmlformats.org/officeDocument/2006/relationships" r:id="rId3"/>
           </a:graphicData>
         </a:graphic>
       </p:graphicFrame>
@@ -8086,7 +7720,7 @@
         </p:nvSpPr>
         <p:spPr>
           <a:xfrm>
-            <a:off x="6841439" y="4108735"/>
+            <a:off x="6841439" y="4239364"/>
             <a:ext cx="16593270" cy="1440312"/>
           </a:xfrm>
           <a:prstGeom prst="rect">
@@ -8186,7 +7820,7 @@
           <p:nvPr/>
         </p:nvPicPr>
         <p:blipFill rotWithShape="1">
-          <a:blip r:embed="rId3">
+          <a:blip r:embed="rId4">
             <a:extLst>
               <a:ext uri="{28A0092B-C50C-407E-A947-70E740481C1C}">
                 <a14:useLocalDpi xmlns:a14="http://schemas.microsoft.com/office/drawing/2010/main" val="0"/>
@@ -8411,7 +8045,7 @@
         </p:nvSpPr>
         <p:spPr>
           <a:xfrm rot="10800000">
-            <a:off x="954156" y="5361604"/>
+            <a:off x="954156" y="5622862"/>
             <a:ext cx="28346400" cy="457200"/>
           </a:xfrm>
           <a:prstGeom prst="rect">
@@ -8459,7 +8093,7 @@
         </p:nvSpPr>
         <p:spPr>
           <a:xfrm>
-            <a:off x="962526" y="5825428"/>
+            <a:off x="962526" y="6130229"/>
             <a:ext cx="7749673" cy="7494276"/>
           </a:xfrm>
           <a:prstGeom prst="rect">
@@ -8555,7 +8189,7 @@
         </p:nvSpPr>
         <p:spPr>
           <a:xfrm>
-            <a:off x="9169400" y="13765312"/>
+            <a:off x="9169400" y="14200742"/>
             <a:ext cx="20142200" cy="2797606"/>
           </a:xfrm>
           <a:prstGeom prst="rect">
@@ -8696,7 +8330,7 @@
         </p:nvSpPr>
         <p:spPr>
           <a:xfrm>
-            <a:off x="24790416" y="22769848"/>
+            <a:off x="24790416" y="32479905"/>
             <a:ext cx="3555983" cy="2279003"/>
           </a:xfrm>
           <a:prstGeom prst="rect">
@@ -8811,13 +8445,13 @@
           <p:nvPr>
             <p:extLst>
               <p:ext uri="{D42A27DB-BD31-4B8C-83A1-F6EECF244321}">
-                <p14:modId xmlns:p14="http://schemas.microsoft.com/office/powerpoint/2010/main" val="43377828"/>
+                <p14:modId xmlns:p14="http://schemas.microsoft.com/office/powerpoint/2010/main" val="238791985"/>
               </p:ext>
             </p:extLst>
           </p:nvPr>
         </p:nvGraphicFramePr>
         <p:xfrm>
-          <a:off x="9287410" y="22931542"/>
+          <a:off x="9287410" y="32641599"/>
           <a:ext cx="6128143" cy="5286086"/>
         </p:xfrm>
         <a:graphic>
@@ -10606,7 +10240,7 @@
         </p:nvSpPr>
         <p:spPr>
           <a:xfrm>
-            <a:off x="15605051" y="21954941"/>
+            <a:off x="15605051" y="31664998"/>
             <a:ext cx="7696199" cy="2797606"/>
           </a:xfrm>
           <a:prstGeom prst="rect">
@@ -10683,7 +10317,7 @@
         </p:nvSpPr>
         <p:spPr>
           <a:xfrm>
-            <a:off x="26575674" y="22693648"/>
+            <a:off x="26575674" y="32403705"/>
             <a:ext cx="2735926" cy="2668340"/>
           </a:xfrm>
           <a:prstGeom prst="rect">
@@ -10827,7 +10461,7 @@
         </p:nvSpPr>
         <p:spPr>
           <a:xfrm>
-            <a:off x="24150484" y="22079657"/>
+            <a:off x="24150484" y="31789714"/>
             <a:ext cx="4535567" cy="858614"/>
           </a:xfrm>
           <a:prstGeom prst="rect">
@@ -10879,7 +10513,7 @@
         </p:nvSpPr>
         <p:spPr>
           <a:xfrm>
-            <a:off x="9166831" y="21974426"/>
+            <a:off x="9166831" y="31684483"/>
             <a:ext cx="4013200" cy="858614"/>
           </a:xfrm>
           <a:prstGeom prst="rect">
@@ -10931,7 +10565,7 @@
         </p:nvSpPr>
         <p:spPr>
           <a:xfrm rot="10800000">
-            <a:off x="9079107" y="16517257"/>
+            <a:off x="9079107" y="16952687"/>
             <a:ext cx="20363688" cy="457200"/>
           </a:xfrm>
           <a:prstGeom prst="rect">
@@ -11027,7 +10661,7 @@
         </p:nvSpPr>
         <p:spPr>
           <a:xfrm>
-            <a:off x="16310973" y="25575288"/>
+            <a:off x="16310973" y="35285345"/>
             <a:ext cx="7696199" cy="1320279"/>
           </a:xfrm>
           <a:prstGeom prst="rect">
@@ -11104,7 +10738,7 @@
         </p:nvSpPr>
         <p:spPr>
           <a:xfrm>
-            <a:off x="9231086" y="17039314"/>
+            <a:off x="9231086" y="26749371"/>
             <a:ext cx="20073257" cy="1689611"/>
           </a:xfrm>
           <a:prstGeom prst="rect">
@@ -11181,7 +10815,7 @@
         </p:nvSpPr>
         <p:spPr>
           <a:xfrm rot="10800000">
-            <a:off x="9143999" y="13301645"/>
+            <a:off x="9143999" y="13737075"/>
             <a:ext cx="20146397" cy="544984"/>
           </a:xfrm>
           <a:prstGeom prst="rect">
@@ -11230,13 +10864,13 @@
           <p:nvPr>
             <p:extLst>
               <p:ext uri="{D42A27DB-BD31-4B8C-83A1-F6EECF244321}">
-                <p14:modId xmlns:p14="http://schemas.microsoft.com/office/powerpoint/2010/main" val="2104084939"/>
+                <p14:modId xmlns:p14="http://schemas.microsoft.com/office/powerpoint/2010/main" val="1877439299"/>
               </p:ext>
             </p:extLst>
           </p:nvPr>
         </p:nvGraphicFramePr>
         <p:xfrm>
-          <a:off x="9245925" y="19764693"/>
+          <a:off x="9245925" y="29474750"/>
           <a:ext cx="20134211" cy="1747520"/>
         </p:xfrm>
         <a:graphic>
@@ -15424,7 +15058,7 @@
         </p:nvSpPr>
         <p:spPr>
           <a:xfrm rot="10800000">
-            <a:off x="9079107" y="19481800"/>
+            <a:off x="9079107" y="29191857"/>
             <a:ext cx="20363688" cy="228600"/>
           </a:xfrm>
           <a:prstGeom prst="rect">
@@ -15472,7 +15106,7 @@
         </p:nvSpPr>
         <p:spPr>
           <a:xfrm rot="10800000">
-            <a:off x="9028307" y="21512213"/>
+            <a:off x="9142794" y="31309356"/>
             <a:ext cx="20363688" cy="457200"/>
           </a:xfrm>
           <a:prstGeom prst="rect">
@@ -15520,7 +15154,7 @@
         </p:nvSpPr>
         <p:spPr>
           <a:xfrm>
-            <a:off x="984297" y="13800222"/>
+            <a:off x="984297" y="14192109"/>
             <a:ext cx="7749673" cy="1631133"/>
           </a:xfrm>
           <a:prstGeom prst="rect">
@@ -15608,8 +15242,8 @@
         </p:nvSpPr>
         <p:spPr>
           <a:xfrm>
-            <a:off x="999509" y="23969456"/>
-            <a:ext cx="7749673" cy="2012776"/>
+            <a:off x="999509" y="24840321"/>
+            <a:ext cx="7749673" cy="1277190"/>
           </a:xfrm>
           <a:prstGeom prst="rect">
             <a:avLst/>
@@ -15633,14 +15267,14 @@
               </a:lnSpc>
             </a:pPr>
             <a:r>
-              <a:rPr lang="en-US" sz="3600" dirty="0">
+              <a:rPr lang="en-US" sz="3600" dirty="0" smtClean="0">
                 <a:solidFill>
                   <a:srgbClr val="2C3E50"/>
                 </a:solidFill>
                 <a:latin typeface="Gotham Medium"/>
                 <a:cs typeface="Gotham Medium"/>
               </a:rPr>
-              <a:t>Statistic 2</a:t>
+              <a:t>One Year of DRS Activity</a:t>
             </a:r>
             <a:endParaRPr lang="en-US" sz="3600" dirty="0" smtClean="0">
               <a:solidFill>
@@ -15668,7 +15302,7 @@
                 <a:ea typeface="Helvetica" charset="0"/>
                 <a:cs typeface="Helvetica" charset="0"/>
               </a:rPr>
-              <a:t>Regardless of the collection method, statistics gathered about repository usage are utilized by content owners to measure the use and impact.</a:t>
+              <a:t>Views, downloads, and streams per month.</a:t>
             </a:r>
             <a:endParaRPr lang="en-US" sz="2300" dirty="0">
               <a:latin typeface="Helvetica" charset="0"/>
@@ -15678,28 +15312,6 @@
           </a:p>
         </p:txBody>
       </p:sp>
-      <p:graphicFrame>
-        <p:nvGraphicFramePr>
-          <p:cNvPr id="45" name="Chart 44"/>
-          <p:cNvGraphicFramePr/>
-          <p:nvPr>
-            <p:extLst>
-              <p:ext uri="{D42A27DB-BD31-4B8C-83A1-F6EECF244321}">
-                <p14:modId xmlns:p14="http://schemas.microsoft.com/office/powerpoint/2010/main" val="775154398"/>
-              </p:ext>
-            </p:extLst>
-          </p:nvPr>
-        </p:nvGraphicFramePr>
-        <p:xfrm>
-          <a:off x="793940" y="26105016"/>
-          <a:ext cx="7495795" cy="6621400"/>
-        </p:xfrm>
-        <a:graphic>
-          <a:graphicData uri="http://schemas.openxmlformats.org/drawingml/2006/chart">
-            <c:chart xmlns:c="http://schemas.openxmlformats.org/drawingml/2006/chart" xmlns:r="http://schemas.openxmlformats.org/officeDocument/2006/relationships" r:id="rId4"/>
-          </a:graphicData>
-        </a:graphic>
-      </p:graphicFrame>
       <p:sp>
         <p:nvSpPr>
           <p:cNvPr id="46" name="TextBox 45"/>
@@ -15708,7 +15320,7 @@
         </p:nvSpPr>
         <p:spPr>
           <a:xfrm>
-            <a:off x="985656" y="33058041"/>
+            <a:off x="1203375" y="32709698"/>
             <a:ext cx="7749673" cy="2012776"/>
           </a:xfrm>
           <a:prstGeom prst="rect">
@@ -15788,13 +15400,13 @@
           <p:nvPr>
             <p:extLst>
               <p:ext uri="{D42A27DB-BD31-4B8C-83A1-F6EECF244321}">
-                <p14:modId xmlns:p14="http://schemas.microsoft.com/office/powerpoint/2010/main" val="345489385"/>
+                <p14:modId xmlns:p14="http://schemas.microsoft.com/office/powerpoint/2010/main" val="1935213370"/>
               </p:ext>
             </p:extLst>
           </p:nvPr>
         </p:nvGraphicFramePr>
         <p:xfrm>
-          <a:off x="793940" y="35318289"/>
+          <a:off x="1011659" y="34969946"/>
           <a:ext cx="7495795" cy="6621400"/>
         </p:xfrm>
         <a:graphic>
@@ -15811,8 +15423,8 @@
         </p:nvSpPr>
         <p:spPr>
           <a:xfrm>
-            <a:off x="9192985" y="5829300"/>
-            <a:ext cx="20111358" cy="10629900"/>
+            <a:off x="9192985" y="6052456"/>
+            <a:ext cx="20111358" cy="10406743"/>
           </a:xfrm>
           <a:prstGeom prst="rect">
             <a:avLst/>
@@ -15858,8 +15470,8 @@
         </p:nvSpPr>
         <p:spPr>
           <a:xfrm>
-            <a:off x="985156" y="5894613"/>
-            <a:ext cx="7679873" cy="35993615"/>
+            <a:off x="985156" y="6052457"/>
+            <a:ext cx="7679873" cy="35835771"/>
           </a:xfrm>
           <a:prstGeom prst="rect">
             <a:avLst/>
@@ -15999,7 +15611,7 @@
         </p:nvSpPr>
         <p:spPr>
           <a:xfrm>
-            <a:off x="14020801" y="5781886"/>
+            <a:off x="14020801" y="6086687"/>
             <a:ext cx="10689771" cy="858614"/>
           </a:xfrm>
           <a:prstGeom prst="rect">
@@ -16051,7 +15663,7 @@
         </p:nvSpPr>
         <p:spPr>
           <a:xfrm>
-            <a:off x="10646001" y="7411232"/>
+            <a:off x="10646001" y="7846662"/>
             <a:ext cx="1464356" cy="523220"/>
           </a:xfrm>
           <a:prstGeom prst="rect">
@@ -16081,7 +15693,7 @@
         </p:nvSpPr>
         <p:spPr>
           <a:xfrm>
-            <a:off x="10296751" y="7498543"/>
+            <a:off x="10296751" y="7933973"/>
             <a:ext cx="365760" cy="365760"/>
           </a:xfrm>
           <a:prstGeom prst="rect">
@@ -16129,7 +15741,7 @@
         </p:nvSpPr>
         <p:spPr>
           <a:xfrm>
-            <a:off x="10684781" y="6831395"/>
+            <a:off x="10684781" y="7266825"/>
             <a:ext cx="1042987" cy="523220"/>
           </a:xfrm>
           <a:prstGeom prst="rect">
@@ -16159,7 +15771,7 @@
         </p:nvSpPr>
         <p:spPr>
           <a:xfrm>
-            <a:off x="10317387" y="6911450"/>
+            <a:off x="10317387" y="7346880"/>
             <a:ext cx="365760" cy="365760"/>
           </a:xfrm>
           <a:prstGeom prst="rect">
@@ -16206,13 +15818,13 @@
           <p:nvPr>
             <p:extLst>
               <p:ext uri="{D42A27DB-BD31-4B8C-83A1-F6EECF244321}">
-                <p14:modId xmlns:p14="http://schemas.microsoft.com/office/powerpoint/2010/main" val="1081071765"/>
+                <p14:modId xmlns:p14="http://schemas.microsoft.com/office/powerpoint/2010/main" val="530735215"/>
               </p:ext>
             </p:extLst>
           </p:nvPr>
         </p:nvGraphicFramePr>
         <p:xfrm>
-          <a:off x="15010682" y="7034212"/>
+          <a:off x="15010682" y="7469642"/>
           <a:ext cx="8627911" cy="6019800"/>
         </p:xfrm>
         <a:graphic>
@@ -16228,13 +15840,13 @@
           <p:nvPr>
             <p:extLst>
               <p:ext uri="{D42A27DB-BD31-4B8C-83A1-F6EECF244321}">
-                <p14:modId xmlns:p14="http://schemas.microsoft.com/office/powerpoint/2010/main" val="57278762"/>
+                <p14:modId xmlns:p14="http://schemas.microsoft.com/office/powerpoint/2010/main" val="1567172514"/>
               </p:ext>
             </p:extLst>
           </p:nvPr>
         </p:nvGraphicFramePr>
         <p:xfrm>
-          <a:off x="21107736" y="7037632"/>
+          <a:off x="21107736" y="7473062"/>
           <a:ext cx="8627911" cy="6019800"/>
         </p:xfrm>
         <a:graphic>
@@ -16250,13 +15862,13 @@
           <p:nvPr>
             <p:extLst>
               <p:ext uri="{D42A27DB-BD31-4B8C-83A1-F6EECF244321}">
-                <p14:modId xmlns:p14="http://schemas.microsoft.com/office/powerpoint/2010/main" val="318932324"/>
+                <p14:modId xmlns:p14="http://schemas.microsoft.com/office/powerpoint/2010/main" val="586296831"/>
               </p:ext>
             </p:extLst>
           </p:nvPr>
         </p:nvGraphicFramePr>
         <p:xfrm>
-          <a:off x="783772" y="15781399"/>
+          <a:off x="783772" y="16173286"/>
           <a:ext cx="7670498" cy="8156286"/>
         </p:xfrm>
         <a:graphic>
@@ -16265,6 +15877,35 @@
           </a:graphicData>
         </a:graphic>
       </p:graphicFrame>
+      <p:pic>
+        <p:nvPicPr>
+          <p:cNvPr id="3" name="Picture 2"/>
+          <p:cNvPicPr>
+            <a:picLocks noChangeAspect="1"/>
+          </p:cNvPicPr>
+          <p:nvPr/>
+        </p:nvPicPr>
+        <p:blipFill rotWithShape="1">
+          <a:blip r:embed="rId9">
+            <a:extLst>
+              <a:ext uri="{28A0092B-C50C-407E-A947-70E740481C1C}">
+                <a14:useLocalDpi xmlns:a14="http://schemas.microsoft.com/office/drawing/2010/main" val="0"/>
+              </a:ext>
+            </a:extLst>
+          </a:blip>
+          <a:srcRect l="1510" t="3414" r="16073" b="4969"/>
+          <a:stretch/>
+        </p:blipFill>
+        <p:spPr>
+          <a:xfrm>
+            <a:off x="1084817" y="26253143"/>
+            <a:ext cx="7487683" cy="5947937"/>
+          </a:xfrm>
+          <a:prstGeom prst="rect">
+            <a:avLst/>
+          </a:prstGeom>
+        </p:spPr>
+      </p:pic>
     </p:spTree>
     <p:extLst>
       <p:ext uri="{BB962C8B-B14F-4D97-AF65-F5344CB8AC3E}">
@@ -17620,4 +17261,265 @@
     </a:ext>
   </a:extLst>
 </a:theme>
+</file>
+
+<file path=ppt/theme/theme2.xml><?xml version="1.0" encoding="utf-8"?>
+<a:theme xmlns:a="http://schemas.openxmlformats.org/drawingml/2006/main" name="Office Theme">
+  <a:themeElements>
+    <a:clrScheme name="Office">
+      <a:dk1>
+        <a:sysClr val="windowText" lastClr="000000"/>
+      </a:dk1>
+      <a:lt1>
+        <a:sysClr val="window" lastClr="FFFFFF"/>
+      </a:lt1>
+      <a:dk2>
+        <a:srgbClr val="44546A"/>
+      </a:dk2>
+      <a:lt2>
+        <a:srgbClr val="E7E6E6"/>
+      </a:lt2>
+      <a:accent1>
+        <a:srgbClr val="5B9BD5"/>
+      </a:accent1>
+      <a:accent2>
+        <a:srgbClr val="ED7D31"/>
+      </a:accent2>
+      <a:accent3>
+        <a:srgbClr val="A5A5A5"/>
+      </a:accent3>
+      <a:accent4>
+        <a:srgbClr val="FFC000"/>
+      </a:accent4>
+      <a:accent5>
+        <a:srgbClr val="4472C4"/>
+      </a:accent5>
+      <a:accent6>
+        <a:srgbClr val="70AD47"/>
+      </a:accent6>
+      <a:hlink>
+        <a:srgbClr val="0563C1"/>
+      </a:hlink>
+      <a:folHlink>
+        <a:srgbClr val="954F72"/>
+      </a:folHlink>
+    </a:clrScheme>
+    <a:fontScheme name="Office">
+      <a:majorFont>
+        <a:latin typeface="Calibri Light" panose="020F0302020204030204"/>
+        <a:ea typeface=""/>
+        <a:cs typeface=""/>
+        <a:font script="Jpan" typeface="Yu Gothic Light"/>
+        <a:font script="Hang" typeface="맑은 고딕"/>
+        <a:font script="Hans" typeface="DengXian Light"/>
+        <a:font script="Hant" typeface="新細明體"/>
+        <a:font script="Arab" typeface="Times New Roman"/>
+        <a:font script="Hebr" typeface="Times New Roman"/>
+        <a:font script="Thai" typeface="Angsana New"/>
+        <a:font script="Ethi" typeface="Nyala"/>
+        <a:font script="Beng" typeface="Vrinda"/>
+        <a:font script="Gujr" typeface="Shruti"/>
+        <a:font script="Khmr" typeface="MoolBoran"/>
+        <a:font script="Knda" typeface="Tunga"/>
+        <a:font script="Guru" typeface="Raavi"/>
+        <a:font script="Cans" typeface="Euphemia"/>
+        <a:font script="Cher" typeface="Plantagenet Cherokee"/>
+        <a:font script="Yiii" typeface="Microsoft Yi Baiti"/>
+        <a:font script="Tibt" typeface="Microsoft Himalaya"/>
+        <a:font script="Thaa" typeface="MV Boli"/>
+        <a:font script="Deva" typeface="Mangal"/>
+        <a:font script="Telu" typeface="Gautami"/>
+        <a:font script="Taml" typeface="Latha"/>
+        <a:font script="Syrc" typeface="Estrangelo Edessa"/>
+        <a:font script="Orya" typeface="Kalinga"/>
+        <a:font script="Mlym" typeface="Kartika"/>
+        <a:font script="Laoo" typeface="DokChampa"/>
+        <a:font script="Sinh" typeface="Iskoola Pota"/>
+        <a:font script="Mong" typeface="Mongolian Baiti"/>
+        <a:font script="Viet" typeface="Times New Roman"/>
+        <a:font script="Uigh" typeface="Microsoft Uighur"/>
+        <a:font script="Geor" typeface="Sylfaen"/>
+      </a:majorFont>
+      <a:minorFont>
+        <a:latin typeface="Calibri" panose="020F0502020204030204"/>
+        <a:ea typeface=""/>
+        <a:cs typeface=""/>
+        <a:font script="Jpan" typeface="Yu Gothic"/>
+        <a:font script="Hang" typeface="맑은 고딕"/>
+        <a:font script="Hans" typeface="DengXian"/>
+        <a:font script="Hant" typeface="新細明體"/>
+        <a:font script="Arab" typeface="Arial"/>
+        <a:font script="Hebr" typeface="Arial"/>
+        <a:font script="Thai" typeface="Cordia New"/>
+        <a:font script="Ethi" typeface="Nyala"/>
+        <a:font script="Beng" typeface="Vrinda"/>
+        <a:font script="Gujr" typeface="Shruti"/>
+        <a:font script="Khmr" typeface="DaunPenh"/>
+        <a:font script="Knda" typeface="Tunga"/>
+        <a:font script="Guru" typeface="Raavi"/>
+        <a:font script="Cans" typeface="Euphemia"/>
+        <a:font script="Cher" typeface="Plantagenet Cherokee"/>
+        <a:font script="Yiii" typeface="Microsoft Yi Baiti"/>
+        <a:font script="Tibt" typeface="Microsoft Himalaya"/>
+        <a:font script="Thaa" typeface="MV Boli"/>
+        <a:font script="Deva" typeface="Mangal"/>
+        <a:font script="Telu" typeface="Gautami"/>
+        <a:font script="Taml" typeface="Latha"/>
+        <a:font script="Syrc" typeface="Estrangelo Edessa"/>
+        <a:font script="Orya" typeface="Kalinga"/>
+        <a:font script="Mlym" typeface="Kartika"/>
+        <a:font script="Laoo" typeface="DokChampa"/>
+        <a:font script="Sinh" typeface="Iskoola Pota"/>
+        <a:font script="Mong" typeface="Mongolian Baiti"/>
+        <a:font script="Viet" typeface="Arial"/>
+        <a:font script="Uigh" typeface="Microsoft Uighur"/>
+        <a:font script="Geor" typeface="Sylfaen"/>
+      </a:minorFont>
+    </a:fontScheme>
+    <a:fmtScheme name="Office">
+      <a:fillStyleLst>
+        <a:solidFill>
+          <a:schemeClr val="phClr"/>
+        </a:solidFill>
+        <a:gradFill rotWithShape="1">
+          <a:gsLst>
+            <a:gs pos="0">
+              <a:schemeClr val="phClr">
+                <a:lumMod val="110000"/>
+                <a:satMod val="105000"/>
+                <a:tint val="67000"/>
+              </a:schemeClr>
+            </a:gs>
+            <a:gs pos="50000">
+              <a:schemeClr val="phClr">
+                <a:lumMod val="105000"/>
+                <a:satMod val="103000"/>
+                <a:tint val="73000"/>
+              </a:schemeClr>
+            </a:gs>
+            <a:gs pos="100000">
+              <a:schemeClr val="phClr">
+                <a:lumMod val="105000"/>
+                <a:satMod val="109000"/>
+                <a:tint val="81000"/>
+              </a:schemeClr>
+            </a:gs>
+          </a:gsLst>
+          <a:lin ang="5400000" scaled="0"/>
+        </a:gradFill>
+        <a:gradFill rotWithShape="1">
+          <a:gsLst>
+            <a:gs pos="0">
+              <a:schemeClr val="phClr">
+                <a:satMod val="103000"/>
+                <a:lumMod val="102000"/>
+                <a:tint val="94000"/>
+              </a:schemeClr>
+            </a:gs>
+            <a:gs pos="50000">
+              <a:schemeClr val="phClr">
+                <a:satMod val="110000"/>
+                <a:lumMod val="100000"/>
+                <a:shade val="100000"/>
+              </a:schemeClr>
+            </a:gs>
+            <a:gs pos="100000">
+              <a:schemeClr val="phClr">
+                <a:lumMod val="99000"/>
+                <a:satMod val="120000"/>
+                <a:shade val="78000"/>
+              </a:schemeClr>
+            </a:gs>
+          </a:gsLst>
+          <a:lin ang="5400000" scaled="0"/>
+        </a:gradFill>
+      </a:fillStyleLst>
+      <a:lnStyleLst>
+        <a:ln w="6350" cap="flat" cmpd="sng" algn="ctr">
+          <a:solidFill>
+            <a:schemeClr val="phClr"/>
+          </a:solidFill>
+          <a:prstDash val="solid"/>
+          <a:miter lim="800000"/>
+        </a:ln>
+        <a:ln w="12700" cap="flat" cmpd="sng" algn="ctr">
+          <a:solidFill>
+            <a:schemeClr val="phClr"/>
+          </a:solidFill>
+          <a:prstDash val="solid"/>
+          <a:miter lim="800000"/>
+        </a:ln>
+        <a:ln w="19050" cap="flat" cmpd="sng" algn="ctr">
+          <a:solidFill>
+            <a:schemeClr val="phClr"/>
+          </a:solidFill>
+          <a:prstDash val="solid"/>
+          <a:miter lim="800000"/>
+        </a:ln>
+      </a:lnStyleLst>
+      <a:effectStyleLst>
+        <a:effectStyle>
+          <a:effectLst/>
+        </a:effectStyle>
+        <a:effectStyle>
+          <a:effectLst/>
+        </a:effectStyle>
+        <a:effectStyle>
+          <a:effectLst>
+            <a:outerShdw blurRad="57150" dist="19050" dir="5400000" algn="ctr" rotWithShape="0">
+              <a:srgbClr val="000000">
+                <a:alpha val="63000"/>
+              </a:srgbClr>
+            </a:outerShdw>
+          </a:effectLst>
+        </a:effectStyle>
+      </a:effectStyleLst>
+      <a:bgFillStyleLst>
+        <a:solidFill>
+          <a:schemeClr val="phClr"/>
+        </a:solidFill>
+        <a:solidFill>
+          <a:schemeClr val="phClr">
+            <a:tint val="95000"/>
+            <a:satMod val="170000"/>
+          </a:schemeClr>
+        </a:solidFill>
+        <a:gradFill rotWithShape="1">
+          <a:gsLst>
+            <a:gs pos="0">
+              <a:schemeClr val="phClr">
+                <a:tint val="93000"/>
+                <a:satMod val="150000"/>
+                <a:shade val="98000"/>
+                <a:lumMod val="102000"/>
+              </a:schemeClr>
+            </a:gs>
+            <a:gs pos="50000">
+              <a:schemeClr val="phClr">
+                <a:tint val="98000"/>
+                <a:satMod val="130000"/>
+                <a:shade val="90000"/>
+                <a:lumMod val="103000"/>
+              </a:schemeClr>
+            </a:gs>
+            <a:gs pos="100000">
+              <a:schemeClr val="phClr">
+                <a:shade val="63000"/>
+                <a:satMod val="120000"/>
+              </a:schemeClr>
+            </a:gs>
+          </a:gsLst>
+          <a:lin ang="5400000" scaled="0"/>
+        </a:gradFill>
+      </a:bgFillStyleLst>
+    </a:fmtScheme>
+  </a:themeElements>
+  <a:objectDefaults/>
+  <a:extraClrSchemeLst/>
+  <a:extLst>
+    <a:ext uri="{05A4C25C-085E-4340-85A3-A5531E510DB2}">
+      <thm15:themeFamily xmlns:thm15="http://schemas.microsoft.com/office/thememl/2012/main" name="Office Theme" id="{62F939B6-93AF-4DB8-9C6B-D6C7DFDC589F}" vid="{4A3C46E8-61CC-4603-A589-7422A47A8E4A}"/>
+    </a:ext>
+  </a:extLst>
+</a:theme>
 </file>
</xml_diff>

<commit_message>
Most spacing tweaks and chart additions
</commit_message>
<xml_diff>
--- a/Presentations/Open Repositories 2016/Statistics/SweeneySarahORstatistics33x46.pptx
+++ b/Presentations/Open Repositories 2016/Statistics/SweeneySarahORstatistics33x46.pptx
@@ -292,6 +292,61 @@
               <a:effectLst/>
             </c:spPr>
           </c:dPt>
+          <c:dLbls>
+            <c:spPr>
+              <a:noFill/>
+              <a:ln>
+                <a:noFill/>
+              </a:ln>
+              <a:effectLst/>
+            </c:spPr>
+            <c:txPr>
+              <a:bodyPr rot="0" spcFirstLastPara="1" vertOverflow="ellipsis" vert="horz" wrap="square" lIns="38100" tIns="19050" rIns="38100" bIns="19050" anchor="ctr" anchorCtr="1">
+                <a:spAutoFit/>
+              </a:bodyPr>
+              <a:lstStyle/>
+              <a:p>
+                <a:pPr>
+                  <a:defRPr sz="2000" b="1" i="0" u="none" strike="noStrike" kern="1200" baseline="0">
+                    <a:solidFill>
+                      <a:srgbClr val="ECF0F1"/>
+                    </a:solidFill>
+                    <a:latin typeface="Helvetica" charset="0"/>
+                    <a:ea typeface="Helvetica" charset="0"/>
+                    <a:cs typeface="Helvetica" charset="0"/>
+                  </a:defRPr>
+                </a:pPr>
+                <a:endParaRPr lang="en-US"/>
+              </a:p>
+            </c:txPr>
+            <c:dLblPos val="inEnd"/>
+            <c:showLegendKey val="0"/>
+            <c:showVal val="1"/>
+            <c:showCatName val="0"/>
+            <c:showSerName val="0"/>
+            <c:showPercent val="0"/>
+            <c:showBubbleSize val="0"/>
+            <c:showLeaderLines val="1"/>
+            <c:leaderLines>
+              <c:spPr>
+                <a:ln w="9525" cap="flat" cmpd="sng" algn="ctr">
+                  <a:solidFill>
+                    <a:schemeClr val="tx1">
+                      <a:lumMod val="35000"/>
+                      <a:lumOff val="65000"/>
+                    </a:schemeClr>
+                  </a:solidFill>
+                  <a:round/>
+                </a:ln>
+                <a:effectLst/>
+              </c:spPr>
+            </c:leaderLines>
+            <c:extLst>
+              <c:ext xmlns:c15="http://schemas.microsoft.com/office/drawing/2012/chart" uri="{CE6537A1-D6FC-4f65-9D91-7224C49458BB}">
+                <c15:layout/>
+              </c:ext>
+            </c:extLst>
+          </c:dLbls>
           <c:cat>
             <c:strRef>
               <c:f>Sheet1!$A$2:$A$5</c:f>
@@ -777,6 +832,61 @@
               <a:effectLst/>
             </c:spPr>
           </c:dPt>
+          <c:dLbls>
+            <c:spPr>
+              <a:noFill/>
+              <a:ln>
+                <a:noFill/>
+              </a:ln>
+              <a:effectLst/>
+            </c:spPr>
+            <c:txPr>
+              <a:bodyPr rot="0" spcFirstLastPara="1" vertOverflow="ellipsis" vert="horz" wrap="square" lIns="38100" tIns="19050" rIns="38100" bIns="19050" anchor="ctr" anchorCtr="1">
+                <a:spAutoFit/>
+              </a:bodyPr>
+              <a:lstStyle/>
+              <a:p>
+                <a:pPr>
+                  <a:defRPr sz="2000" b="1" i="0" u="none" strike="noStrike" kern="1200" baseline="0">
+                    <a:solidFill>
+                      <a:srgbClr val="ECF0F1"/>
+                    </a:solidFill>
+                    <a:latin typeface="Helvetica" charset="0"/>
+                    <a:ea typeface="Helvetica" charset="0"/>
+                    <a:cs typeface="Helvetica" charset="0"/>
+                  </a:defRPr>
+                </a:pPr>
+                <a:endParaRPr lang="en-US"/>
+              </a:p>
+            </c:txPr>
+            <c:dLblPos val="inEnd"/>
+            <c:showLegendKey val="0"/>
+            <c:showVal val="1"/>
+            <c:showCatName val="0"/>
+            <c:showSerName val="0"/>
+            <c:showPercent val="0"/>
+            <c:showBubbleSize val="0"/>
+            <c:showLeaderLines val="1"/>
+            <c:leaderLines>
+              <c:spPr>
+                <a:ln w="9525" cap="flat" cmpd="sng" algn="ctr">
+                  <a:solidFill>
+                    <a:schemeClr val="tx1">
+                      <a:lumMod val="35000"/>
+                      <a:lumOff val="65000"/>
+                    </a:schemeClr>
+                  </a:solidFill>
+                  <a:round/>
+                </a:ln>
+                <a:effectLst/>
+              </c:spPr>
+            </c:leaderLines>
+            <c:extLst>
+              <c:ext xmlns:c15="http://schemas.microsoft.com/office/drawing/2012/chart" uri="{CE6537A1-D6FC-4f65-9D91-7224C49458BB}">
+                <c15:layout/>
+              </c:ext>
+            </c:extLst>
+          </c:dLbls>
           <c:cat>
             <c:strRef>
               <c:f>Sheet1!$A$2:$A$5</c:f>
@@ -1010,6 +1120,61 @@
               <a:effectLst/>
             </c:spPr>
           </c:dPt>
+          <c:dLbls>
+            <c:spPr>
+              <a:noFill/>
+              <a:ln>
+                <a:noFill/>
+              </a:ln>
+              <a:effectLst/>
+            </c:spPr>
+            <c:txPr>
+              <a:bodyPr rot="0" spcFirstLastPara="1" vertOverflow="ellipsis" vert="horz" wrap="square" lIns="38100" tIns="19050" rIns="38100" bIns="19050" anchor="ctr" anchorCtr="1">
+                <a:spAutoFit/>
+              </a:bodyPr>
+              <a:lstStyle/>
+              <a:p>
+                <a:pPr>
+                  <a:defRPr sz="2000" b="1" i="0" u="none" strike="noStrike" kern="1200" baseline="0">
+                    <a:solidFill>
+                      <a:srgbClr val="ECF0F1"/>
+                    </a:solidFill>
+                    <a:latin typeface="Helvetica" charset="0"/>
+                    <a:ea typeface="Helvetica" charset="0"/>
+                    <a:cs typeface="Helvetica" charset="0"/>
+                  </a:defRPr>
+                </a:pPr>
+                <a:endParaRPr lang="en-US"/>
+              </a:p>
+            </c:txPr>
+            <c:dLblPos val="inEnd"/>
+            <c:showLegendKey val="0"/>
+            <c:showVal val="1"/>
+            <c:showCatName val="0"/>
+            <c:showSerName val="0"/>
+            <c:showPercent val="0"/>
+            <c:showBubbleSize val="0"/>
+            <c:showLeaderLines val="1"/>
+            <c:leaderLines>
+              <c:spPr>
+                <a:ln w="9525" cap="flat" cmpd="sng" algn="ctr">
+                  <a:solidFill>
+                    <a:schemeClr val="tx1">
+                      <a:lumMod val="35000"/>
+                      <a:lumOff val="65000"/>
+                    </a:schemeClr>
+                  </a:solidFill>
+                  <a:round/>
+                </a:ln>
+                <a:effectLst/>
+              </c:spPr>
+            </c:leaderLines>
+            <c:extLst>
+              <c:ext xmlns:c15="http://schemas.microsoft.com/office/drawing/2012/chart" uri="{CE6537A1-D6FC-4f65-9D91-7224C49458BB}">
+                <c15:layout/>
+              </c:ext>
+            </c:extLst>
+          </c:dLbls>
           <c:cat>
             <c:strRef>
               <c:f>Sheet1!$A$2:$A$5</c:f>
@@ -1181,6 +1346,61 @@
               <a:effectLst/>
             </c:spPr>
           </c:dPt>
+          <c:dLbls>
+            <c:spPr>
+              <a:noFill/>
+              <a:ln>
+                <a:noFill/>
+              </a:ln>
+              <a:effectLst/>
+            </c:spPr>
+            <c:txPr>
+              <a:bodyPr rot="0" spcFirstLastPara="1" vertOverflow="ellipsis" vert="horz" wrap="square" lIns="38100" tIns="19050" rIns="38100" bIns="19050" anchor="ctr" anchorCtr="1">
+                <a:spAutoFit/>
+              </a:bodyPr>
+              <a:lstStyle/>
+              <a:p>
+                <a:pPr>
+                  <a:defRPr sz="2000" b="1" i="0" u="none" strike="noStrike" kern="1200" baseline="0">
+                    <a:solidFill>
+                      <a:srgbClr val="ECF0F1"/>
+                    </a:solidFill>
+                    <a:latin typeface="Helvetica" charset="0"/>
+                    <a:ea typeface="Helvetica" charset="0"/>
+                    <a:cs typeface="Helvetica" charset="0"/>
+                  </a:defRPr>
+                </a:pPr>
+                <a:endParaRPr lang="en-US"/>
+              </a:p>
+            </c:txPr>
+            <c:dLblPos val="inEnd"/>
+            <c:showLegendKey val="0"/>
+            <c:showVal val="1"/>
+            <c:showCatName val="0"/>
+            <c:showSerName val="0"/>
+            <c:showPercent val="0"/>
+            <c:showBubbleSize val="0"/>
+            <c:showLeaderLines val="1"/>
+            <c:leaderLines>
+              <c:spPr>
+                <a:ln w="9525" cap="flat" cmpd="sng" algn="ctr">
+                  <a:solidFill>
+                    <a:schemeClr val="tx1">
+                      <a:lumMod val="35000"/>
+                      <a:lumOff val="65000"/>
+                    </a:schemeClr>
+                  </a:solidFill>
+                  <a:round/>
+                </a:ln>
+                <a:effectLst/>
+              </c:spPr>
+            </c:leaderLines>
+            <c:extLst>
+              <c:ext xmlns:c15="http://schemas.microsoft.com/office/drawing/2012/chart" uri="{CE6537A1-D6FC-4f65-9D91-7224C49458BB}">
+                <c15:layout/>
+              </c:ext>
+            </c:extLst>
+          </c:dLbls>
           <c:cat>
             <c:strRef>
               <c:f>Sheet1!$A$2:$A$5</c:f>
@@ -4175,7 +4395,7 @@
           <a:p>
             <a:fld id="{7F7A6B22-0AC0-E647-B4AB-610E8EE21CF0}" type="datetimeFigureOut">
               <a:rPr lang="en-US" smtClean="0"/>
-              <a:t>5/22/16</a:t>
+              <a:t>5/23/16</a:t>
             </a:fld>
             <a:endParaRPr lang="en-US"/>
           </a:p>
@@ -4658,7 +4878,7 @@
           <a:p>
             <a:fld id="{180E51A3-104B-B744-9E20-3025749670C7}" type="datetimeFigureOut">
               <a:rPr lang="en-US" smtClean="0"/>
-              <a:t>5/22/16</a:t>
+              <a:t>5/23/16</a:t>
             </a:fld>
             <a:endParaRPr lang="en-US"/>
           </a:p>
@@ -4828,7 +5048,7 @@
           <a:p>
             <a:fld id="{180E51A3-104B-B744-9E20-3025749670C7}" type="datetimeFigureOut">
               <a:rPr lang="en-US" smtClean="0"/>
-              <a:t>5/22/16</a:t>
+              <a:t>5/23/16</a:t>
             </a:fld>
             <a:endParaRPr lang="en-US"/>
           </a:p>
@@ -5008,7 +5228,7 @@
           <a:p>
             <a:fld id="{180E51A3-104B-B744-9E20-3025749670C7}" type="datetimeFigureOut">
               <a:rPr lang="en-US" smtClean="0"/>
-              <a:t>5/22/16</a:t>
+              <a:t>5/23/16</a:t>
             </a:fld>
             <a:endParaRPr lang="en-US"/>
           </a:p>
@@ -5178,7 +5398,7 @@
           <a:p>
             <a:fld id="{180E51A3-104B-B744-9E20-3025749670C7}" type="datetimeFigureOut">
               <a:rPr lang="en-US" smtClean="0"/>
-              <a:t>5/22/16</a:t>
+              <a:t>5/23/16</a:t>
             </a:fld>
             <a:endParaRPr lang="en-US"/>
           </a:p>
@@ -5422,7 +5642,7 @@
           <a:p>
             <a:fld id="{180E51A3-104B-B744-9E20-3025749670C7}" type="datetimeFigureOut">
               <a:rPr lang="en-US" smtClean="0"/>
-              <a:t>5/22/16</a:t>
+              <a:t>5/23/16</a:t>
             </a:fld>
             <a:endParaRPr lang="en-US"/>
           </a:p>
@@ -5654,7 +5874,7 @@
           <a:p>
             <a:fld id="{180E51A3-104B-B744-9E20-3025749670C7}" type="datetimeFigureOut">
               <a:rPr lang="en-US" smtClean="0"/>
-              <a:t>5/22/16</a:t>
+              <a:t>5/23/16</a:t>
             </a:fld>
             <a:endParaRPr lang="en-US"/>
           </a:p>
@@ -6021,7 +6241,7 @@
           <a:p>
             <a:fld id="{180E51A3-104B-B744-9E20-3025749670C7}" type="datetimeFigureOut">
               <a:rPr lang="en-US" smtClean="0"/>
-              <a:t>5/22/16</a:t>
+              <a:t>5/23/16</a:t>
             </a:fld>
             <a:endParaRPr lang="en-US"/>
           </a:p>
@@ -6139,7 +6359,7 @@
           <a:p>
             <a:fld id="{180E51A3-104B-B744-9E20-3025749670C7}" type="datetimeFigureOut">
               <a:rPr lang="en-US" smtClean="0"/>
-              <a:t>5/22/16</a:t>
+              <a:t>5/23/16</a:t>
             </a:fld>
             <a:endParaRPr lang="en-US"/>
           </a:p>
@@ -6234,7 +6454,7 @@
           <a:p>
             <a:fld id="{180E51A3-104B-B744-9E20-3025749670C7}" type="datetimeFigureOut">
               <a:rPr lang="en-US" smtClean="0"/>
-              <a:t>5/22/16</a:t>
+              <a:t>5/23/16</a:t>
             </a:fld>
             <a:endParaRPr lang="en-US"/>
           </a:p>
@@ -6511,7 +6731,7 @@
           <a:p>
             <a:fld id="{180E51A3-104B-B744-9E20-3025749670C7}" type="datetimeFigureOut">
               <a:rPr lang="en-US" smtClean="0"/>
-              <a:t>5/22/16</a:t>
+              <a:t>5/23/16</a:t>
             </a:fld>
             <a:endParaRPr lang="en-US"/>
           </a:p>
@@ -6768,7 +6988,7 @@
           <a:p>
             <a:fld id="{180E51A3-104B-B744-9E20-3025749670C7}" type="datetimeFigureOut">
               <a:rPr lang="en-US" smtClean="0"/>
-              <a:t>5/22/16</a:t>
+              <a:t>5/23/16</a:t>
             </a:fld>
             <a:endParaRPr lang="en-US"/>
           </a:p>
@@ -6981,7 +7201,7 @@
           <a:p>
             <a:fld id="{180E51A3-104B-B744-9E20-3025749670C7}" type="datetimeFigureOut">
               <a:rPr lang="en-US" smtClean="0"/>
-              <a:t>5/22/16</a:t>
+              <a:t>5/23/16</a:t>
             </a:fld>
             <a:endParaRPr lang="en-US"/>
           </a:p>
@@ -7401,13 +7621,13 @@
           <p:nvPr>
             <p:extLst>
               <p:ext uri="{D42A27DB-BD31-4B8C-83A1-F6EECF244321}">
-                <p14:modId xmlns:p14="http://schemas.microsoft.com/office/powerpoint/2010/main" val="1250036488"/>
+                <p14:modId xmlns:p14="http://schemas.microsoft.com/office/powerpoint/2010/main" val="1455660182"/>
               </p:ext>
             </p:extLst>
           </p:nvPr>
         </p:nvGraphicFramePr>
         <p:xfrm>
-          <a:off x="10551705" y="7464706"/>
+          <a:off x="10551705" y="8836305"/>
           <a:ext cx="6124196" cy="6074228"/>
         </p:xfrm>
         <a:graphic>
@@ -8189,7 +8409,7 @@
         </p:nvSpPr>
         <p:spPr>
           <a:xfrm>
-            <a:off x="9169400" y="14200742"/>
+            <a:off x="9169400" y="16057247"/>
             <a:ext cx="20142200" cy="2797606"/>
           </a:xfrm>
           <a:prstGeom prst="rect">
@@ -8263,7 +8483,7 @@
         </p:nvSpPr>
         <p:spPr>
           <a:xfrm>
-            <a:off x="18598896" y="36880775"/>
+            <a:off x="18598896" y="28762015"/>
             <a:ext cx="10753344" cy="2428274"/>
           </a:xfrm>
           <a:prstGeom prst="rect">
@@ -8330,7 +8550,7 @@
         </p:nvSpPr>
         <p:spPr>
           <a:xfrm>
-            <a:off x="24790416" y="32479905"/>
+            <a:off x="24790416" y="24361145"/>
             <a:ext cx="3555983" cy="2279003"/>
           </a:xfrm>
           <a:prstGeom prst="rect">
@@ -8445,13 +8665,13 @@
           <p:nvPr>
             <p:extLst>
               <p:ext uri="{D42A27DB-BD31-4B8C-83A1-F6EECF244321}">
-                <p14:modId xmlns:p14="http://schemas.microsoft.com/office/powerpoint/2010/main" val="238791985"/>
+                <p14:modId xmlns:p14="http://schemas.microsoft.com/office/powerpoint/2010/main" val="535762064"/>
               </p:ext>
             </p:extLst>
           </p:nvPr>
         </p:nvGraphicFramePr>
         <p:xfrm>
-          <a:off x="9287410" y="32641599"/>
+          <a:off x="9287410" y="24522839"/>
           <a:ext cx="6128143" cy="5286086"/>
         </p:xfrm>
         <a:graphic>
@@ -10240,7 +10460,7 @@
         </p:nvSpPr>
         <p:spPr>
           <a:xfrm>
-            <a:off x="15605051" y="31664998"/>
+            <a:off x="15605051" y="23546238"/>
             <a:ext cx="7696199" cy="2797606"/>
           </a:xfrm>
           <a:prstGeom prst="rect">
@@ -10317,7 +10537,7 @@
         </p:nvSpPr>
         <p:spPr>
           <a:xfrm>
-            <a:off x="26575674" y="32403705"/>
+            <a:off x="26575674" y="24284945"/>
             <a:ext cx="2735926" cy="2668340"/>
           </a:xfrm>
           <a:prstGeom prst="rect">
@@ -10461,7 +10681,7 @@
         </p:nvSpPr>
         <p:spPr>
           <a:xfrm>
-            <a:off x="24150484" y="31789714"/>
+            <a:off x="24150484" y="23670954"/>
             <a:ext cx="4535567" cy="858614"/>
           </a:xfrm>
           <a:prstGeom prst="rect">
@@ -10513,7 +10733,7 @@
         </p:nvSpPr>
         <p:spPr>
           <a:xfrm>
-            <a:off x="9166831" y="31684483"/>
+            <a:off x="9166831" y="23565723"/>
             <a:ext cx="4013200" cy="858614"/>
           </a:xfrm>
           <a:prstGeom prst="rect">
@@ -10565,7 +10785,7 @@
         </p:nvSpPr>
         <p:spPr>
           <a:xfrm rot="10800000">
-            <a:off x="9079107" y="16952687"/>
+            <a:off x="9079107" y="18227301"/>
             <a:ext cx="20363688" cy="457200"/>
           </a:xfrm>
           <a:prstGeom prst="rect">
@@ -10661,7 +10881,7 @@
         </p:nvSpPr>
         <p:spPr>
           <a:xfrm>
-            <a:off x="16310973" y="35285345"/>
+            <a:off x="16310973" y="27166585"/>
             <a:ext cx="7696199" cy="1320279"/>
           </a:xfrm>
           <a:prstGeom prst="rect">
@@ -10738,7 +10958,7 @@
         </p:nvSpPr>
         <p:spPr>
           <a:xfrm>
-            <a:off x="9231086" y="26749371"/>
+            <a:off x="9203376" y="18713734"/>
             <a:ext cx="20073257" cy="1689611"/>
           </a:xfrm>
           <a:prstGeom prst="rect">
@@ -10815,8 +11035,8 @@
         </p:nvSpPr>
         <p:spPr>
           <a:xfrm rot="10800000">
-            <a:off x="9143999" y="13737075"/>
-            <a:ext cx="20146397" cy="544984"/>
+            <a:off x="9251439" y="15369637"/>
+            <a:ext cx="20146397" cy="685800"/>
           </a:xfrm>
           <a:prstGeom prst="rect">
             <a:avLst/>
@@ -10864,13 +11084,13 @@
           <p:nvPr>
             <p:extLst>
               <p:ext uri="{D42A27DB-BD31-4B8C-83A1-F6EECF244321}">
-                <p14:modId xmlns:p14="http://schemas.microsoft.com/office/powerpoint/2010/main" val="1877439299"/>
+                <p14:modId xmlns:p14="http://schemas.microsoft.com/office/powerpoint/2010/main" val="1477048883"/>
               </p:ext>
             </p:extLst>
           </p:nvPr>
         </p:nvGraphicFramePr>
         <p:xfrm>
-          <a:off x="9245925" y="29474750"/>
+          <a:off x="9245925" y="21023477"/>
           <a:ext cx="20134211" cy="1747520"/>
         </p:xfrm>
         <a:graphic>
@@ -15058,7 +15278,7 @@
         </p:nvSpPr>
         <p:spPr>
           <a:xfrm rot="10800000">
-            <a:off x="9079107" y="29191857"/>
+            <a:off x="9079107" y="20491203"/>
             <a:ext cx="20363688" cy="228600"/>
           </a:xfrm>
           <a:prstGeom prst="rect">
@@ -15106,7 +15326,7 @@
         </p:nvSpPr>
         <p:spPr>
           <a:xfrm rot="10800000">
-            <a:off x="9142794" y="31309356"/>
+            <a:off x="9142794" y="23190596"/>
             <a:ext cx="20363688" cy="457200"/>
           </a:xfrm>
           <a:prstGeom prst="rect">
@@ -15154,7 +15374,7 @@
         </p:nvSpPr>
         <p:spPr>
           <a:xfrm>
-            <a:off x="984297" y="14192109"/>
+            <a:off x="956588" y="14108982"/>
             <a:ext cx="7749673" cy="1631133"/>
           </a:xfrm>
           <a:prstGeom prst="rect">
@@ -15276,13 +15496,6 @@
               </a:rPr>
               <a:t>One Year of DRS Activity</a:t>
             </a:r>
-            <a:endParaRPr lang="en-US" sz="3600" dirty="0" smtClean="0">
-              <a:solidFill>
-                <a:srgbClr val="2C3E50"/>
-              </a:solidFill>
-              <a:latin typeface="Gotham Medium"/>
-              <a:cs typeface="Gotham Medium"/>
-            </a:endParaRPr>
           </a:p>
           <a:p>
             <a:pPr algn="just">
@@ -15511,53 +15724,6 @@
       </p:sp>
       <p:sp>
         <p:nvSpPr>
-          <p:cNvPr id="48" name="Rectangle 47"/>
-          <p:cNvSpPr/>
-          <p:nvPr/>
-        </p:nvSpPr>
-        <p:spPr>
-          <a:xfrm>
-            <a:off x="9171214" y="16998042"/>
-            <a:ext cx="20046043" cy="12393388"/>
-          </a:xfrm>
-          <a:prstGeom prst="rect">
-            <a:avLst/>
-          </a:prstGeom>
-          <a:noFill/>
-          <a:ln w="12700">
-            <a:solidFill>
-              <a:srgbClr val="FFFF00"/>
-            </a:solidFill>
-            <a:prstDash val="dash"/>
-          </a:ln>
-        </p:spPr>
-        <p:style>
-          <a:lnRef idx="2">
-            <a:schemeClr val="accent1">
-              <a:shade val="50000"/>
-            </a:schemeClr>
-          </a:lnRef>
-          <a:fillRef idx="1">
-            <a:schemeClr val="accent1"/>
-          </a:fillRef>
-          <a:effectRef idx="0">
-            <a:schemeClr val="accent1"/>
-          </a:effectRef>
-          <a:fontRef idx="minor">
-            <a:schemeClr val="lt1"/>
-          </a:fontRef>
-        </p:style>
-        <p:txBody>
-          <a:bodyPr rtlCol="0" anchor="ctr"/>
-          <a:lstStyle/>
-          <a:p>
-            <a:pPr algn="ctr"/>
-            <a:endParaRPr lang="en-US"/>
-          </a:p>
-        </p:txBody>
-      </p:sp>
-      <p:sp>
-        <p:nvSpPr>
           <p:cNvPr id="49" name="Rectangle 48"/>
           <p:cNvSpPr/>
           <p:nvPr/>
@@ -15611,7 +15777,7 @@
         </p:nvSpPr>
         <p:spPr>
           <a:xfrm>
-            <a:off x="14020801" y="6086687"/>
+            <a:off x="14020801" y="6543885"/>
             <a:ext cx="10689771" cy="858614"/>
           </a:xfrm>
           <a:prstGeom prst="rect">
@@ -15663,7 +15829,7 @@
         </p:nvSpPr>
         <p:spPr>
           <a:xfrm>
-            <a:off x="10646001" y="7846662"/>
+            <a:off x="10368911" y="8179170"/>
             <a:ext cx="1464356" cy="523220"/>
           </a:xfrm>
           <a:prstGeom prst="rect">
@@ -15693,7 +15859,7 @@
         </p:nvSpPr>
         <p:spPr>
           <a:xfrm>
-            <a:off x="10296751" y="7933973"/>
+            <a:off x="10019661" y="8266481"/>
             <a:ext cx="365760" cy="365760"/>
           </a:xfrm>
           <a:prstGeom prst="rect">
@@ -15741,7 +15907,7 @@
         </p:nvSpPr>
         <p:spPr>
           <a:xfrm>
-            <a:off x="10684781" y="7266825"/>
+            <a:off x="10407691" y="7599333"/>
             <a:ext cx="1042987" cy="523220"/>
           </a:xfrm>
           <a:prstGeom prst="rect">
@@ -15771,7 +15937,7 @@
         </p:nvSpPr>
         <p:spPr>
           <a:xfrm>
-            <a:off x="10317387" y="7346880"/>
+            <a:off x="10040297" y="7679388"/>
             <a:ext cx="365760" cy="365760"/>
           </a:xfrm>
           <a:prstGeom prst="rect">
@@ -15818,13 +15984,13 @@
           <p:nvPr>
             <p:extLst>
               <p:ext uri="{D42A27DB-BD31-4B8C-83A1-F6EECF244321}">
-                <p14:modId xmlns:p14="http://schemas.microsoft.com/office/powerpoint/2010/main" val="530735215"/>
+                <p14:modId xmlns:p14="http://schemas.microsoft.com/office/powerpoint/2010/main" val="1146972250"/>
               </p:ext>
             </p:extLst>
           </p:nvPr>
         </p:nvGraphicFramePr>
         <p:xfrm>
-          <a:off x="15010682" y="7469642"/>
+          <a:off x="15010682" y="8841241"/>
           <a:ext cx="8627911" cy="6019800"/>
         </p:xfrm>
         <a:graphic>
@@ -15840,13 +16006,13 @@
           <p:nvPr>
             <p:extLst>
               <p:ext uri="{D42A27DB-BD31-4B8C-83A1-F6EECF244321}">
-                <p14:modId xmlns:p14="http://schemas.microsoft.com/office/powerpoint/2010/main" val="1567172514"/>
+                <p14:modId xmlns:p14="http://schemas.microsoft.com/office/powerpoint/2010/main" val="1349390278"/>
               </p:ext>
             </p:extLst>
           </p:nvPr>
         </p:nvGraphicFramePr>
         <p:xfrm>
-          <a:off x="21107736" y="7473062"/>
+          <a:off x="21107736" y="8844661"/>
           <a:ext cx="8627911" cy="6019800"/>
         </p:xfrm>
         <a:graphic>
@@ -15862,7 +16028,7 @@
           <p:nvPr>
             <p:extLst>
               <p:ext uri="{D42A27DB-BD31-4B8C-83A1-F6EECF244321}">
-                <p14:modId xmlns:p14="http://schemas.microsoft.com/office/powerpoint/2010/main" val="586296831"/>
+                <p14:modId xmlns:p14="http://schemas.microsoft.com/office/powerpoint/2010/main" val="1137223833"/>
               </p:ext>
             </p:extLst>
           </p:nvPr>
@@ -15906,6 +16072,54 @@
           </a:prstGeom>
         </p:spPr>
       </p:pic>
+      <p:sp>
+        <p:nvSpPr>
+          <p:cNvPr id="51" name="Rectangle 50"/>
+          <p:cNvSpPr/>
+          <p:nvPr/>
+        </p:nvSpPr>
+        <p:spPr>
+          <a:xfrm rot="10800000">
+            <a:off x="955961" y="13418127"/>
+            <a:ext cx="7800111" cy="685800"/>
+          </a:xfrm>
+          <a:prstGeom prst="rect">
+            <a:avLst/>
+          </a:prstGeom>
+          <a:solidFill>
+            <a:srgbClr val="1C2939"/>
+          </a:solidFill>
+          <a:ln>
+            <a:noFill/>
+          </a:ln>
+          <a:effectLst/>
+        </p:spPr>
+        <p:style>
+          <a:lnRef idx="1">
+            <a:schemeClr val="accent1"/>
+          </a:lnRef>
+          <a:fillRef idx="3">
+            <a:schemeClr val="accent1"/>
+          </a:fillRef>
+          <a:effectRef idx="2">
+            <a:schemeClr val="accent1"/>
+          </a:effectRef>
+          <a:fontRef idx="minor">
+            <a:schemeClr val="lt1"/>
+          </a:fontRef>
+        </p:style>
+        <p:txBody>
+          <a:bodyPr lIns="329104" tIns="164551" rIns="329104" bIns="164551" rtlCol="0" anchor="ctr"/>
+          <a:lstStyle/>
+          <a:p>
+            <a:pPr algn="ctr"/>
+            <a:endParaRPr lang="en-US">
+              <a:latin typeface="Helvetica"/>
+              <a:cs typeface="Helvetica"/>
+            </a:endParaRPr>
+          </a:p>
+        </p:txBody>
+      </p:sp>
     </p:spTree>
     <p:extLst>
       <p:ext uri="{BB962C8B-B14F-4D97-AF65-F5344CB8AC3E}">

</xml_diff>

<commit_message>
Final BLC update and another OR revision
</commit_message>
<xml_diff>
--- a/Presentations/Open Repositories 2016/Statistics/SweeneySarahORstatistics33x46.pptx
+++ b/Presentations/Open Repositories 2016/Statistics/SweeneySarahORstatistics33x46.pptx
@@ -438,250 +438,6 @@
   </mc:AlternateContent>
   <c:chart>
     <c:title>
-      <c:layout/>
-      <c:overlay val="0"/>
-      <c:spPr>
-        <a:noFill/>
-        <a:ln>
-          <a:noFill/>
-        </a:ln>
-        <a:effectLst/>
-      </c:spPr>
-      <c:txPr>
-        <a:bodyPr rot="0" spcFirstLastPara="1" vertOverflow="ellipsis" vert="horz" wrap="square" anchor="ctr" anchorCtr="1"/>
-        <a:lstStyle/>
-        <a:p>
-          <a:pPr>
-            <a:defRPr sz="1862" b="0" i="0" u="none" strike="noStrike" kern="1200" spc="0" baseline="0">
-              <a:solidFill>
-                <a:schemeClr val="tx1">
-                  <a:lumMod val="65000"/>
-                  <a:lumOff val="35000"/>
-                </a:schemeClr>
-              </a:solidFill>
-              <a:latin typeface="+mn-lt"/>
-              <a:ea typeface="+mn-ea"/>
-              <a:cs typeface="+mn-cs"/>
-            </a:defRPr>
-          </a:pPr>
-          <a:endParaRPr lang="en-US"/>
-        </a:p>
-      </c:txPr>
-    </c:title>
-    <c:autoTitleDeleted val="0"/>
-    <c:plotArea>
-      <c:layout/>
-      <c:pieChart>
-        <c:varyColors val="1"/>
-        <c:ser>
-          <c:idx val="0"/>
-          <c:order val="0"/>
-          <c:tx>
-            <c:strRef>
-              <c:f>Sheet1!$B$1</c:f>
-              <c:strCache>
-                <c:ptCount val="1"/>
-                <c:pt idx="0">
-                  <c:v>Sales</c:v>
-                </c:pt>
-              </c:strCache>
-            </c:strRef>
-          </c:tx>
-          <c:dPt>
-            <c:idx val="0"/>
-            <c:bubble3D val="0"/>
-            <c:spPr>
-              <a:solidFill>
-                <a:schemeClr val="accent1"/>
-              </a:solidFill>
-              <a:ln w="19050">
-                <a:solidFill>
-                  <a:schemeClr val="lt1"/>
-                </a:solidFill>
-              </a:ln>
-              <a:effectLst/>
-            </c:spPr>
-          </c:dPt>
-          <c:dPt>
-            <c:idx val="1"/>
-            <c:bubble3D val="0"/>
-            <c:spPr>
-              <a:solidFill>
-                <a:schemeClr val="accent2"/>
-              </a:solidFill>
-              <a:ln w="19050">
-                <a:solidFill>
-                  <a:schemeClr val="lt1"/>
-                </a:solidFill>
-              </a:ln>
-              <a:effectLst/>
-            </c:spPr>
-          </c:dPt>
-          <c:dPt>
-            <c:idx val="2"/>
-            <c:bubble3D val="0"/>
-            <c:spPr>
-              <a:solidFill>
-                <a:schemeClr val="accent3"/>
-              </a:solidFill>
-              <a:ln w="19050">
-                <a:solidFill>
-                  <a:schemeClr val="lt1"/>
-                </a:solidFill>
-              </a:ln>
-              <a:effectLst/>
-            </c:spPr>
-          </c:dPt>
-          <c:dPt>
-            <c:idx val="3"/>
-            <c:bubble3D val="0"/>
-            <c:spPr>
-              <a:solidFill>
-                <a:schemeClr val="accent4"/>
-              </a:solidFill>
-              <a:ln w="19050">
-                <a:solidFill>
-                  <a:schemeClr val="lt1"/>
-                </a:solidFill>
-              </a:ln>
-              <a:effectLst/>
-            </c:spPr>
-          </c:dPt>
-          <c:cat>
-            <c:strRef>
-              <c:f>Sheet1!$A$2:$A$5</c:f>
-              <c:strCache>
-                <c:ptCount val="4"/>
-                <c:pt idx="0">
-                  <c:v>1st Qtr</c:v>
-                </c:pt>
-                <c:pt idx="1">
-                  <c:v>2nd Qtr</c:v>
-                </c:pt>
-                <c:pt idx="2">
-                  <c:v>3rd Qtr</c:v>
-                </c:pt>
-                <c:pt idx="3">
-                  <c:v>4th Qtr</c:v>
-                </c:pt>
-              </c:strCache>
-            </c:strRef>
-          </c:cat>
-          <c:val>
-            <c:numRef>
-              <c:f>Sheet1!$B$2:$B$5</c:f>
-              <c:numCache>
-                <c:formatCode>General</c:formatCode>
-                <c:ptCount val="4"/>
-                <c:pt idx="0">
-                  <c:v>8.2</c:v>
-                </c:pt>
-                <c:pt idx="1">
-                  <c:v>3.2</c:v>
-                </c:pt>
-                <c:pt idx="2">
-                  <c:v>1.4</c:v>
-                </c:pt>
-                <c:pt idx="3">
-                  <c:v>1.2</c:v>
-                </c:pt>
-              </c:numCache>
-            </c:numRef>
-          </c:val>
-        </c:ser>
-        <c:dLbls>
-          <c:showLegendKey val="0"/>
-          <c:showVal val="0"/>
-          <c:showCatName val="0"/>
-          <c:showSerName val="0"/>
-          <c:showPercent val="0"/>
-          <c:showBubbleSize val="0"/>
-          <c:showLeaderLines val="1"/>
-        </c:dLbls>
-        <c:firstSliceAng val="0"/>
-      </c:pieChart>
-      <c:spPr>
-        <a:noFill/>
-        <a:ln>
-          <a:noFill/>
-        </a:ln>
-        <a:effectLst/>
-      </c:spPr>
-    </c:plotArea>
-    <c:legend>
-      <c:legendPos val="b"/>
-      <c:layout/>
-      <c:overlay val="0"/>
-      <c:spPr>
-        <a:noFill/>
-        <a:ln>
-          <a:noFill/>
-        </a:ln>
-        <a:effectLst/>
-      </c:spPr>
-      <c:txPr>
-        <a:bodyPr rot="0" spcFirstLastPara="1" vertOverflow="ellipsis" vert="horz" wrap="square" anchor="ctr" anchorCtr="1"/>
-        <a:lstStyle/>
-        <a:p>
-          <a:pPr>
-            <a:defRPr sz="1197" b="0" i="0" u="none" strike="noStrike" kern="1200" baseline="0">
-              <a:solidFill>
-                <a:schemeClr val="tx1">
-                  <a:lumMod val="65000"/>
-                  <a:lumOff val="35000"/>
-                </a:schemeClr>
-              </a:solidFill>
-              <a:latin typeface="+mn-lt"/>
-              <a:ea typeface="+mn-ea"/>
-              <a:cs typeface="+mn-cs"/>
-            </a:defRPr>
-          </a:pPr>
-          <a:endParaRPr lang="en-US"/>
-        </a:p>
-      </c:txPr>
-    </c:legend>
-    <c:plotVisOnly val="1"/>
-    <c:dispBlanksAs val="gap"/>
-    <c:showDLblsOverMax val="0"/>
-  </c:chart>
-  <c:spPr>
-    <a:noFill/>
-    <a:ln>
-      <a:noFill/>
-    </a:ln>
-    <a:effectLst/>
-  </c:spPr>
-  <c:txPr>
-    <a:bodyPr/>
-    <a:lstStyle/>
-    <a:p>
-      <a:pPr>
-        <a:defRPr/>
-      </a:pPr>
-      <a:endParaRPr lang="en-US"/>
-    </a:p>
-  </c:txPr>
-  <c:externalData r:id="rId3">
-    <c:autoUpdate val="0"/>
-  </c:externalData>
-</c:chartSpace>
-</file>
-
-<file path=ppt/charts/chart3.xml><?xml version="1.0" encoding="utf-8"?>
-<c:chartSpace xmlns:c="http://schemas.openxmlformats.org/drawingml/2006/chart" xmlns:a="http://schemas.openxmlformats.org/drawingml/2006/main" xmlns:r="http://schemas.openxmlformats.org/officeDocument/2006/relationships">
-  <c:date1904 val="0"/>
-  <c:lang val="en-US"/>
-  <c:roundedCorners val="0"/>
-  <mc:AlternateContent xmlns:mc="http://schemas.openxmlformats.org/markup-compatibility/2006">
-    <mc:Choice xmlns:c14="http://schemas.microsoft.com/office/drawing/2007/8/2/chart" Requires="c14">
-      <c14:style val="102"/>
-    </mc:Choice>
-    <mc:Fallback>
-      <c:style val="2"/>
-    </mc:Fallback>
-  </mc:AlternateContent>
-  <c:chart>
-    <c:title>
       <c:tx>
         <c:rich>
           <a:bodyPr rot="0" spcFirstLastPara="1" vertOverflow="ellipsis" vert="horz" wrap="square" anchor="ctr" anchorCtr="1"/>
@@ -963,7 +719,7 @@
 </c:chartSpace>
 </file>
 
-<file path=ppt/charts/chart4.xml><?xml version="1.0" encoding="utf-8"?>
+<file path=ppt/charts/chart3.xml><?xml version="1.0" encoding="utf-8"?>
 <c:chartSpace xmlns:c="http://schemas.openxmlformats.org/drawingml/2006/chart" xmlns:a="http://schemas.openxmlformats.org/drawingml/2006/main" xmlns:r="http://schemas.openxmlformats.org/officeDocument/2006/relationships">
   <c:date1904 val="0"/>
   <c:lang val="en-US"/>
@@ -1251,7 +1007,7 @@
 </c:chartSpace>
 </file>
 
-<file path=ppt/charts/chart5.xml><?xml version="1.0" encoding="utf-8"?>
+<file path=ppt/charts/chart4.xml><?xml version="1.0" encoding="utf-8"?>
 <c:chartSpace xmlns:c="http://schemas.openxmlformats.org/drawingml/2006/chart" xmlns:a="http://schemas.openxmlformats.org/drawingml/2006/main" xmlns:r="http://schemas.openxmlformats.org/officeDocument/2006/relationships">
   <c:date1904 val="0"/>
   <c:lang val="en-US"/>
@@ -1642,46 +1398,6 @@
 </file>
 
 <file path=ppt/charts/colors4.xml><?xml version="1.0" encoding="utf-8"?>
-<cs:colorStyle xmlns:cs="http://schemas.microsoft.com/office/drawing/2012/chartStyle" xmlns:a="http://schemas.openxmlformats.org/drawingml/2006/main" meth="cycle" id="10">
-  <a:schemeClr val="accent1"/>
-  <a:schemeClr val="accent2"/>
-  <a:schemeClr val="accent3"/>
-  <a:schemeClr val="accent4"/>
-  <a:schemeClr val="accent5"/>
-  <a:schemeClr val="accent6"/>
-  <cs:variation/>
-  <cs:variation>
-    <a:lumMod val="60000"/>
-  </cs:variation>
-  <cs:variation>
-    <a:lumMod val="80000"/>
-    <a:lumOff val="20000"/>
-  </cs:variation>
-  <cs:variation>
-    <a:lumMod val="80000"/>
-  </cs:variation>
-  <cs:variation>
-    <a:lumMod val="60000"/>
-    <a:lumOff val="40000"/>
-  </cs:variation>
-  <cs:variation>
-    <a:lumMod val="50000"/>
-  </cs:variation>
-  <cs:variation>
-    <a:lumMod val="70000"/>
-    <a:lumOff val="30000"/>
-  </cs:variation>
-  <cs:variation>
-    <a:lumMod val="70000"/>
-  </cs:variation>
-  <cs:variation>
-    <a:lumMod val="50000"/>
-    <a:lumOff val="50000"/>
-  </cs:variation>
-</cs:colorStyle>
-</file>
-
-<file path=ppt/charts/colors5.xml><?xml version="1.0" encoding="utf-8"?>
 <cs:colorStyle xmlns:cs="http://schemas.microsoft.com/office/drawing/2012/chartStyle" xmlns:a="http://schemas.openxmlformats.org/drawingml/2006/main" meth="cycle" id="12">
   <a:schemeClr val="accent2"/>
   <a:schemeClr val="accent4"/>
@@ -3794,525 +3510,6 @@
 </cs:chartStyle>
 </file>
 
-<file path=ppt/charts/style5.xml><?xml version="1.0" encoding="utf-8"?>
-<cs:chartStyle xmlns:cs="http://schemas.microsoft.com/office/drawing/2012/chartStyle" xmlns:a="http://schemas.openxmlformats.org/drawingml/2006/main" id="251">
-  <cs:axisTitle>
-    <cs:lnRef idx="0"/>
-    <cs:fillRef idx="0"/>
-    <cs:effectRef idx="0"/>
-    <cs:fontRef idx="minor">
-      <a:schemeClr val="tx1">
-        <a:lumMod val="65000"/>
-        <a:lumOff val="35000"/>
-      </a:schemeClr>
-    </cs:fontRef>
-    <cs:defRPr sz="1330" kern="1200"/>
-  </cs:axisTitle>
-  <cs:categoryAxis>
-    <cs:lnRef idx="0"/>
-    <cs:fillRef idx="0"/>
-    <cs:effectRef idx="0"/>
-    <cs:fontRef idx="minor">
-      <a:schemeClr val="tx1">
-        <a:lumMod val="65000"/>
-        <a:lumOff val="35000"/>
-      </a:schemeClr>
-    </cs:fontRef>
-    <cs:spPr>
-      <a:ln w="9525" cap="flat" cmpd="sng" algn="ctr">
-        <a:solidFill>
-          <a:schemeClr val="tx1">
-            <a:lumMod val="15000"/>
-            <a:lumOff val="85000"/>
-          </a:schemeClr>
-        </a:solidFill>
-        <a:round/>
-      </a:ln>
-    </cs:spPr>
-    <cs:defRPr sz="1197" kern="1200"/>
-  </cs:categoryAxis>
-  <cs:chartArea mods="allowNoFillOverride allowNoLineOverride">
-    <cs:lnRef idx="0"/>
-    <cs:fillRef idx="0"/>
-    <cs:effectRef idx="0"/>
-    <cs:fontRef idx="minor">
-      <a:schemeClr val="tx1"/>
-    </cs:fontRef>
-    <cs:spPr>
-      <a:solidFill>
-        <a:schemeClr val="bg1"/>
-      </a:solidFill>
-      <a:ln w="9525" cap="flat" cmpd="sng" algn="ctr">
-        <a:solidFill>
-          <a:schemeClr val="tx1">
-            <a:lumMod val="15000"/>
-            <a:lumOff val="85000"/>
-          </a:schemeClr>
-        </a:solidFill>
-        <a:round/>
-      </a:ln>
-    </cs:spPr>
-    <cs:defRPr sz="1197" kern="1200"/>
-  </cs:chartArea>
-  <cs:dataLabel>
-    <cs:lnRef idx="0"/>
-    <cs:fillRef idx="0"/>
-    <cs:effectRef idx="0"/>
-    <cs:fontRef idx="minor">
-      <a:schemeClr val="tx1">
-        <a:lumMod val="75000"/>
-        <a:lumOff val="25000"/>
-      </a:schemeClr>
-    </cs:fontRef>
-    <cs:defRPr sz="1197" kern="1200"/>
-  </cs:dataLabel>
-  <cs:dataLabelCallout>
-    <cs:lnRef idx="0"/>
-    <cs:fillRef idx="0"/>
-    <cs:effectRef idx="0"/>
-    <cs:fontRef idx="minor">
-      <a:schemeClr val="dk1">
-        <a:lumMod val="65000"/>
-        <a:lumOff val="35000"/>
-      </a:schemeClr>
-    </cs:fontRef>
-    <cs:spPr>
-      <a:solidFill>
-        <a:schemeClr val="lt1"/>
-      </a:solidFill>
-      <a:ln>
-        <a:solidFill>
-          <a:schemeClr val="dk1">
-            <a:lumMod val="25000"/>
-            <a:lumOff val="75000"/>
-          </a:schemeClr>
-        </a:solidFill>
-      </a:ln>
-    </cs:spPr>
-    <cs:defRPr sz="1197" kern="1200"/>
-    <cs:bodyPr rot="0" spcFirstLastPara="1" vertOverflow="clip" horzOverflow="clip" vert="horz" wrap="square" lIns="36576" tIns="18288" rIns="36576" bIns="18288" anchor="ctr" anchorCtr="1">
-      <a:spAutoFit/>
-    </cs:bodyPr>
-  </cs:dataLabelCallout>
-  <cs:dataPoint>
-    <cs:lnRef idx="0"/>
-    <cs:fillRef idx="1">
-      <cs:styleClr val="auto"/>
-    </cs:fillRef>
-    <cs:effectRef idx="0"/>
-    <cs:fontRef idx="minor">
-      <a:schemeClr val="tx1"/>
-    </cs:fontRef>
-    <cs:spPr>
-      <a:ln w="19050">
-        <a:solidFill>
-          <a:schemeClr val="lt1"/>
-        </a:solidFill>
-      </a:ln>
-    </cs:spPr>
-  </cs:dataPoint>
-  <cs:dataPoint3D>
-    <cs:lnRef idx="0"/>
-    <cs:fillRef idx="1">
-      <cs:styleClr val="auto"/>
-    </cs:fillRef>
-    <cs:effectRef idx="0"/>
-    <cs:fontRef idx="minor">
-      <a:schemeClr val="tx1"/>
-    </cs:fontRef>
-    <cs:spPr>
-      <a:ln w="25400">
-        <a:solidFill>
-          <a:schemeClr val="lt1"/>
-        </a:solidFill>
-      </a:ln>
-    </cs:spPr>
-  </cs:dataPoint3D>
-  <cs:dataPointLine>
-    <cs:lnRef idx="0">
-      <cs:styleClr val="auto"/>
-    </cs:lnRef>
-    <cs:fillRef idx="0"/>
-    <cs:effectRef idx="0"/>
-    <cs:fontRef idx="minor">
-      <a:schemeClr val="tx1"/>
-    </cs:fontRef>
-    <cs:spPr>
-      <a:ln w="28575" cap="rnd">
-        <a:solidFill>
-          <a:schemeClr val="phClr"/>
-        </a:solidFill>
-        <a:round/>
-      </a:ln>
-    </cs:spPr>
-  </cs:dataPointLine>
-  <cs:dataPointMarker>
-    <cs:lnRef idx="0">
-      <cs:styleClr val="auto"/>
-    </cs:lnRef>
-    <cs:fillRef idx="1">
-      <cs:styleClr val="auto"/>
-    </cs:fillRef>
-    <cs:effectRef idx="0"/>
-    <cs:fontRef idx="minor">
-      <a:schemeClr val="tx1"/>
-    </cs:fontRef>
-    <cs:spPr>
-      <a:ln w="9525">
-        <a:solidFill>
-          <a:schemeClr val="phClr"/>
-        </a:solidFill>
-      </a:ln>
-    </cs:spPr>
-  </cs:dataPointMarker>
-  <cs:dataPointMarkerLayout symbol="circle" size="5"/>
-  <cs:dataPointWireframe>
-    <cs:lnRef idx="0">
-      <cs:styleClr val="auto"/>
-    </cs:lnRef>
-    <cs:fillRef idx="0"/>
-    <cs:effectRef idx="0"/>
-    <cs:fontRef idx="minor">
-      <a:schemeClr val="tx1"/>
-    </cs:fontRef>
-    <cs:spPr>
-      <a:ln w="9525" cap="rnd">
-        <a:solidFill>
-          <a:schemeClr val="phClr"/>
-        </a:solidFill>
-        <a:round/>
-      </a:ln>
-    </cs:spPr>
-  </cs:dataPointWireframe>
-  <cs:dataTable>
-    <cs:lnRef idx="0"/>
-    <cs:fillRef idx="0"/>
-    <cs:effectRef idx="0"/>
-    <cs:fontRef idx="minor">
-      <a:schemeClr val="tx1">
-        <a:lumMod val="65000"/>
-        <a:lumOff val="35000"/>
-      </a:schemeClr>
-    </cs:fontRef>
-    <cs:spPr>
-      <a:noFill/>
-      <a:ln w="9525" cap="flat" cmpd="sng" algn="ctr">
-        <a:solidFill>
-          <a:schemeClr val="tx1">
-            <a:lumMod val="15000"/>
-            <a:lumOff val="85000"/>
-          </a:schemeClr>
-        </a:solidFill>
-        <a:round/>
-      </a:ln>
-    </cs:spPr>
-    <cs:defRPr sz="1197" kern="1200"/>
-  </cs:dataTable>
-  <cs:downBar>
-    <cs:lnRef idx="0"/>
-    <cs:fillRef idx="0"/>
-    <cs:effectRef idx="0"/>
-    <cs:fontRef idx="minor">
-      <a:schemeClr val="tx1"/>
-    </cs:fontRef>
-    <cs:spPr>
-      <a:solidFill>
-        <a:schemeClr val="dk1">
-          <a:lumMod val="75000"/>
-          <a:lumOff val="25000"/>
-        </a:schemeClr>
-      </a:solidFill>
-      <a:ln w="9525" cap="flat" cmpd="sng" algn="ctr">
-        <a:solidFill>
-          <a:schemeClr val="tx1">
-            <a:lumMod val="65000"/>
-            <a:lumOff val="35000"/>
-          </a:schemeClr>
-        </a:solidFill>
-        <a:round/>
-      </a:ln>
-    </cs:spPr>
-  </cs:downBar>
-  <cs:dropLine>
-    <cs:lnRef idx="0"/>
-    <cs:fillRef idx="0"/>
-    <cs:effectRef idx="0"/>
-    <cs:fontRef idx="minor">
-      <a:schemeClr val="tx1"/>
-    </cs:fontRef>
-    <cs:spPr>
-      <a:ln w="9525" cap="flat" cmpd="sng" algn="ctr">
-        <a:solidFill>
-          <a:schemeClr val="tx1">
-            <a:lumMod val="35000"/>
-            <a:lumOff val="65000"/>
-          </a:schemeClr>
-        </a:solidFill>
-        <a:round/>
-      </a:ln>
-    </cs:spPr>
-  </cs:dropLine>
-  <cs:errorBar>
-    <cs:lnRef idx="0"/>
-    <cs:fillRef idx="0"/>
-    <cs:effectRef idx="0"/>
-    <cs:fontRef idx="minor">
-      <a:schemeClr val="tx1"/>
-    </cs:fontRef>
-    <cs:spPr>
-      <a:ln w="9525" cap="flat" cmpd="sng" algn="ctr">
-        <a:solidFill>
-          <a:schemeClr val="tx1">
-            <a:lumMod val="65000"/>
-            <a:lumOff val="35000"/>
-          </a:schemeClr>
-        </a:solidFill>
-        <a:round/>
-      </a:ln>
-    </cs:spPr>
-  </cs:errorBar>
-  <cs:floor>
-    <cs:lnRef idx="0"/>
-    <cs:fillRef idx="0"/>
-    <cs:effectRef idx="0"/>
-    <cs:fontRef idx="minor">
-      <a:schemeClr val="tx1"/>
-    </cs:fontRef>
-    <cs:spPr>
-      <a:noFill/>
-      <a:ln>
-        <a:noFill/>
-      </a:ln>
-    </cs:spPr>
-  </cs:floor>
-  <cs:gridlineMajor>
-    <cs:lnRef idx="0"/>
-    <cs:fillRef idx="0"/>
-    <cs:effectRef idx="0"/>
-    <cs:fontRef idx="minor">
-      <a:schemeClr val="tx1"/>
-    </cs:fontRef>
-    <cs:spPr>
-      <a:ln w="9525" cap="flat" cmpd="sng" algn="ctr">
-        <a:solidFill>
-          <a:schemeClr val="tx1">
-            <a:lumMod val="15000"/>
-            <a:lumOff val="85000"/>
-          </a:schemeClr>
-        </a:solidFill>
-        <a:round/>
-      </a:ln>
-    </cs:spPr>
-  </cs:gridlineMajor>
-  <cs:gridlineMinor>
-    <cs:lnRef idx="0"/>
-    <cs:fillRef idx="0"/>
-    <cs:effectRef idx="0"/>
-    <cs:fontRef idx="minor">
-      <a:schemeClr val="tx1"/>
-    </cs:fontRef>
-    <cs:spPr>
-      <a:ln w="9525" cap="flat" cmpd="sng" algn="ctr">
-        <a:solidFill>
-          <a:schemeClr val="tx1">
-            <a:lumMod val="5000"/>
-            <a:lumOff val="95000"/>
-          </a:schemeClr>
-        </a:solidFill>
-        <a:round/>
-      </a:ln>
-    </cs:spPr>
-  </cs:gridlineMinor>
-  <cs:hiLoLine>
-    <cs:lnRef idx="0"/>
-    <cs:fillRef idx="0"/>
-    <cs:effectRef idx="0"/>
-    <cs:fontRef idx="minor">
-      <a:schemeClr val="tx1"/>
-    </cs:fontRef>
-    <cs:spPr>
-      <a:ln w="9525" cap="flat" cmpd="sng" algn="ctr">
-        <a:solidFill>
-          <a:schemeClr val="tx1">
-            <a:lumMod val="50000"/>
-            <a:lumOff val="50000"/>
-          </a:schemeClr>
-        </a:solidFill>
-        <a:round/>
-      </a:ln>
-    </cs:spPr>
-  </cs:hiLoLine>
-  <cs:leaderLine>
-    <cs:lnRef idx="0"/>
-    <cs:fillRef idx="0"/>
-    <cs:effectRef idx="0"/>
-    <cs:fontRef idx="minor">
-      <a:schemeClr val="tx1"/>
-    </cs:fontRef>
-    <cs:spPr>
-      <a:ln w="9525" cap="flat" cmpd="sng" algn="ctr">
-        <a:solidFill>
-          <a:schemeClr val="tx1">
-            <a:lumMod val="35000"/>
-            <a:lumOff val="65000"/>
-          </a:schemeClr>
-        </a:solidFill>
-        <a:round/>
-      </a:ln>
-    </cs:spPr>
-  </cs:leaderLine>
-  <cs:legend>
-    <cs:lnRef idx="0"/>
-    <cs:fillRef idx="0"/>
-    <cs:effectRef idx="0"/>
-    <cs:fontRef idx="minor">
-      <a:schemeClr val="tx1">
-        <a:lumMod val="65000"/>
-        <a:lumOff val="35000"/>
-      </a:schemeClr>
-    </cs:fontRef>
-    <cs:defRPr sz="1197" kern="1200"/>
-  </cs:legend>
-  <cs:plotArea mods="allowNoFillOverride allowNoLineOverride">
-    <cs:lnRef idx="0"/>
-    <cs:fillRef idx="0"/>
-    <cs:effectRef idx="0"/>
-    <cs:fontRef idx="minor">
-      <a:schemeClr val="tx1"/>
-    </cs:fontRef>
-  </cs:plotArea>
-  <cs:plotArea3D mods="allowNoFillOverride allowNoLineOverride">
-    <cs:lnRef idx="0"/>
-    <cs:fillRef idx="0"/>
-    <cs:effectRef idx="0"/>
-    <cs:fontRef idx="minor">
-      <a:schemeClr val="tx1"/>
-    </cs:fontRef>
-  </cs:plotArea3D>
-  <cs:seriesAxis>
-    <cs:lnRef idx="0"/>
-    <cs:fillRef idx="0"/>
-    <cs:effectRef idx="0"/>
-    <cs:fontRef idx="minor">
-      <a:schemeClr val="tx1">
-        <a:lumMod val="65000"/>
-        <a:lumOff val="35000"/>
-      </a:schemeClr>
-    </cs:fontRef>
-    <cs:defRPr sz="1197" kern="1200"/>
-  </cs:seriesAxis>
-  <cs:seriesLine>
-    <cs:lnRef idx="0"/>
-    <cs:fillRef idx="0"/>
-    <cs:effectRef idx="0"/>
-    <cs:fontRef idx="minor">
-      <a:schemeClr val="tx1"/>
-    </cs:fontRef>
-    <cs:spPr>
-      <a:ln w="9525" cap="flat" cmpd="sng" algn="ctr">
-        <a:solidFill>
-          <a:schemeClr val="tx1">
-            <a:lumMod val="35000"/>
-            <a:lumOff val="65000"/>
-          </a:schemeClr>
-        </a:solidFill>
-        <a:round/>
-      </a:ln>
-    </cs:spPr>
-  </cs:seriesLine>
-  <cs:title>
-    <cs:lnRef idx="0"/>
-    <cs:fillRef idx="0"/>
-    <cs:effectRef idx="0"/>
-    <cs:fontRef idx="minor">
-      <a:schemeClr val="tx1">
-        <a:lumMod val="65000"/>
-        <a:lumOff val="35000"/>
-      </a:schemeClr>
-    </cs:fontRef>
-    <cs:defRPr sz="1862" b="0" kern="1200" spc="0" baseline="0"/>
-  </cs:title>
-  <cs:trendline>
-    <cs:lnRef idx="0">
-      <cs:styleClr val="auto"/>
-    </cs:lnRef>
-    <cs:fillRef idx="0"/>
-    <cs:effectRef idx="0"/>
-    <cs:fontRef idx="minor">
-      <a:schemeClr val="tx1"/>
-    </cs:fontRef>
-    <cs:spPr>
-      <a:ln w="19050" cap="rnd">
-        <a:solidFill>
-          <a:schemeClr val="phClr"/>
-        </a:solidFill>
-        <a:prstDash val="sysDot"/>
-      </a:ln>
-    </cs:spPr>
-  </cs:trendline>
-  <cs:trendlineLabel>
-    <cs:lnRef idx="0"/>
-    <cs:fillRef idx="0"/>
-    <cs:effectRef idx="0"/>
-    <cs:fontRef idx="minor">
-      <a:schemeClr val="tx1">
-        <a:lumMod val="65000"/>
-        <a:lumOff val="35000"/>
-      </a:schemeClr>
-    </cs:fontRef>
-    <cs:defRPr sz="1197" kern="1200"/>
-  </cs:trendlineLabel>
-  <cs:upBar>
-    <cs:lnRef idx="0"/>
-    <cs:fillRef idx="0"/>
-    <cs:effectRef idx="0"/>
-    <cs:fontRef idx="minor">
-      <a:schemeClr val="tx1"/>
-    </cs:fontRef>
-    <cs:spPr>
-      <a:solidFill>
-        <a:schemeClr val="lt1"/>
-      </a:solidFill>
-      <a:ln w="9525" cap="flat" cmpd="sng" algn="ctr">
-        <a:solidFill>
-          <a:schemeClr val="tx1">
-            <a:lumMod val="65000"/>
-            <a:lumOff val="35000"/>
-          </a:schemeClr>
-        </a:solidFill>
-        <a:round/>
-      </a:ln>
-    </cs:spPr>
-  </cs:upBar>
-  <cs:valueAxis>
-    <cs:lnRef idx="0"/>
-    <cs:fillRef idx="0"/>
-    <cs:effectRef idx="0"/>
-    <cs:fontRef idx="minor">
-      <a:schemeClr val="tx1">
-        <a:lumMod val="65000"/>
-        <a:lumOff val="35000"/>
-      </a:schemeClr>
-    </cs:fontRef>
-    <cs:defRPr sz="1197" kern="1200"/>
-  </cs:valueAxis>
-  <cs:wall>
-    <cs:lnRef idx="0"/>
-    <cs:fillRef idx="0"/>
-    <cs:effectRef idx="0"/>
-    <cs:fontRef idx="minor">
-      <a:schemeClr val="tx1"/>
-    </cs:fontRef>
-    <cs:spPr>
-      <a:noFill/>
-      <a:ln>
-        <a:noFill/>
-      </a:ln>
-    </cs:spPr>
-  </cs:wall>
-</cs:chartStyle>
-</file>
-
 <file path=ppt/notesMasters/notesMaster1.xml><?xml version="1.0" encoding="utf-8"?>
 <p:notesMaster xmlns:a="http://schemas.openxmlformats.org/drawingml/2006/main" xmlns:r="http://schemas.openxmlformats.org/officeDocument/2006/relationships" xmlns:p="http://schemas.openxmlformats.org/presentationml/2006/main">
   <p:cSld>
@@ -4395,7 +3592,7 @@
           <a:p>
             <a:fld id="{7F7A6B22-0AC0-E647-B4AB-610E8EE21CF0}" type="datetimeFigureOut">
               <a:rPr lang="en-US" smtClean="0"/>
-              <a:t>5/23/16</a:t>
+              <a:t>5/27/16</a:t>
             </a:fld>
             <a:endParaRPr lang="en-US"/>
           </a:p>
@@ -4878,7 +4075,7 @@
           <a:p>
             <a:fld id="{180E51A3-104B-B744-9E20-3025749670C7}" type="datetimeFigureOut">
               <a:rPr lang="en-US" smtClean="0"/>
-              <a:t>5/23/16</a:t>
+              <a:t>5/27/16</a:t>
             </a:fld>
             <a:endParaRPr lang="en-US"/>
           </a:p>
@@ -5048,7 +4245,7 @@
           <a:p>
             <a:fld id="{180E51A3-104B-B744-9E20-3025749670C7}" type="datetimeFigureOut">
               <a:rPr lang="en-US" smtClean="0"/>
-              <a:t>5/23/16</a:t>
+              <a:t>5/27/16</a:t>
             </a:fld>
             <a:endParaRPr lang="en-US"/>
           </a:p>
@@ -5228,7 +4425,7 @@
           <a:p>
             <a:fld id="{180E51A3-104B-B744-9E20-3025749670C7}" type="datetimeFigureOut">
               <a:rPr lang="en-US" smtClean="0"/>
-              <a:t>5/23/16</a:t>
+              <a:t>5/27/16</a:t>
             </a:fld>
             <a:endParaRPr lang="en-US"/>
           </a:p>
@@ -5398,7 +4595,7 @@
           <a:p>
             <a:fld id="{180E51A3-104B-B744-9E20-3025749670C7}" type="datetimeFigureOut">
               <a:rPr lang="en-US" smtClean="0"/>
-              <a:t>5/23/16</a:t>
+              <a:t>5/27/16</a:t>
             </a:fld>
             <a:endParaRPr lang="en-US"/>
           </a:p>
@@ -5642,7 +4839,7 @@
           <a:p>
             <a:fld id="{180E51A3-104B-B744-9E20-3025749670C7}" type="datetimeFigureOut">
               <a:rPr lang="en-US" smtClean="0"/>
-              <a:t>5/23/16</a:t>
+              <a:t>5/27/16</a:t>
             </a:fld>
             <a:endParaRPr lang="en-US"/>
           </a:p>
@@ -5874,7 +5071,7 @@
           <a:p>
             <a:fld id="{180E51A3-104B-B744-9E20-3025749670C7}" type="datetimeFigureOut">
               <a:rPr lang="en-US" smtClean="0"/>
-              <a:t>5/23/16</a:t>
+              <a:t>5/27/16</a:t>
             </a:fld>
             <a:endParaRPr lang="en-US"/>
           </a:p>
@@ -6241,7 +5438,7 @@
           <a:p>
             <a:fld id="{180E51A3-104B-B744-9E20-3025749670C7}" type="datetimeFigureOut">
               <a:rPr lang="en-US" smtClean="0"/>
-              <a:t>5/23/16</a:t>
+              <a:t>5/27/16</a:t>
             </a:fld>
             <a:endParaRPr lang="en-US"/>
           </a:p>
@@ -6359,7 +5556,7 @@
           <a:p>
             <a:fld id="{180E51A3-104B-B744-9E20-3025749670C7}" type="datetimeFigureOut">
               <a:rPr lang="en-US" smtClean="0"/>
-              <a:t>5/23/16</a:t>
+              <a:t>5/27/16</a:t>
             </a:fld>
             <a:endParaRPr lang="en-US"/>
           </a:p>
@@ -6454,7 +5651,7 @@
           <a:p>
             <a:fld id="{180E51A3-104B-B744-9E20-3025749670C7}" type="datetimeFigureOut">
               <a:rPr lang="en-US" smtClean="0"/>
-              <a:t>5/23/16</a:t>
+              <a:t>5/27/16</a:t>
             </a:fld>
             <a:endParaRPr lang="en-US"/>
           </a:p>
@@ -6731,7 +5928,7 @@
           <a:p>
             <a:fld id="{180E51A3-104B-B744-9E20-3025749670C7}" type="datetimeFigureOut">
               <a:rPr lang="en-US" smtClean="0"/>
-              <a:t>5/23/16</a:t>
+              <a:t>5/27/16</a:t>
             </a:fld>
             <a:endParaRPr lang="en-US"/>
           </a:p>
@@ -6988,7 +6185,7 @@
           <a:p>
             <a:fld id="{180E51A3-104B-B744-9E20-3025749670C7}" type="datetimeFigureOut">
               <a:rPr lang="en-US" smtClean="0"/>
-              <a:t>5/23/16</a:t>
+              <a:t>5/27/16</a:t>
             </a:fld>
             <a:endParaRPr lang="en-US"/>
           </a:p>
@@ -7201,7 +6398,7 @@
           <a:p>
             <a:fld id="{180E51A3-104B-B744-9E20-3025749670C7}" type="datetimeFigureOut">
               <a:rPr lang="en-US" smtClean="0"/>
-              <a:t>5/23/16</a:t>
+              <a:t>5/27/16</a:t>
             </a:fld>
             <a:endParaRPr lang="en-US"/>
           </a:p>
@@ -7621,13 +6818,13 @@
           <p:nvPr>
             <p:extLst>
               <p:ext uri="{D42A27DB-BD31-4B8C-83A1-F6EECF244321}">
-                <p14:modId xmlns:p14="http://schemas.microsoft.com/office/powerpoint/2010/main" val="1455660182"/>
+                <p14:modId xmlns:p14="http://schemas.microsoft.com/office/powerpoint/2010/main" val="740162664"/>
               </p:ext>
             </p:extLst>
           </p:nvPr>
         </p:nvGraphicFramePr>
         <p:xfrm>
-          <a:off x="10551705" y="8836305"/>
+          <a:off x="10551705" y="11971394"/>
           <a:ext cx="6124196" cy="6074228"/>
         </p:xfrm>
         <a:graphic>
@@ -7644,7 +6841,7 @@
         </p:nvSpPr>
         <p:spPr>
           <a:xfrm>
-            <a:off x="19937896" y="39796507"/>
+            <a:off x="19964021" y="39818279"/>
             <a:ext cx="9366288" cy="2020727"/>
           </a:xfrm>
           <a:prstGeom prst="rect">
@@ -8052,7 +7249,7 @@
         </p:blipFill>
         <p:spPr>
           <a:xfrm>
-            <a:off x="26279181" y="40369434"/>
+            <a:off x="26305306" y="40391206"/>
             <a:ext cx="3025003" cy="1066800"/>
           </a:xfrm>
           <a:prstGeom prst="rect">
@@ -8265,7 +7462,7 @@
         </p:nvSpPr>
         <p:spPr>
           <a:xfrm rot="10800000">
-            <a:off x="954156" y="5622862"/>
+            <a:off x="944108" y="5542472"/>
             <a:ext cx="28346400" cy="457200"/>
           </a:xfrm>
           <a:prstGeom prst="rect">
@@ -8409,7 +7606,7 @@
         </p:nvSpPr>
         <p:spPr>
           <a:xfrm>
-            <a:off x="9169400" y="16057247"/>
+            <a:off x="9169400" y="6173018"/>
             <a:ext cx="20142200" cy="2797606"/>
           </a:xfrm>
           <a:prstGeom prst="rect">
@@ -8483,8 +7680,8 @@
         </p:nvSpPr>
         <p:spPr>
           <a:xfrm>
-            <a:off x="18598896" y="28762015"/>
-            <a:ext cx="10753344" cy="2428274"/>
+            <a:off x="19511553" y="36175187"/>
+            <a:ext cx="9246326" cy="2797606"/>
           </a:xfrm>
           <a:prstGeom prst="rect">
             <a:avLst/>
@@ -8550,7 +7747,7 @@
         </p:nvSpPr>
         <p:spPr>
           <a:xfrm>
-            <a:off x="24790416" y="24361145"/>
+            <a:off x="9245615" y="26668917"/>
             <a:ext cx="3555983" cy="2279003"/>
           </a:xfrm>
           <a:prstGeom prst="rect">
@@ -8665,13 +7862,13 @@
           <p:nvPr>
             <p:extLst>
               <p:ext uri="{D42A27DB-BD31-4B8C-83A1-F6EECF244321}">
-                <p14:modId xmlns:p14="http://schemas.microsoft.com/office/powerpoint/2010/main" val="535762064"/>
+                <p14:modId xmlns:p14="http://schemas.microsoft.com/office/powerpoint/2010/main" val="376316145"/>
               </p:ext>
             </p:extLst>
           </p:nvPr>
         </p:nvGraphicFramePr>
         <p:xfrm>
-          <a:off x="9287410" y="24522839"/>
+          <a:off x="23177583" y="26699983"/>
           <a:ext cx="6128143" cy="5286086"/>
         </p:xfrm>
         <a:graphic>
@@ -10460,8 +9657,8 @@
         </p:nvSpPr>
         <p:spPr>
           <a:xfrm>
-            <a:off x="15605051" y="23546238"/>
-            <a:ext cx="7696199" cy="2797606"/>
+            <a:off x="9160709" y="18582353"/>
+            <a:ext cx="20143634" cy="2400574"/>
           </a:xfrm>
           <a:prstGeom prst="rect">
             <a:avLst/>
@@ -10517,9 +9714,37 @@
             </a:endParaRPr>
           </a:p>
           <a:p>
+            <a:pPr marL="342900" indent="-342900">
+              <a:buFont typeface="Arial" charset="0"/>
+              <a:buChar char="•"/>
+            </a:pPr>
             <a:r>
               <a:rPr lang="en-US" sz="2400" dirty="0" smtClean="0"/>
-              <a:t>When the impressions table is processed, the user agent value is compared against the known bots list. If a user agent matches a known bot, the impression’s public value is set to "false" and filtered out of the statistics that are displayed to users in the interface. </a:t>
+              <a:t>When the impressions table is processed, the user agent value is compared against the known bots list. </a:t>
+            </a:r>
+          </a:p>
+          <a:p>
+            <a:pPr marL="342900" indent="-342900">
+              <a:buFont typeface="Arial" charset="0"/>
+              <a:buChar char="•"/>
+            </a:pPr>
+            <a:r>
+              <a:rPr lang="en-US" sz="2400" dirty="0" smtClean="0"/>
+              <a:t>If a user agent matches a known bot, the impression’s public value is set to "false" and filtered out of the statistics that are displayed to users in the interface.</a:t>
+            </a:r>
+          </a:p>
+          <a:p>
+            <a:pPr marL="342900" indent="-342900">
+              <a:buFont typeface="Arial" charset="0"/>
+              <a:buChar char="•"/>
+            </a:pPr>
+            <a:r>
+              <a:rPr lang="en-US" sz="2400" dirty="0"/>
+              <a:t>Jobs are run nightly and weekly</a:t>
+            </a:r>
+            <a:r>
+              <a:rPr lang="en-US" sz="2400" dirty="0" smtClean="0"/>
+              <a:t>. </a:t>
             </a:r>
             <a:endParaRPr lang="en-US" sz="2300" dirty="0">
               <a:latin typeface="Helvetica" charset="0"/>
@@ -10537,7 +9762,7 @@
         </p:nvSpPr>
         <p:spPr>
           <a:xfrm>
-            <a:off x="26575674" y="24284945"/>
+            <a:off x="9245616" y="28726316"/>
             <a:ext cx="2735926" cy="2668340"/>
           </a:xfrm>
           <a:prstGeom prst="rect">
@@ -10681,7 +9906,7 @@
         </p:nvSpPr>
         <p:spPr>
           <a:xfrm>
-            <a:off x="24150484" y="23670954"/>
+            <a:off x="9171741" y="25717468"/>
             <a:ext cx="4535567" cy="858614"/>
           </a:xfrm>
           <a:prstGeom prst="rect">
@@ -10733,7 +9958,7 @@
         </p:nvSpPr>
         <p:spPr>
           <a:xfrm>
-            <a:off x="9166831" y="23565723"/>
+            <a:off x="25016432" y="25786409"/>
             <a:ext cx="4013200" cy="858614"/>
           </a:xfrm>
           <a:prstGeom prst="rect">
@@ -10875,90 +10100,13 @@
       </p:sp>
       <p:sp>
         <p:nvSpPr>
-          <p:cNvPr id="31" name="TextBox 30"/>
-          <p:cNvSpPr txBox="1"/>
-          <p:nvPr/>
-        </p:nvSpPr>
-        <p:spPr>
-          <a:xfrm>
-            <a:off x="16310973" y="27166585"/>
-            <a:ext cx="7696199" cy="1320279"/>
-          </a:xfrm>
-          <a:prstGeom prst="rect">
-            <a:avLst/>
-          </a:prstGeom>
-          <a:noFill/>
-          <a:ln w="28575" cmpd="sng">
-            <a:solidFill>
-              <a:schemeClr val="tx1"/>
-            </a:solidFill>
-          </a:ln>
-        </p:spPr>
-        <p:txBody>
-          <a:bodyPr wrap="square" lIns="329104" tIns="164551" rIns="329104" bIns="164551" rtlCol="0">
-            <a:spAutoFit/>
-          </a:bodyPr>
-          <a:lstStyle/>
-          <a:p>
-            <a:pPr>
-              <a:lnSpc>
-                <a:spcPct val="90000"/>
-              </a:lnSpc>
-            </a:pPr>
-            <a:r>
-              <a:rPr lang="en-US" sz="3600" dirty="0" smtClean="0">
-                <a:solidFill>
-                  <a:srgbClr val="2C3E50"/>
-                </a:solidFill>
-                <a:latin typeface="Gotham Medium"/>
-                <a:cs typeface="Gotham Medium"/>
-              </a:rPr>
-              <a:t>Frequency</a:t>
-            </a:r>
-            <a:endParaRPr lang="en-US" sz="3600" dirty="0">
-              <a:solidFill>
-                <a:srgbClr val="2C3E50"/>
-              </a:solidFill>
-              <a:latin typeface="Gotham Medium"/>
-              <a:cs typeface="Gotham Medium"/>
-            </a:endParaRPr>
-          </a:p>
-          <a:p>
-            <a:pPr algn="just">
-              <a:lnSpc>
-                <a:spcPct val="30000"/>
-              </a:lnSpc>
-            </a:pPr>
-            <a:endParaRPr lang="en-US" sz="2000" dirty="0" smtClean="0">
-              <a:solidFill>
-                <a:srgbClr val="2C3E50"/>
-              </a:solidFill>
-              <a:latin typeface="Gotham Book"/>
-              <a:cs typeface="Gotham Book"/>
-            </a:endParaRPr>
-          </a:p>
-          <a:p>
-            <a:r>
-              <a:rPr lang="en-US" sz="2400" dirty="0" smtClean="0"/>
-              <a:t>Jobs are run nightly and weekly.</a:t>
-            </a:r>
-            <a:endParaRPr lang="en-US" sz="2300" dirty="0">
-              <a:latin typeface="Helvetica" charset="0"/>
-              <a:ea typeface="Helvetica" charset="0"/>
-              <a:cs typeface="Helvetica" charset="0"/>
-            </a:endParaRPr>
-          </a:p>
-        </p:txBody>
-      </p:sp>
-      <p:sp>
-        <p:nvSpPr>
           <p:cNvPr id="37" name="TextBox 36"/>
           <p:cNvSpPr txBox="1"/>
           <p:nvPr/>
         </p:nvSpPr>
         <p:spPr>
           <a:xfrm>
-            <a:off x="9203376" y="18713734"/>
+            <a:off x="9116290" y="21369847"/>
             <a:ext cx="20073257" cy="1689611"/>
           </a:xfrm>
           <a:prstGeom prst="rect">
@@ -11035,7 +10183,7 @@
         </p:nvSpPr>
         <p:spPr>
           <a:xfrm rot="10800000">
-            <a:off x="9251439" y="15369637"/>
+            <a:off x="9033725" y="32177180"/>
             <a:ext cx="20146397" cy="685800"/>
           </a:xfrm>
           <a:prstGeom prst="rect">
@@ -11084,13 +10232,13 @@
           <p:nvPr>
             <p:extLst>
               <p:ext uri="{D42A27DB-BD31-4B8C-83A1-F6EECF244321}">
-                <p14:modId xmlns:p14="http://schemas.microsoft.com/office/powerpoint/2010/main" val="1477048883"/>
+                <p14:modId xmlns:p14="http://schemas.microsoft.com/office/powerpoint/2010/main" val="30088286"/>
               </p:ext>
             </p:extLst>
           </p:nvPr>
         </p:nvGraphicFramePr>
         <p:xfrm>
-          <a:off x="9245925" y="21023477"/>
+          <a:off x="9158839" y="23679590"/>
           <a:ext cx="20134211" cy="1747520"/>
         </p:xfrm>
         <a:graphic>
@@ -15278,7 +14426,7 @@
         </p:nvSpPr>
         <p:spPr>
           <a:xfrm rot="10800000">
-            <a:off x="9079107" y="20491203"/>
+            <a:off x="8992021" y="23147316"/>
             <a:ext cx="20363688" cy="228600"/>
           </a:xfrm>
           <a:prstGeom prst="rect">
@@ -15326,7 +14474,7 @@
         </p:nvSpPr>
         <p:spPr>
           <a:xfrm rot="10800000">
-            <a:off x="9142794" y="23190596"/>
+            <a:off x="9099252" y="20969910"/>
             <a:ext cx="20363688" cy="457200"/>
           </a:xfrm>
           <a:prstGeom prst="rect">
@@ -15374,7 +14522,7 @@
         </p:nvSpPr>
         <p:spPr>
           <a:xfrm>
-            <a:off x="956588" y="14108982"/>
+            <a:off x="938299" y="21910120"/>
             <a:ext cx="7749673" cy="1631133"/>
           </a:xfrm>
           <a:prstGeom prst="rect">
@@ -15462,7 +14610,7 @@
         </p:nvSpPr>
         <p:spPr>
           <a:xfrm>
-            <a:off x="999509" y="24840321"/>
+            <a:off x="868881" y="14128778"/>
             <a:ext cx="7749673" cy="1277190"/>
           </a:xfrm>
           <a:prstGeom prst="rect">
@@ -15533,8 +14681,8 @@
         </p:nvSpPr>
         <p:spPr>
           <a:xfrm>
-            <a:off x="1203375" y="32709698"/>
-            <a:ext cx="7749673" cy="2012776"/>
+            <a:off x="999594" y="32942217"/>
+            <a:ext cx="7749673" cy="1277190"/>
           </a:xfrm>
           <a:prstGeom prst="rect">
             <a:avLst/>
@@ -15558,16 +14706,6 @@
               </a:lnSpc>
             </a:pPr>
             <a:r>
-              <a:rPr lang="en-US" sz="3600" dirty="0">
-                <a:solidFill>
-                  <a:srgbClr val="2C3E50"/>
-                </a:solidFill>
-                <a:latin typeface="Gotham Medium"/>
-                <a:cs typeface="Gotham Medium"/>
-              </a:rPr>
-              <a:t>Statistic </a:t>
-            </a:r>
-            <a:r>
               <a:rPr lang="en-US" sz="3600" dirty="0" smtClean="0">
                 <a:solidFill>
                   <a:srgbClr val="2C3E50"/>
@@ -15575,7 +14713,7 @@
                 <a:latin typeface="Gotham Medium"/>
                 <a:cs typeface="Gotham Medium"/>
               </a:rPr>
-              <a:t>3</a:t>
+              <a:t>Popular Items</a:t>
             </a:r>
           </a:p>
           <a:p>
@@ -15596,176 +14734,13 @@
                 <a:ea typeface="Helvetica" charset="0"/>
                 <a:cs typeface="Helvetica" charset="0"/>
               </a:rPr>
-              <a:t>Regardless of the collection method, statistics gathered about repository usage are utilized by content owners to measure the use and impact.</a:t>
+              <a:t>Views, downloads, streams displayed per hour</a:t>
             </a:r>
             <a:endParaRPr lang="en-US" sz="2300" dirty="0">
               <a:latin typeface="Helvetica" charset="0"/>
               <a:ea typeface="Helvetica" charset="0"/>
               <a:cs typeface="Helvetica" charset="0"/>
             </a:endParaRPr>
-          </a:p>
-        </p:txBody>
-      </p:sp>
-      <p:graphicFrame>
-        <p:nvGraphicFramePr>
-          <p:cNvPr id="47" name="Chart 46"/>
-          <p:cNvGraphicFramePr/>
-          <p:nvPr>
-            <p:extLst>
-              <p:ext uri="{D42A27DB-BD31-4B8C-83A1-F6EECF244321}">
-                <p14:modId xmlns:p14="http://schemas.microsoft.com/office/powerpoint/2010/main" val="1935213370"/>
-              </p:ext>
-            </p:extLst>
-          </p:nvPr>
-        </p:nvGraphicFramePr>
-        <p:xfrm>
-          <a:off x="1011659" y="34969946"/>
-          <a:ext cx="7495795" cy="6621400"/>
-        </p:xfrm>
-        <a:graphic>
-          <a:graphicData uri="http://schemas.openxmlformats.org/drawingml/2006/chart">
-            <c:chart xmlns:c="http://schemas.openxmlformats.org/drawingml/2006/chart" xmlns:r="http://schemas.openxmlformats.org/officeDocument/2006/relationships" r:id="rId5"/>
-          </a:graphicData>
-        </a:graphic>
-      </p:graphicFrame>
-      <p:sp>
-        <p:nvSpPr>
-          <p:cNvPr id="42" name="Rectangle 41"/>
-          <p:cNvSpPr/>
-          <p:nvPr/>
-        </p:nvSpPr>
-        <p:spPr>
-          <a:xfrm>
-            <a:off x="9192985" y="6052456"/>
-            <a:ext cx="20111358" cy="10406743"/>
-          </a:xfrm>
-          <a:prstGeom prst="rect">
-            <a:avLst/>
-          </a:prstGeom>
-          <a:noFill/>
-          <a:ln w="12700">
-            <a:solidFill>
-              <a:srgbClr val="FFFF00"/>
-            </a:solidFill>
-            <a:prstDash val="dash"/>
-          </a:ln>
-        </p:spPr>
-        <p:style>
-          <a:lnRef idx="2">
-            <a:schemeClr val="accent1">
-              <a:shade val="50000"/>
-            </a:schemeClr>
-          </a:lnRef>
-          <a:fillRef idx="1">
-            <a:schemeClr val="accent1"/>
-          </a:fillRef>
-          <a:effectRef idx="0">
-            <a:schemeClr val="accent1"/>
-          </a:effectRef>
-          <a:fontRef idx="minor">
-            <a:schemeClr val="lt1"/>
-          </a:fontRef>
-        </p:style>
-        <p:txBody>
-          <a:bodyPr rtlCol="0" anchor="ctr"/>
-          <a:lstStyle/>
-          <a:p>
-            <a:pPr algn="ctr"/>
-            <a:endParaRPr lang="en-US"/>
-          </a:p>
-        </p:txBody>
-      </p:sp>
-      <p:sp>
-        <p:nvSpPr>
-          <p:cNvPr id="43" name="Rectangle 42"/>
-          <p:cNvSpPr/>
-          <p:nvPr/>
-        </p:nvSpPr>
-        <p:spPr>
-          <a:xfrm>
-            <a:off x="985156" y="6052457"/>
-            <a:ext cx="7679873" cy="35835771"/>
-          </a:xfrm>
-          <a:prstGeom prst="rect">
-            <a:avLst/>
-          </a:prstGeom>
-          <a:noFill/>
-          <a:ln w="12700">
-            <a:solidFill>
-              <a:srgbClr val="FFFF00"/>
-            </a:solidFill>
-            <a:prstDash val="dash"/>
-          </a:ln>
-        </p:spPr>
-        <p:style>
-          <a:lnRef idx="2">
-            <a:schemeClr val="accent1">
-              <a:shade val="50000"/>
-            </a:schemeClr>
-          </a:lnRef>
-          <a:fillRef idx="1">
-            <a:schemeClr val="accent1"/>
-          </a:fillRef>
-          <a:effectRef idx="0">
-            <a:schemeClr val="accent1"/>
-          </a:effectRef>
-          <a:fontRef idx="minor">
-            <a:schemeClr val="lt1"/>
-          </a:fontRef>
-        </p:style>
-        <p:txBody>
-          <a:bodyPr rtlCol="0" anchor="ctr"/>
-          <a:lstStyle/>
-          <a:p>
-            <a:pPr algn="ctr"/>
-            <a:endParaRPr lang="en-US"/>
-          </a:p>
-        </p:txBody>
-      </p:sp>
-      <p:sp>
-        <p:nvSpPr>
-          <p:cNvPr id="49" name="Rectangle 48"/>
-          <p:cNvSpPr/>
-          <p:nvPr/>
-        </p:nvSpPr>
-        <p:spPr>
-          <a:xfrm>
-            <a:off x="9127670" y="30088113"/>
-            <a:ext cx="20111358" cy="9514115"/>
-          </a:xfrm>
-          <a:prstGeom prst="rect">
-            <a:avLst/>
-          </a:prstGeom>
-          <a:noFill/>
-          <a:ln w="12700">
-            <a:solidFill>
-              <a:srgbClr val="FFFF00"/>
-            </a:solidFill>
-            <a:prstDash val="dash"/>
-          </a:ln>
-        </p:spPr>
-        <p:style>
-          <a:lnRef idx="2">
-            <a:schemeClr val="accent1">
-              <a:shade val="50000"/>
-            </a:schemeClr>
-          </a:lnRef>
-          <a:fillRef idx="1">
-            <a:schemeClr val="accent1"/>
-          </a:fillRef>
-          <a:effectRef idx="0">
-            <a:schemeClr val="accent1"/>
-          </a:effectRef>
-          <a:fontRef idx="minor">
-            <a:schemeClr val="lt1"/>
-          </a:fontRef>
-        </p:style>
-        <p:txBody>
-          <a:bodyPr rtlCol="0" anchor="ctr"/>
-          <a:lstStyle/>
-          <a:p>
-            <a:pPr algn="ctr"/>
-            <a:endParaRPr lang="en-US"/>
           </a:p>
         </p:txBody>
       </p:sp>
@@ -15777,7 +14752,7 @@
         </p:nvSpPr>
         <p:spPr>
           <a:xfrm>
-            <a:off x="14020801" y="6543885"/>
+            <a:off x="14020801" y="9678974"/>
             <a:ext cx="10689771" cy="858614"/>
           </a:xfrm>
           <a:prstGeom prst="rect">
@@ -15829,7 +14804,7 @@
         </p:nvSpPr>
         <p:spPr>
           <a:xfrm>
-            <a:off x="10368911" y="8179170"/>
+            <a:off x="10368911" y="11314259"/>
             <a:ext cx="1464356" cy="523220"/>
           </a:xfrm>
           <a:prstGeom prst="rect">
@@ -15859,7 +14834,7 @@
         </p:nvSpPr>
         <p:spPr>
           <a:xfrm>
-            <a:off x="10019661" y="8266481"/>
+            <a:off x="10019661" y="11401570"/>
             <a:ext cx="365760" cy="365760"/>
           </a:xfrm>
           <a:prstGeom prst="rect">
@@ -15907,7 +14882,7 @@
         </p:nvSpPr>
         <p:spPr>
           <a:xfrm>
-            <a:off x="10407691" y="7599333"/>
+            <a:off x="10407691" y="10734422"/>
             <a:ext cx="1042987" cy="523220"/>
           </a:xfrm>
           <a:prstGeom prst="rect">
@@ -15937,7 +14912,7 @@
         </p:nvSpPr>
         <p:spPr>
           <a:xfrm>
-            <a:off x="10040297" y="7679388"/>
+            <a:off x="10040297" y="10814477"/>
             <a:ext cx="365760" cy="365760"/>
           </a:xfrm>
           <a:prstGeom prst="rect">
@@ -15984,13 +14959,35 @@
           <p:nvPr>
             <p:extLst>
               <p:ext uri="{D42A27DB-BD31-4B8C-83A1-F6EECF244321}">
-                <p14:modId xmlns:p14="http://schemas.microsoft.com/office/powerpoint/2010/main" val="1146972250"/>
+                <p14:modId xmlns:p14="http://schemas.microsoft.com/office/powerpoint/2010/main" val="1688610424"/>
               </p:ext>
             </p:extLst>
           </p:nvPr>
         </p:nvGraphicFramePr>
         <p:xfrm>
-          <a:off x="15010682" y="8841241"/>
+          <a:off x="15010682" y="11976330"/>
+          <a:ext cx="8627911" cy="6019800"/>
+        </p:xfrm>
+        <a:graphic>
+          <a:graphicData uri="http://schemas.openxmlformats.org/drawingml/2006/chart">
+            <c:chart xmlns:c="http://schemas.openxmlformats.org/drawingml/2006/chart" xmlns:r="http://schemas.openxmlformats.org/officeDocument/2006/relationships" r:id="rId5"/>
+          </a:graphicData>
+        </a:graphic>
+      </p:graphicFrame>
+      <p:graphicFrame>
+        <p:nvGraphicFramePr>
+          <p:cNvPr id="56" name="Chart 55"/>
+          <p:cNvGraphicFramePr/>
+          <p:nvPr>
+            <p:extLst>
+              <p:ext uri="{D42A27DB-BD31-4B8C-83A1-F6EECF244321}">
+                <p14:modId xmlns:p14="http://schemas.microsoft.com/office/powerpoint/2010/main" val="1479001063"/>
+              </p:ext>
+            </p:extLst>
+          </p:nvPr>
+        </p:nvGraphicFramePr>
+        <p:xfrm>
+          <a:off x="21107736" y="11979750"/>
           <a:ext cx="8627911" cy="6019800"/>
         </p:xfrm>
         <a:graphic>
@@ -16001,45 +14998,23 @@
       </p:graphicFrame>
       <p:graphicFrame>
         <p:nvGraphicFramePr>
-          <p:cNvPr id="56" name="Chart 55"/>
+          <p:cNvPr id="25" name="Chart 24"/>
           <p:cNvGraphicFramePr/>
           <p:nvPr>
             <p:extLst>
               <p:ext uri="{D42A27DB-BD31-4B8C-83A1-F6EECF244321}">
-                <p14:modId xmlns:p14="http://schemas.microsoft.com/office/powerpoint/2010/main" val="1349390278"/>
+                <p14:modId xmlns:p14="http://schemas.microsoft.com/office/powerpoint/2010/main" val="1412166139"/>
               </p:ext>
             </p:extLst>
           </p:nvPr>
         </p:nvGraphicFramePr>
         <p:xfrm>
-          <a:off x="21107736" y="8844661"/>
-          <a:ext cx="8627911" cy="6019800"/>
+          <a:off x="1021515" y="24139016"/>
+          <a:ext cx="7670498" cy="8156286"/>
         </p:xfrm>
         <a:graphic>
           <a:graphicData uri="http://schemas.openxmlformats.org/drawingml/2006/chart">
             <c:chart xmlns:c="http://schemas.openxmlformats.org/drawingml/2006/chart" xmlns:r="http://schemas.openxmlformats.org/officeDocument/2006/relationships" r:id="rId7"/>
-          </a:graphicData>
-        </a:graphic>
-      </p:graphicFrame>
-      <p:graphicFrame>
-        <p:nvGraphicFramePr>
-          <p:cNvPr id="25" name="Chart 24"/>
-          <p:cNvGraphicFramePr/>
-          <p:nvPr>
-            <p:extLst>
-              <p:ext uri="{D42A27DB-BD31-4B8C-83A1-F6EECF244321}">
-                <p14:modId xmlns:p14="http://schemas.microsoft.com/office/powerpoint/2010/main" val="1137223833"/>
-              </p:ext>
-            </p:extLst>
-          </p:nvPr>
-        </p:nvGraphicFramePr>
-        <p:xfrm>
-          <a:off x="783772" y="16173286"/>
-          <a:ext cx="7670498" cy="8156286"/>
-        </p:xfrm>
-        <a:graphic>
-          <a:graphicData uri="http://schemas.openxmlformats.org/drawingml/2006/chart">
-            <c:chart xmlns:c="http://schemas.openxmlformats.org/drawingml/2006/chart" xmlns:r="http://schemas.openxmlformats.org/officeDocument/2006/relationships" r:id="rId8"/>
           </a:graphicData>
         </a:graphic>
       </p:graphicFrame>
@@ -16052,7 +15027,7 @@
           <p:nvPr/>
         </p:nvPicPr>
         <p:blipFill rotWithShape="1">
-          <a:blip r:embed="rId9">
+          <a:blip r:embed="rId8">
             <a:extLst>
               <a:ext uri="{28A0092B-C50C-407E-A947-70E740481C1C}">
                 <a14:useLocalDpi xmlns:a14="http://schemas.microsoft.com/office/drawing/2010/main" val="0"/>
@@ -16064,7 +15039,7 @@
         </p:blipFill>
         <p:spPr>
           <a:xfrm>
-            <a:off x="1084817" y="26253143"/>
+            <a:off x="954189" y="15541600"/>
             <a:ext cx="7487683" cy="5947937"/>
           </a:xfrm>
           <a:prstGeom prst="rect">
@@ -16082,6 +15057,323 @@
           <a:xfrm rot="10800000">
             <a:off x="955961" y="13418127"/>
             <a:ext cx="7800111" cy="685800"/>
+          </a:xfrm>
+          <a:prstGeom prst="rect">
+            <a:avLst/>
+          </a:prstGeom>
+          <a:solidFill>
+            <a:srgbClr val="1C2939"/>
+          </a:solidFill>
+          <a:ln>
+            <a:noFill/>
+          </a:ln>
+          <a:effectLst/>
+        </p:spPr>
+        <p:style>
+          <a:lnRef idx="1">
+            <a:schemeClr val="accent1"/>
+          </a:lnRef>
+          <a:fillRef idx="3">
+            <a:schemeClr val="accent1"/>
+          </a:fillRef>
+          <a:effectRef idx="2">
+            <a:schemeClr val="accent1"/>
+          </a:effectRef>
+          <a:fontRef idx="minor">
+            <a:schemeClr val="lt1"/>
+          </a:fontRef>
+        </p:style>
+        <p:txBody>
+          <a:bodyPr lIns="329104" tIns="164551" rIns="329104" bIns="164551" rtlCol="0" anchor="ctr"/>
+          <a:lstStyle/>
+          <a:p>
+            <a:pPr algn="ctr"/>
+            <a:endParaRPr lang="en-US">
+              <a:latin typeface="Helvetica"/>
+              <a:cs typeface="Helvetica"/>
+            </a:endParaRPr>
+          </a:p>
+        </p:txBody>
+      </p:sp>
+      <p:sp>
+        <p:nvSpPr>
+          <p:cNvPr id="48" name="TextBox 47"/>
+          <p:cNvSpPr txBox="1"/>
+          <p:nvPr/>
+        </p:nvSpPr>
+        <p:spPr>
+          <a:xfrm>
+            <a:off x="9448698" y="32701231"/>
+            <a:ext cx="9840788" cy="1985076"/>
+          </a:xfrm>
+          <a:prstGeom prst="rect">
+            <a:avLst/>
+          </a:prstGeom>
+          <a:noFill/>
+          <a:ln w="28575" cmpd="sng">
+            <a:solidFill>
+              <a:schemeClr val="tx1"/>
+            </a:solidFill>
+          </a:ln>
+        </p:spPr>
+        <p:txBody>
+          <a:bodyPr wrap="square" lIns="329104" tIns="164551" rIns="329104" bIns="164551" rtlCol="0">
+            <a:spAutoFit/>
+          </a:bodyPr>
+          <a:lstStyle/>
+          <a:p>
+            <a:pPr>
+              <a:lnSpc>
+                <a:spcPct val="90000"/>
+              </a:lnSpc>
+            </a:pPr>
+            <a:r>
+              <a:rPr lang="en-US" sz="3600" dirty="0" smtClean="0">
+                <a:solidFill>
+                  <a:srgbClr val="2C3E50"/>
+                </a:solidFill>
+                <a:latin typeface="Gotham Medium"/>
+                <a:cs typeface="Gotham Medium"/>
+              </a:rPr>
+              <a:t>Daily Activity Per Hour</a:t>
+            </a:r>
+          </a:p>
+          <a:p>
+            <a:pPr algn="just">
+              <a:lnSpc>
+                <a:spcPct val="30000"/>
+              </a:lnSpc>
+            </a:pPr>
+            <a:endParaRPr lang="en-US" sz="2000" dirty="0" smtClean="0">
+              <a:latin typeface="Gotham Book"/>
+              <a:cs typeface="Gotham Book"/>
+            </a:endParaRPr>
+          </a:p>
+          <a:p>
+            <a:r>
+              <a:rPr lang="en-US" sz="2300" dirty="0" smtClean="0">
+                <a:latin typeface="Helvetica" charset="0"/>
+                <a:ea typeface="Helvetica" charset="0"/>
+                <a:cs typeface="Helvetica" charset="0"/>
+              </a:rPr>
+              <a:t>Views, downloads, streams displayed per hour. Helps inform our decision about when to schedule deploys. (Best time, Saturday at 3am. Most reasonable time, Wednesdays, 7am.</a:t>
+            </a:r>
+            <a:endParaRPr lang="en-US" sz="2300" dirty="0">
+              <a:latin typeface="Helvetica" charset="0"/>
+              <a:ea typeface="Helvetica" charset="0"/>
+              <a:cs typeface="Helvetica" charset="0"/>
+            </a:endParaRPr>
+          </a:p>
+        </p:txBody>
+      </p:sp>
+      <p:sp>
+        <p:nvSpPr>
+          <p:cNvPr id="52" name="TextBox 51"/>
+          <p:cNvSpPr txBox="1"/>
+          <p:nvPr/>
+        </p:nvSpPr>
+        <p:spPr>
+          <a:xfrm>
+            <a:off x="19567450" y="33114343"/>
+            <a:ext cx="9225263" cy="1985076"/>
+          </a:xfrm>
+          <a:prstGeom prst="rect">
+            <a:avLst/>
+          </a:prstGeom>
+          <a:noFill/>
+          <a:ln w="28575" cmpd="sng">
+            <a:solidFill>
+              <a:schemeClr val="tx1"/>
+            </a:solidFill>
+          </a:ln>
+        </p:spPr>
+        <p:txBody>
+          <a:bodyPr wrap="square" lIns="329104" tIns="164551" rIns="329104" bIns="164551" rtlCol="0">
+            <a:spAutoFit/>
+          </a:bodyPr>
+          <a:lstStyle/>
+          <a:p>
+            <a:pPr>
+              <a:lnSpc>
+                <a:spcPct val="90000"/>
+              </a:lnSpc>
+            </a:pPr>
+            <a:r>
+              <a:rPr lang="en-US" sz="3600" dirty="0" smtClean="0">
+                <a:solidFill>
+                  <a:srgbClr val="2C3E50"/>
+                </a:solidFill>
+                <a:latin typeface="Gotham Medium"/>
+                <a:cs typeface="Gotham Medium"/>
+              </a:rPr>
+              <a:t>Next Steps</a:t>
+            </a:r>
+            <a:endParaRPr lang="en-US" sz="3600" dirty="0">
+              <a:solidFill>
+                <a:srgbClr val="2C3E50"/>
+              </a:solidFill>
+              <a:latin typeface="Gotham Medium"/>
+              <a:cs typeface="Gotham Medium"/>
+            </a:endParaRPr>
+          </a:p>
+          <a:p>
+            <a:pPr algn="just">
+              <a:lnSpc>
+                <a:spcPct val="30000"/>
+              </a:lnSpc>
+            </a:pPr>
+            <a:endParaRPr lang="en-US" sz="2000" dirty="0" smtClean="0">
+              <a:solidFill>
+                <a:srgbClr val="2C3E50"/>
+              </a:solidFill>
+              <a:latin typeface="Gotham Book"/>
+              <a:cs typeface="Gotham Book"/>
+            </a:endParaRPr>
+          </a:p>
+          <a:p>
+            <a:pPr marL="342900" indent="-342900">
+              <a:buFont typeface="Arial" charset="0"/>
+              <a:buChar char="•"/>
+            </a:pPr>
+            <a:r>
+              <a:rPr lang="en-US" sz="2300" dirty="0">
+                <a:latin typeface="Helvetica" charset="0"/>
+                <a:ea typeface="Helvetica" charset="0"/>
+                <a:cs typeface="Helvetica" charset="0"/>
+              </a:rPr>
+              <a:t>Regular processing/reviewing of agents list for new </a:t>
+            </a:r>
+            <a:r>
+              <a:rPr lang="en-US" sz="2300" dirty="0" smtClean="0">
+                <a:latin typeface="Helvetica" charset="0"/>
+                <a:ea typeface="Helvetica" charset="0"/>
+                <a:cs typeface="Helvetica" charset="0"/>
+              </a:rPr>
+              <a:t>bots</a:t>
+            </a:r>
+          </a:p>
+          <a:p>
+            <a:pPr marL="342900" indent="-342900">
+              <a:buFont typeface="Arial" charset="0"/>
+              <a:buChar char="•"/>
+            </a:pPr>
+            <a:r>
+              <a:rPr lang="en-US" sz="2300" dirty="0" smtClean="0">
+                <a:latin typeface="Helvetica" charset="0"/>
+                <a:ea typeface="Helvetica" charset="0"/>
+                <a:cs typeface="Helvetica" charset="0"/>
+              </a:rPr>
+              <a:t>Aggregated </a:t>
+            </a:r>
+            <a:r>
+              <a:rPr lang="en-US" sz="2300" dirty="0">
+                <a:latin typeface="Helvetica" charset="0"/>
+                <a:ea typeface="Helvetica" charset="0"/>
+                <a:cs typeface="Helvetica" charset="0"/>
+              </a:rPr>
+              <a:t>statistics for Curator's </a:t>
+            </a:r>
+            <a:r>
+              <a:rPr lang="en-US" sz="2300" dirty="0" smtClean="0">
+                <a:latin typeface="Helvetica" charset="0"/>
+                <a:ea typeface="Helvetica" charset="0"/>
+                <a:cs typeface="Helvetica" charset="0"/>
+              </a:rPr>
+              <a:t>Interface</a:t>
+            </a:r>
+          </a:p>
+          <a:p>
+            <a:pPr marL="342900" indent="-342900">
+              <a:buFont typeface="Arial" charset="0"/>
+              <a:buChar char="•"/>
+            </a:pPr>
+            <a:r>
+              <a:rPr lang="en-US" sz="2300" dirty="0" smtClean="0">
+                <a:latin typeface="Helvetica" charset="0"/>
+                <a:ea typeface="Helvetica" charset="0"/>
+                <a:cs typeface="Helvetica" charset="0"/>
+              </a:rPr>
+              <a:t>Google </a:t>
+            </a:r>
+            <a:r>
+              <a:rPr lang="en-US" sz="2300" dirty="0">
+                <a:latin typeface="Helvetica" charset="0"/>
+                <a:ea typeface="Helvetica" charset="0"/>
+                <a:cs typeface="Helvetica" charset="0"/>
+              </a:rPr>
+              <a:t>Indexing Workbench statistics</a:t>
+            </a:r>
+          </a:p>
+        </p:txBody>
+      </p:sp>
+      <p:pic>
+        <p:nvPicPr>
+          <p:cNvPr id="13" name="Picture 12"/>
+          <p:cNvPicPr>
+            <a:picLocks noChangeAspect="1"/>
+          </p:cNvPicPr>
+          <p:nvPr/>
+        </p:nvPicPr>
+        <p:blipFill rotWithShape="1">
+          <a:blip r:embed="rId9">
+            <a:extLst>
+              <a:ext uri="{28A0092B-C50C-407E-A947-70E740481C1C}">
+                <a14:useLocalDpi xmlns:a14="http://schemas.microsoft.com/office/drawing/2010/main" val="0"/>
+              </a:ext>
+            </a:extLst>
+          </a:blip>
+          <a:srcRect t="2964" r="13889" b="3449"/>
+          <a:stretch/>
+        </p:blipFill>
+        <p:spPr>
+          <a:xfrm>
+            <a:off x="9499600" y="34781067"/>
+            <a:ext cx="9779000" cy="6920818"/>
+          </a:xfrm>
+          <a:prstGeom prst="rect">
+            <a:avLst/>
+          </a:prstGeom>
+        </p:spPr>
+      </p:pic>
+      <p:pic>
+        <p:nvPicPr>
+          <p:cNvPr id="15" name="Picture 14"/>
+          <p:cNvPicPr>
+            <a:picLocks noChangeAspect="1"/>
+          </p:cNvPicPr>
+          <p:nvPr/>
+        </p:nvPicPr>
+        <p:blipFill rotWithShape="1">
+          <a:blip r:embed="rId10">
+            <a:extLst>
+              <a:ext uri="{28A0092B-C50C-407E-A947-70E740481C1C}">
+                <a14:useLocalDpi xmlns:a14="http://schemas.microsoft.com/office/drawing/2010/main" val="0"/>
+              </a:ext>
+            </a:extLst>
+          </a:blip>
+          <a:srcRect t="3065" r="18003" b="4750"/>
+          <a:stretch/>
+        </p:blipFill>
+        <p:spPr>
+          <a:xfrm>
+            <a:off x="1017237" y="34363152"/>
+            <a:ext cx="7481378" cy="7351775"/>
+          </a:xfrm>
+          <a:prstGeom prst="rect">
+            <a:avLst/>
+          </a:prstGeom>
+        </p:spPr>
+      </p:pic>
+      <p:sp>
+        <p:nvSpPr>
+          <p:cNvPr id="49" name="Rectangle 48"/>
+          <p:cNvSpPr/>
+          <p:nvPr/>
+        </p:nvSpPr>
+        <p:spPr>
+          <a:xfrm rot="10800000">
+            <a:off x="9100878" y="25476859"/>
+            <a:ext cx="20363688" cy="228600"/>
           </a:xfrm>
           <a:prstGeom prst="rect">
             <a:avLst/>

</xml_diff>

<commit_message>
Applying Phil's changes and adding stewardship ppt
</commit_message>
<xml_diff>
--- a/Presentations/Open Repositories 2016/Statistics/SweeneySarahORstatistics33x46.pptx
+++ b/Presentations/Open Repositories 2016/Statistics/SweeneySarahORstatistics33x46.pptx
@@ -116,7 +116,7 @@
             <a:srgbClr val="A4A3A4"/>
           </p15:clr>
         </p15:guide>
-        <p15:guide id="2" pos="9533" userDrawn="1">
+        <p15:guide id="2" pos="12149" userDrawn="1">
           <p15:clr>
             <a:srgbClr val="A4A3A4"/>
           </p15:clr>
@@ -8540,13 +8540,13 @@
           <p:nvPr>
             <p:extLst>
               <p:ext uri="{D42A27DB-BD31-4B8C-83A1-F6EECF244321}">
-                <p14:modId xmlns:p14="http://schemas.microsoft.com/office/powerpoint/2010/main" val="1126838995"/>
+                <p14:modId xmlns:p14="http://schemas.microsoft.com/office/powerpoint/2010/main" val="650263343"/>
               </p:ext>
             </p:extLst>
           </p:nvPr>
         </p:nvGraphicFramePr>
         <p:xfrm>
-          <a:off x="10551705" y="10464145"/>
+          <a:off x="10551705" y="10184745"/>
           <a:ext cx="6124196" cy="6074228"/>
         </p:xfrm>
         <a:graphic>
@@ -8825,11 +8825,6 @@
               </a:rPr>
               <a:t>Repository usage statistics are utilized by content owners to measure the impact of repository materials and to measure the use of the repository as a whole. Given the value of these metrics, it is vital that we understand how repository statistics are gathered so we can sort genuine user interactions from automated traffic.</a:t>
             </a:r>
-            <a:endParaRPr lang="en-US" sz="2300" dirty="0">
-              <a:latin typeface="Helvetica" charset="0"/>
-              <a:ea typeface="Helvetica" charset="0"/>
-              <a:cs typeface="Helvetica" charset="0"/>
-            </a:endParaRPr>
           </a:p>
           <a:p>
             <a:r>
@@ -8853,13 +8848,24 @@
                 <a:ea typeface="Helvetica" charset="0"/>
                 <a:cs typeface="Helvetica" charset="0"/>
               </a:rPr>
-              <a:t>Early on in the Digital Repository Service development process we decided not to rely on Google Analytics to collect statistics. While Google Analytics does a lot of valuable tracking, we cannot easily distinguish genuine user traffic from bots or crawlers. We decided to record and process our own statistics so we could isolate genuine use and ignore statistics generated by bots and other large automated consumers of our content.</a:t>
-            </a:r>
-            <a:endParaRPr lang="en-US" sz="2300" dirty="0">
-              <a:latin typeface="Helvetica" charset="0"/>
-              <a:ea typeface="Helvetica" charset="0"/>
-              <a:cs typeface="Helvetica" charset="0"/>
-            </a:endParaRPr>
+              <a:t>Early on in the Digital Repository Service development process we decided not to rely on Google Analytics to collect statistics. While Google Analytics </a:t>
+            </a:r>
+            <a:r>
+              <a:rPr lang="en-US" sz="2300" dirty="0" smtClean="0">
+                <a:latin typeface="Helvetica" charset="0"/>
+                <a:ea typeface="Helvetica" charset="0"/>
+                <a:cs typeface="Helvetica" charset="0"/>
+              </a:rPr>
+              <a:t>provides valuable </a:t>
+            </a:r>
+            <a:r>
+              <a:rPr lang="en-US" sz="2300" dirty="0">
+                <a:latin typeface="Helvetica" charset="0"/>
+                <a:ea typeface="Helvetica" charset="0"/>
+                <a:cs typeface="Helvetica" charset="0"/>
+              </a:rPr>
+              <a:t>tracking, we cannot easily distinguish genuine user traffic from bots or crawlers. We decided to record and process our own statistics so we could isolate genuine use and ignore statistics generated by bots and other large automated consumers of our content.</a:t>
+            </a:r>
           </a:p>
         </p:txBody>
       </p:sp>
@@ -8942,11 +8948,6 @@
               </a:rPr>
               <a:t>A seemingly endless number of bots exist to crawl publicly available repository content for harvesting and indexing. These bots help increase the discovery of repository content, but they can also greatly inflate usage statistics. Usage statistics are often gathered using third-party tools, like Google Analytics, which may or may not report their collection methods, and may not be aware of the difference between human and bot consumption. Although content owners tend to prefer higher numbers regardless of the consumer, we want to be able to defend the statistics we are gathering for our repository and declare them to be a genuine reflection of the use of our content by people, not bots.</a:t>
             </a:r>
-            <a:endParaRPr lang="en-US" sz="2300" dirty="0">
-              <a:latin typeface="Helvetica" charset="0"/>
-              <a:ea typeface="Helvetica" charset="0"/>
-              <a:cs typeface="Helvetica" charset="0"/>
-            </a:endParaRPr>
           </a:p>
         </p:txBody>
       </p:sp>
@@ -9033,15 +9034,15 @@
                 <a:ea typeface="Helvetica" charset="0"/>
                 <a:cs typeface="Helvetica" charset="0"/>
               </a:rPr>
-              <a:t>We designed a simple method for collecting and processing our usage statistics that allows us to filter out the non-human consumption of our content. Raw, unfiltered DRS usage statistics are stored in a </a:t>
-            </a:r>
-            <a:r>
-              <a:rPr lang="en-US" sz="2300" dirty="0" err="1">
+              <a:t>We designed a simple method for collecting and processing our usage statistics that allows us to filter out the non-human consumption of our content. Raw, unfiltered DRS usage statistics are stored in </a:t>
+            </a:r>
+            <a:r>
+              <a:rPr lang="en-US" sz="2300" smtClean="0">
                 <a:latin typeface="Helvetica" charset="0"/>
                 <a:ea typeface="Helvetica" charset="0"/>
                 <a:cs typeface="Helvetica" charset="0"/>
               </a:rPr>
-              <a:t>mySQL</a:t>
+              <a:t>an impressions table in a SQL database. </a:t>
             </a:r>
             <a:r>
               <a:rPr lang="en-US" sz="2300" dirty="0">
@@ -9049,13 +9050,8 @@
                 <a:ea typeface="Helvetica" charset="0"/>
                 <a:cs typeface="Helvetica" charset="0"/>
               </a:rPr>
-              <a:t> database, known as the impressions table. A nightly job processes this table by comparing the agent responsible for the impression against a list of keywords associated with known bots. Impressions made by agents that match any keyword are marked as FALSE and are filtered out of the statistics displayed to users in the interface.</a:t>
-            </a:r>
-            <a:endParaRPr lang="en-US" sz="2300" dirty="0">
-              <a:latin typeface="Helvetica" charset="0"/>
-              <a:ea typeface="Helvetica" charset="0"/>
-              <a:cs typeface="Helvetica" charset="0"/>
-            </a:endParaRPr>
+              <a:t>A nightly job processes this table by comparing the agent responsible for the impression against a list of keywords associated with known bots. Impressions made by agents that match any keyword are marked as FALSE and are filtered out of the statistics displayed to users in the interface.</a:t>
+            </a:r>
           </a:p>
         </p:txBody>
       </p:sp>
@@ -9124,11 +9120,6 @@
               </a:rPr>
               <a:t>Every file view, download, and stream is counted as an impression and recorded in the impressions table. Along with the type of impression, we also record the agent responsible for the impression, how the agent was referred to the file, the agent’s IP address, and the date of the impression. Impression frequency is limited to one per file per IP address per hour, which helps reduce inflated numbers from repeated clicks or page refreshes.</a:t>
             </a:r>
-            <a:endParaRPr lang="en-US" sz="2300" dirty="0">
-              <a:latin typeface="Helvetica" charset="0"/>
-              <a:ea typeface="Helvetica" charset="0"/>
-              <a:cs typeface="Helvetica" charset="0"/>
-            </a:endParaRPr>
           </a:p>
         </p:txBody>
       </p:sp>
@@ -13387,19 +13378,31 @@
             </a:endParaRPr>
           </a:p>
           <a:p>
+            <a:pPr algn="ctr"/>
             <a:r>
               <a:rPr lang="en-US" sz="2300" dirty="0">
                 <a:latin typeface="Helvetica" charset="0"/>
                 <a:ea typeface="Helvetica" charset="0"/>
                 <a:cs typeface="Helvetica" charset="0"/>
               </a:rPr>
-              <a:t>Top 5 referrers for page views</a:t>
-            </a:r>
-            <a:endParaRPr lang="en-US" sz="2300" dirty="0">
-              <a:latin typeface="Helvetica" charset="0"/>
-              <a:ea typeface="Helvetica" charset="0"/>
-              <a:cs typeface="Helvetica" charset="0"/>
-            </a:endParaRPr>
+              <a:t>Top 5 referrers </a:t>
+            </a:r>
+            <a:r>
+              <a:rPr lang="en-US" sz="2300" dirty="0" smtClean="0">
+                <a:latin typeface="Helvetica" charset="0"/>
+                <a:ea typeface="Helvetica" charset="0"/>
+                <a:cs typeface="Helvetica" charset="0"/>
+              </a:rPr>
+              <a:t>by number of page </a:t>
+            </a:r>
+            <a:r>
+              <a:rPr lang="en-US" sz="2300" dirty="0">
+                <a:latin typeface="Helvetica" charset="0"/>
+                <a:ea typeface="Helvetica" charset="0"/>
+                <a:cs typeface="Helvetica" charset="0"/>
+              </a:rPr>
+              <a:t>views</a:t>
+            </a:r>
           </a:p>
         </p:txBody>
       </p:sp>
@@ -13456,6 +13459,7 @@
             </a:endParaRPr>
           </a:p>
           <a:p>
+            <a:pPr algn="ctr"/>
             <a:r>
               <a:rPr lang="en-US" sz="2300" dirty="0">
                 <a:latin typeface="Helvetica" charset="0"/>
@@ -13533,13 +13537,38 @@
             </a:endParaRPr>
           </a:p>
           <a:p>
+            <a:pPr algn="ctr"/>
             <a:r>
               <a:rPr lang="en-US" sz="2300" dirty="0">
                 <a:latin typeface="Helvetica" charset="0"/>
                 <a:ea typeface="Helvetica" charset="0"/>
                 <a:cs typeface="Helvetica" charset="0"/>
               </a:rPr>
-              <a:t>Top 25 DRS items by genre</a:t>
+              <a:t>Top 25 </a:t>
+            </a:r>
+            <a:r>
+              <a:rPr lang="en-US" sz="2300" dirty="0" smtClean="0">
+                <a:latin typeface="Helvetica" charset="0"/>
+                <a:ea typeface="Helvetica" charset="0"/>
+                <a:cs typeface="Helvetica" charset="0"/>
+              </a:rPr>
+              <a:t>viewed </a:t>
+            </a:r>
+            <a:r>
+              <a:rPr lang="en-US" sz="2300" dirty="0" smtClean="0">
+                <a:latin typeface="Helvetica" charset="0"/>
+                <a:ea typeface="Helvetica" charset="0"/>
+                <a:cs typeface="Helvetica" charset="0"/>
+              </a:rPr>
+              <a:t>files by </a:t>
+            </a:r>
+            <a:r>
+              <a:rPr lang="en-US" sz="2300" dirty="0">
+                <a:latin typeface="Helvetica" charset="0"/>
+                <a:ea typeface="Helvetica" charset="0"/>
+                <a:cs typeface="Helvetica" charset="0"/>
+              </a:rPr>
+              <a:t>genre</a:t>
             </a:r>
             <a:r>
               <a:rPr lang="en-US" sz="2300" dirty="0" smtClean="0">
@@ -13565,7 +13594,7 @@
         </p:nvSpPr>
         <p:spPr>
           <a:xfrm>
-            <a:off x="14020801" y="8851662"/>
+            <a:off x="14020801" y="9283462"/>
             <a:ext cx="10689771" cy="858614"/>
           </a:xfrm>
           <a:prstGeom prst="rect">
@@ -13770,13 +13799,13 @@
           <p:nvPr>
             <p:extLst>
               <p:ext uri="{D42A27DB-BD31-4B8C-83A1-F6EECF244321}">
-                <p14:modId xmlns:p14="http://schemas.microsoft.com/office/powerpoint/2010/main" val="124706072"/>
+                <p14:modId xmlns:p14="http://schemas.microsoft.com/office/powerpoint/2010/main" val="431726218"/>
               </p:ext>
             </p:extLst>
           </p:nvPr>
         </p:nvGraphicFramePr>
         <p:xfrm>
-          <a:off x="15010682" y="10469081"/>
+          <a:off x="15010682" y="10189681"/>
           <a:ext cx="8627911" cy="6019800"/>
         </p:xfrm>
         <a:graphic>
@@ -13792,13 +13821,13 @@
           <p:nvPr>
             <p:extLst>
               <p:ext uri="{D42A27DB-BD31-4B8C-83A1-F6EECF244321}">
-                <p14:modId xmlns:p14="http://schemas.microsoft.com/office/powerpoint/2010/main" val="2138396279"/>
+                <p14:modId xmlns:p14="http://schemas.microsoft.com/office/powerpoint/2010/main" val="1822786360"/>
               </p:ext>
             </p:extLst>
           </p:nvPr>
         </p:nvGraphicFramePr>
         <p:xfrm>
-          <a:off x="21107736" y="10472501"/>
+          <a:off x="21107736" y="10193101"/>
           <a:ext cx="8627911" cy="6019800"/>
         </p:xfrm>
         <a:graphic>
@@ -14151,7 +14180,7 @@
         <p:spPr>
           <a:xfrm>
             <a:off x="9197558" y="34319706"/>
-            <a:ext cx="9965085" cy="1975843"/>
+            <a:ext cx="10354466" cy="1975843"/>
           </a:xfrm>
           <a:prstGeom prst="rect">
             <a:avLst/>
@@ -14201,13 +14230,32 @@
                 <a:ea typeface="Helvetica" charset="0"/>
                 <a:cs typeface="Helvetica" charset="0"/>
               </a:rPr>
-              <a:t>We also would like to use the data to improve our workflows. For example, the chart on the right can tell us the best time of day to schedule system deploys (5am).</a:t>
-            </a:r>
-            <a:endParaRPr lang="en-US" sz="2300" dirty="0">
-              <a:latin typeface="Helvetica" charset="0"/>
-              <a:ea typeface="Helvetica" charset="0"/>
-              <a:cs typeface="Helvetica" charset="0"/>
-            </a:endParaRPr>
+              <a:t>We also would like to use the data to improve our workflows. For example, the chart on the right can tell us the best time of day to schedule system deploys </a:t>
+            </a:r>
+            <a:r>
+              <a:rPr lang="en-US" sz="2300" dirty="0" smtClean="0">
+                <a:latin typeface="Helvetica" charset="0"/>
+                <a:ea typeface="Helvetica" charset="0"/>
+                <a:cs typeface="Helvetica" charset="0"/>
+              </a:rPr>
+              <a:t>(between midnight and </a:t>
+            </a:r>
+            <a:r>
+              <a:rPr lang="en-US" sz="2300" dirty="0" smtClean="0">
+                <a:latin typeface="Helvetica" charset="0"/>
+                <a:ea typeface="Helvetica" charset="0"/>
+                <a:cs typeface="Helvetica" charset="0"/>
+              </a:rPr>
+              <a:t>6 am</a:t>
+            </a:r>
+            <a:r>
+              <a:rPr lang="en-US" sz="2300" dirty="0">
+                <a:latin typeface="Helvetica" charset="0"/>
+                <a:ea typeface="Helvetica" charset="0"/>
+                <a:cs typeface="Helvetica" charset="0"/>
+              </a:rPr>
+              <a:t>).</a:t>
+            </a:r>
           </a:p>
         </p:txBody>
       </p:sp>
@@ -14220,7 +14268,7 @@
         <p:spPr>
           <a:xfrm>
             <a:off x="9219184" y="30571803"/>
-            <a:ext cx="9943459" cy="3871746"/>
+            <a:ext cx="10067354" cy="3871746"/>
           </a:xfrm>
           <a:prstGeom prst="rect">
             <a:avLst/>
@@ -14273,11 +14321,6 @@
               </a:rPr>
               <a:t>Inserting additional data points into the impressions table</a:t>
             </a:r>
-            <a:endParaRPr lang="en-US" sz="2300" dirty="0">
-              <a:latin typeface="Helvetica" charset="0"/>
-              <a:ea typeface="Helvetica" charset="0"/>
-              <a:cs typeface="Helvetica" charset="0"/>
-            </a:endParaRPr>
           </a:p>
           <a:p>
             <a:pPr marL="342900" indent="-342900">
@@ -14292,11 +14335,6 @@
               </a:rPr>
               <a:t>Operationalizing the process for adding new agents to the bot list</a:t>
             </a:r>
-            <a:endParaRPr lang="en-US" sz="2300" dirty="0">
-              <a:latin typeface="Helvetica" charset="0"/>
-              <a:ea typeface="Helvetica" charset="0"/>
-              <a:cs typeface="Helvetica" charset="0"/>
-            </a:endParaRPr>
           </a:p>
           <a:p>
             <a:pPr marL="342900" indent="-342900">
@@ -14311,11 +14349,6 @@
               </a:rPr>
               <a:t>Improving our statistical displays, including aggregated statistics and geographic visualizations</a:t>
             </a:r>
-            <a:endParaRPr lang="en-US" sz="2300" dirty="0">
-              <a:latin typeface="Helvetica" charset="0"/>
-              <a:ea typeface="Helvetica" charset="0"/>
-              <a:cs typeface="Helvetica" charset="0"/>
-            </a:endParaRPr>
           </a:p>
         </p:txBody>
       </p:sp>
@@ -14328,7 +14361,7 @@
         <p:spPr>
           <a:xfrm>
             <a:off x="9206401" y="26418924"/>
-            <a:ext cx="10859737" cy="2769906"/>
+            <a:ext cx="10080137" cy="2769906"/>
           </a:xfrm>
           <a:prstGeom prst="rect">
             <a:avLst/>
@@ -14432,11 +14465,6 @@
               </a:rPr>
               <a:t>*, *slurp*, and *spider*</a:t>
             </a:r>
-            <a:endParaRPr lang="en-US" sz="2300" dirty="0">
-              <a:latin typeface="Helvetica" charset="0"/>
-              <a:ea typeface="Helvetica" charset="0"/>
-              <a:cs typeface="Helvetica" charset="0"/>
-            </a:endParaRPr>
           </a:p>
         </p:txBody>
       </p:sp>
@@ -14449,7 +14477,7 @@
         <p:spPr>
           <a:xfrm>
             <a:off x="9207925" y="23482554"/>
-            <a:ext cx="10858075" cy="3046905"/>
+            <a:ext cx="10798039" cy="3046905"/>
           </a:xfrm>
           <a:prstGeom prst="rect">
             <a:avLst/>
@@ -14478,7 +14506,17 @@
                 <a:latin typeface="Gotham Medium"/>
                 <a:cs typeface="Gotham Medium"/>
               </a:rPr>
-              <a:t>Important Processing Values</a:t>
+              <a:t>Significant Processing </a:t>
+            </a:r>
+            <a:r>
+              <a:rPr lang="en-US" sz="3600" dirty="0" smtClean="0">
+                <a:solidFill>
+                  <a:srgbClr val="2C3E50"/>
+                </a:solidFill>
+                <a:latin typeface="Gotham Medium"/>
+                <a:cs typeface="Gotham Medium"/>
+              </a:rPr>
+              <a:t>Values</a:t>
             </a:r>
             <a:endParaRPr lang="en-US" sz="2000" dirty="0" smtClean="0">
               <a:solidFill>
@@ -14505,12 +14543,20 @@
               <a:buChar char="•"/>
             </a:pPr>
             <a:r>
-              <a:rPr lang="en-US" sz="2300" b="1" dirty="0">
+              <a:rPr lang="en-US" sz="2300" b="1" dirty="0" smtClean="0">
                 <a:latin typeface="Helvetica" charset="0"/>
                 <a:ea typeface="Helvetica" charset="0"/>
                 <a:cs typeface="Helvetica" charset="0"/>
               </a:rPr>
-              <a:t>Status</a:t>
+              <a:t>"status"</a:t>
+            </a:r>
+            <a:r>
+              <a:rPr lang="en-US" sz="2300" dirty="0" smtClean="0">
+                <a:latin typeface="Helvetica" charset="0"/>
+                <a:ea typeface="Helvetica" charset="0"/>
+                <a:cs typeface="Helvetica" charset="0"/>
+              </a:rPr>
+              <a:t>: </a:t>
             </a:r>
             <a:r>
               <a:rPr lang="en-US" sz="2300" dirty="0">
@@ -14518,13 +14564,8 @@
                 <a:ea typeface="Helvetica" charset="0"/>
                 <a:cs typeface="Helvetica" charset="0"/>
               </a:rPr>
-              <a:t>: Files that are queued for download will be marked INCOMPLETE and are ignored until the download is finished.</a:t>
-            </a:r>
-            <a:endParaRPr lang="en-US" sz="2300" dirty="0">
-              <a:latin typeface="Helvetica" charset="0"/>
-              <a:ea typeface="Helvetica" charset="0"/>
-              <a:cs typeface="Helvetica" charset="0"/>
-            </a:endParaRPr>
+              <a:t>Files that are queued for download will be marked INCOMPLETE and are ignored until the download is finished.</a:t>
+            </a:r>
           </a:p>
           <a:p>
             <a:pPr marL="342900" indent="-342900">
@@ -14532,12 +14573,20 @@
               <a:buChar char="•"/>
             </a:pPr>
             <a:r>
-              <a:rPr lang="en-US" sz="2300" b="1" dirty="0">
+              <a:rPr lang="en-US" sz="2300" b="1" dirty="0" smtClean="0">
                 <a:latin typeface="Helvetica" charset="0"/>
                 <a:ea typeface="Helvetica" charset="0"/>
                 <a:cs typeface="Helvetica" charset="0"/>
               </a:rPr>
-              <a:t>Public</a:t>
+              <a:t>"public"</a:t>
+            </a:r>
+            <a:r>
+              <a:rPr lang="en-US" sz="2300" dirty="0" smtClean="0">
+                <a:latin typeface="Helvetica" charset="0"/>
+                <a:ea typeface="Helvetica" charset="0"/>
+                <a:cs typeface="Helvetica" charset="0"/>
+              </a:rPr>
+              <a:t>: </a:t>
             </a:r>
             <a:r>
               <a:rPr lang="en-US" sz="2300" dirty="0">
@@ -14545,13 +14594,8 @@
                 <a:ea typeface="Helvetica" charset="0"/>
                 <a:cs typeface="Helvetica" charset="0"/>
               </a:rPr>
-              <a:t>: All impressions are initially set to TRUE. Once processed, impressions with agents on the bot list are marked as FALSE.</a:t>
-            </a:r>
-            <a:endParaRPr lang="en-US" sz="2300" dirty="0">
-              <a:latin typeface="Helvetica" charset="0"/>
-              <a:ea typeface="Helvetica" charset="0"/>
-              <a:cs typeface="Helvetica" charset="0"/>
-            </a:endParaRPr>
+              <a:t>All impressions are initially set to TRUE. Once processed, impressions with agents on the bot list are marked as FALSE.</a:t>
+            </a:r>
           </a:p>
           <a:p>
             <a:pPr marL="342900" indent="-342900">
@@ -14559,20 +14603,12 @@
               <a:buChar char="•"/>
             </a:pPr>
             <a:r>
-              <a:rPr lang="en-US" sz="2300" b="1" dirty="0">
+              <a:rPr lang="en-US" sz="2300" b="1" dirty="0" smtClean="0">
                 <a:latin typeface="Helvetica" charset="0"/>
                 <a:ea typeface="Helvetica" charset="0"/>
                 <a:cs typeface="Helvetica" charset="0"/>
               </a:rPr>
-              <a:t>Processed</a:t>
-            </a:r>
-            <a:r>
-              <a:rPr lang="en-US" sz="2300" dirty="0">
-                <a:latin typeface="Helvetica" charset="0"/>
-                <a:ea typeface="Helvetica" charset="0"/>
-                <a:cs typeface="Helvetica" charset="0"/>
-              </a:rPr>
-              <a:t>: </a:t>
+              <a:t>"processed"</a:t>
             </a:r>
             <a:r>
               <a:rPr lang="en-US" sz="2300" dirty="0" smtClean="0">
@@ -14580,7 +14616,7 @@
                 <a:ea typeface="Helvetica" charset="0"/>
                 <a:cs typeface="Helvetica" charset="0"/>
               </a:rPr>
-              <a:t>All </a:t>
+              <a:t>: All </a:t>
             </a:r>
             <a:r>
               <a:rPr lang="en-US" sz="2300" dirty="0">
@@ -14590,11 +14626,6 @@
               </a:rPr>
               <a:t>impressions are initially set to FALSE. Once processed, the value is set to TRUE.</a:t>
             </a:r>
-            <a:endParaRPr lang="en-US" sz="2300" dirty="0">
-              <a:latin typeface="Helvetica" charset="0"/>
-              <a:ea typeface="Helvetica" charset="0"/>
-              <a:cs typeface="Helvetica" charset="0"/>
-            </a:endParaRPr>
           </a:p>
         </p:txBody>
       </p:sp>

</xml_diff>

<commit_message>
Fixing pie chart borders
</commit_message>
<xml_diff>
--- a/Presentations/Open Repositories 2016/Statistics/SweeneySarahORstatistics33x46.pptx
+++ b/Presentations/Open Repositories 2016/Statistics/SweeneySarahORstatistics33x46.pptx
@@ -227,7 +227,7 @@
             </c:strRef>
           </c:tx>
           <c:spPr>
-            <a:ln>
+            <a:ln w="38100">
               <a:solidFill>
                 <a:srgbClr val="ECF0F1"/>
               </a:solidFill>
@@ -240,7 +240,7 @@
               <a:solidFill>
                 <a:srgbClr val="998FB8"/>
               </a:solidFill>
-              <a:ln w="19050">
+              <a:ln w="38100">
                 <a:solidFill>
                   <a:srgbClr val="ECF0F1"/>
                 </a:solidFill>
@@ -255,7 +255,7 @@
               <a:solidFill>
                 <a:srgbClr val="8FA7AD"/>
               </a:solidFill>
-              <a:ln w="19050">
+              <a:ln w="38100">
                 <a:solidFill>
                   <a:srgbClr val="ECF0F1"/>
                 </a:solidFill>
@@ -270,7 +270,7 @@
               <a:solidFill>
                 <a:schemeClr val="accent3"/>
               </a:solidFill>
-              <a:ln w="19050">
+              <a:ln w="38100">
                 <a:solidFill>
                   <a:srgbClr val="ECF0F1"/>
                 </a:solidFill>
@@ -285,7 +285,7 @@
               <a:solidFill>
                 <a:schemeClr val="accent4"/>
               </a:solidFill>
-              <a:ln w="19050">
+              <a:ln w="38100">
                 <a:solidFill>
                   <a:srgbClr val="ECF0F1"/>
                 </a:solidFill>
@@ -1399,7 +1399,7 @@
             </c:strRef>
           </c:tx>
           <c:spPr>
-            <a:ln>
+            <a:ln w="38100">
               <a:solidFill>
                 <a:srgbClr val="ECF0F1"/>
               </a:solidFill>
@@ -1412,7 +1412,7 @@
               <a:solidFill>
                 <a:srgbClr val="998FB8"/>
               </a:solidFill>
-              <a:ln w="19050">
+              <a:ln w="38100">
                 <a:solidFill>
                   <a:srgbClr val="ECF0F1"/>
                 </a:solidFill>
@@ -1427,7 +1427,7 @@
               <a:solidFill>
                 <a:srgbClr val="8FA7AD"/>
               </a:solidFill>
-              <a:ln w="19050">
+              <a:ln w="38100">
                 <a:solidFill>
                   <a:srgbClr val="ECF0F1"/>
                 </a:solidFill>
@@ -1442,7 +1442,7 @@
               <a:solidFill>
                 <a:schemeClr val="accent3"/>
               </a:solidFill>
-              <a:ln w="19050">
+              <a:ln w="38100">
                 <a:solidFill>
                   <a:srgbClr val="ECF0F1"/>
                 </a:solidFill>
@@ -1457,7 +1457,7 @@
               <a:solidFill>
                 <a:schemeClr val="accent4"/>
               </a:solidFill>
-              <a:ln w="19050">
+              <a:ln w="38100">
                 <a:solidFill>
                   <a:srgbClr val="ECF0F1"/>
                 </a:solidFill>
@@ -1688,7 +1688,7 @@
             </c:strRef>
           </c:tx>
           <c:spPr>
-            <a:ln>
+            <a:ln w="38100">
               <a:solidFill>
                 <a:srgbClr val="ECF0F1"/>
               </a:solidFill>
@@ -1701,7 +1701,7 @@
               <a:solidFill>
                 <a:srgbClr val="998FB8"/>
               </a:solidFill>
-              <a:ln w="19050">
+              <a:ln w="38100">
                 <a:solidFill>
                   <a:srgbClr val="ECF0F1"/>
                 </a:solidFill>
@@ -1716,7 +1716,7 @@
               <a:solidFill>
                 <a:srgbClr val="8FA7AD"/>
               </a:solidFill>
-              <a:ln w="19050">
+              <a:ln w="38100">
                 <a:solidFill>
                   <a:srgbClr val="ECF0F1"/>
                 </a:solidFill>
@@ -1731,7 +1731,7 @@
               <a:solidFill>
                 <a:schemeClr val="accent3"/>
               </a:solidFill>
-              <a:ln w="19050">
+              <a:ln w="38100">
                 <a:solidFill>
                   <a:srgbClr val="ECF0F1"/>
                 </a:solidFill>
@@ -1746,7 +1746,7 @@
               <a:solidFill>
                 <a:schemeClr val="accent4"/>
               </a:solidFill>
-              <a:ln w="19050">
+              <a:ln w="38100">
                 <a:solidFill>
                   <a:srgbClr val="ECF0F1"/>
                 </a:solidFill>
@@ -1908,7 +1908,7 @@
           <c:idx val="0"/>
           <c:order val="0"/>
           <c:spPr>
-            <a:ln>
+            <a:ln w="38100">
               <a:solidFill>
                 <a:schemeClr val="bg1"/>
               </a:solidFill>
@@ -1921,7 +1921,7 @@
               <a:solidFill>
                 <a:srgbClr val="D1A6AB"/>
               </a:solidFill>
-              <a:ln w="19050">
+              <a:ln w="38100">
                 <a:solidFill>
                   <a:schemeClr val="bg1"/>
                 </a:solidFill>
@@ -1936,7 +1936,7 @@
               <a:solidFill>
                 <a:srgbClr val="A8ACC4"/>
               </a:solidFill>
-              <a:ln w="19050">
+              <a:ln w="38100">
                 <a:solidFill>
                   <a:schemeClr val="bg1"/>
                 </a:solidFill>
@@ -1951,7 +1951,7 @@
               <a:solidFill>
                 <a:srgbClr val="B4A59E"/>
               </a:solidFill>
-              <a:ln w="19050">
+              <a:ln w="38100">
                 <a:solidFill>
                   <a:schemeClr val="bg1"/>
                 </a:solidFill>
@@ -1966,7 +1966,7 @@
               <a:solidFill>
                 <a:srgbClr val="A27082"/>
               </a:solidFill>
-              <a:ln w="19050">
+              <a:ln w="38100">
                 <a:solidFill>
                   <a:schemeClr val="bg1"/>
                 </a:solidFill>
@@ -2489,7 +2489,7 @@
             </c:strRef>
           </c:tx>
           <c:spPr>
-            <a:ln>
+            <a:ln w="38100">
               <a:solidFill>
                 <a:schemeClr val="bg1"/>
               </a:solidFill>
@@ -2502,7 +2502,7 @@
               <a:solidFill>
                 <a:srgbClr val="A8ACC4"/>
               </a:solidFill>
-              <a:ln w="19050">
+              <a:ln w="38100">
                 <a:solidFill>
                   <a:schemeClr val="bg1"/>
                 </a:solidFill>
@@ -2517,7 +2517,7 @@
               <a:solidFill>
                 <a:srgbClr val="B4A59E"/>
               </a:solidFill>
-              <a:ln w="19050">
+              <a:ln w="38100">
                 <a:solidFill>
                   <a:schemeClr val="bg1"/>
                 </a:solidFill>
@@ -2532,7 +2532,7 @@
               <a:solidFill>
                 <a:srgbClr val="A27082"/>
               </a:solidFill>
-              <a:ln w="19050">
+              <a:ln w="38100">
                 <a:solidFill>
                   <a:schemeClr val="bg1"/>
                 </a:solidFill>
@@ -2547,7 +2547,7 @@
               <a:solidFill>
                 <a:srgbClr val="8FA7AD"/>
               </a:solidFill>
-              <a:ln w="19050">
+              <a:ln w="38100">
                 <a:solidFill>
                   <a:schemeClr val="bg1"/>
                 </a:solidFill>
@@ -2562,7 +2562,7 @@
               <a:solidFill>
                 <a:srgbClr val="D1A6AB"/>
               </a:solidFill>
-              <a:ln w="19050">
+              <a:ln w="38100">
                 <a:solidFill>
                   <a:schemeClr val="bg1"/>
                 </a:solidFill>
@@ -2577,7 +2577,7 @@
               <a:solidFill>
                 <a:srgbClr val="8E8E9E"/>
               </a:solidFill>
-              <a:ln w="19050">
+              <a:ln w="38100">
                 <a:solidFill>
                   <a:schemeClr val="bg1"/>
                 </a:solidFill>
@@ -13759,7 +13759,7 @@
           <p:nvPr>
             <p:extLst>
               <p:ext uri="{D42A27DB-BD31-4B8C-83A1-F6EECF244321}">
-                <p14:modId xmlns:p14="http://schemas.microsoft.com/office/powerpoint/2010/main" val="650263343"/>
+                <p14:modId xmlns:p14="http://schemas.microsoft.com/office/powerpoint/2010/main" val="848645842"/>
               </p:ext>
             </p:extLst>
           </p:nvPr>
@@ -19010,7 +19010,7 @@
           <p:nvPr>
             <p:extLst>
               <p:ext uri="{D42A27DB-BD31-4B8C-83A1-F6EECF244321}">
-                <p14:modId xmlns:p14="http://schemas.microsoft.com/office/powerpoint/2010/main" val="431726218"/>
+                <p14:modId xmlns:p14="http://schemas.microsoft.com/office/powerpoint/2010/main" val="546674574"/>
               </p:ext>
             </p:extLst>
           </p:nvPr>
@@ -19032,7 +19032,7 @@
           <p:nvPr>
             <p:extLst>
               <p:ext uri="{D42A27DB-BD31-4B8C-83A1-F6EECF244321}">
-                <p14:modId xmlns:p14="http://schemas.microsoft.com/office/powerpoint/2010/main" val="1822786360"/>
+                <p14:modId xmlns:p14="http://schemas.microsoft.com/office/powerpoint/2010/main" val="2119466331"/>
               </p:ext>
             </p:extLst>
           </p:nvPr>
@@ -19054,7 +19054,7 @@
           <p:nvPr>
             <p:extLst>
               <p:ext uri="{D42A27DB-BD31-4B8C-83A1-F6EECF244321}">
-                <p14:modId xmlns:p14="http://schemas.microsoft.com/office/powerpoint/2010/main" val="288555982"/>
+                <p14:modId xmlns:p14="http://schemas.microsoft.com/office/powerpoint/2010/main" val="1733391166"/>
               </p:ext>
             </p:extLst>
           </p:nvPr>
@@ -21134,7 +21134,7 @@
           <p:nvPr>
             <p:extLst>
               <p:ext uri="{D42A27DB-BD31-4B8C-83A1-F6EECF244321}">
-                <p14:modId xmlns:p14="http://schemas.microsoft.com/office/powerpoint/2010/main" val="403013862"/>
+                <p14:modId xmlns:p14="http://schemas.microsoft.com/office/powerpoint/2010/main" val="445305669"/>
               </p:ext>
             </p:extLst>
           </p:nvPr>

</xml_diff>

<commit_message>
final changes before printer
</commit_message>
<xml_diff>
--- a/Presentations/Open Repositories 2016/Statistics/SweeneySarahORstatistics33x46.pptx
+++ b/Presentations/Open Repositories 2016/Statistics/SweeneySarahORstatistics33x46.pptx
@@ -10387,7 +10387,7 @@
             </a:lvl1pPr>
           </a:lstStyle>
           <a:p>
-            <a:endParaRPr lang="en-US"/>
+            <a:endParaRPr lang="en-US" dirty="0"/>
           </a:p>
         </p:txBody>
       </p:sp>
@@ -10420,9 +10420,9 @@
           <a:p>
             <a:fld id="{7F7A6B22-0AC0-E647-B4AB-610E8EE21CF0}" type="datetimeFigureOut">
               <a:rPr lang="en-US" smtClean="0"/>
-              <a:t>6/1/16</a:t>
+              <a:t>6/2/16</a:t>
             </a:fld>
-            <a:endParaRPr lang="en-US"/>
+            <a:endParaRPr lang="en-US" dirty="0"/>
           </a:p>
         </p:txBody>
       </p:sp>
@@ -10455,7 +10455,7 @@
           <a:bodyPr vert="horz" lIns="91440" tIns="45720" rIns="91440" bIns="45720" rtlCol="0" anchor="ctr"/>
           <a:lstStyle/>
           <a:p>
-            <a:endParaRPr lang="en-US"/>
+            <a:endParaRPr lang="en-US" dirty="0"/>
           </a:p>
         </p:txBody>
       </p:sp>
@@ -10546,7 +10546,7 @@
             </a:lvl1pPr>
           </a:lstStyle>
           <a:p>
-            <a:endParaRPr lang="en-US"/>
+            <a:endParaRPr lang="en-US" dirty="0"/>
           </a:p>
         </p:txBody>
       </p:sp>
@@ -10581,7 +10581,7 @@
               <a:rPr lang="en-US" smtClean="0"/>
               <a:t>‹#›</a:t>
             </a:fld>
-            <a:endParaRPr lang="en-US"/>
+            <a:endParaRPr lang="en-US" dirty="0"/>
           </a:p>
         </p:txBody>
       </p:sp>
@@ -10755,7 +10755,7 @@
               <a:rPr lang="en-US" smtClean="0"/>
               <a:t>1</a:t>
             </a:fld>
-            <a:endParaRPr lang="en-US"/>
+            <a:endParaRPr lang="en-US" dirty="0"/>
           </a:p>
         </p:txBody>
       </p:sp>
@@ -10839,7 +10839,7 @@
               <a:rPr lang="en-US" smtClean="0"/>
               <a:t>2</a:t>
             </a:fld>
-            <a:endParaRPr lang="en-US"/>
+            <a:endParaRPr lang="en-US" dirty="0"/>
           </a:p>
         </p:txBody>
       </p:sp>
@@ -10987,9 +10987,9 @@
           <a:p>
             <a:fld id="{180E51A3-104B-B744-9E20-3025749670C7}" type="datetimeFigureOut">
               <a:rPr lang="en-US" smtClean="0"/>
-              <a:t>6/1/16</a:t>
+              <a:t>6/2/16</a:t>
             </a:fld>
-            <a:endParaRPr lang="en-US"/>
+            <a:endParaRPr lang="en-US" dirty="0"/>
           </a:p>
         </p:txBody>
       </p:sp>
@@ -11008,7 +11008,7 @@
           <a:bodyPr/>
           <a:lstStyle/>
           <a:p>
-            <a:endParaRPr lang="en-US"/>
+            <a:endParaRPr lang="en-US" dirty="0"/>
           </a:p>
         </p:txBody>
       </p:sp>
@@ -11031,7 +11031,7 @@
               <a:rPr lang="en-US" smtClean="0"/>
               <a:t>‹#›</a:t>
             </a:fld>
-            <a:endParaRPr lang="en-US"/>
+            <a:endParaRPr lang="en-US" dirty="0"/>
           </a:p>
         </p:txBody>
       </p:sp>
@@ -11157,9 +11157,9 @@
           <a:p>
             <a:fld id="{180E51A3-104B-B744-9E20-3025749670C7}" type="datetimeFigureOut">
               <a:rPr lang="en-US" smtClean="0"/>
-              <a:t>6/1/16</a:t>
+              <a:t>6/2/16</a:t>
             </a:fld>
-            <a:endParaRPr lang="en-US"/>
+            <a:endParaRPr lang="en-US" dirty="0"/>
           </a:p>
         </p:txBody>
       </p:sp>
@@ -11178,7 +11178,7 @@
           <a:bodyPr/>
           <a:lstStyle/>
           <a:p>
-            <a:endParaRPr lang="en-US"/>
+            <a:endParaRPr lang="en-US" dirty="0"/>
           </a:p>
         </p:txBody>
       </p:sp>
@@ -11201,7 +11201,7 @@
               <a:rPr lang="en-US" smtClean="0"/>
               <a:t>‹#›</a:t>
             </a:fld>
-            <a:endParaRPr lang="en-US"/>
+            <a:endParaRPr lang="en-US" dirty="0"/>
           </a:p>
         </p:txBody>
       </p:sp>
@@ -11337,9 +11337,9 @@
           <a:p>
             <a:fld id="{180E51A3-104B-B744-9E20-3025749670C7}" type="datetimeFigureOut">
               <a:rPr lang="en-US" smtClean="0"/>
-              <a:t>6/1/16</a:t>
+              <a:t>6/2/16</a:t>
             </a:fld>
-            <a:endParaRPr lang="en-US"/>
+            <a:endParaRPr lang="en-US" dirty="0"/>
           </a:p>
         </p:txBody>
       </p:sp>
@@ -11358,7 +11358,7 @@
           <a:bodyPr/>
           <a:lstStyle/>
           <a:p>
-            <a:endParaRPr lang="en-US"/>
+            <a:endParaRPr lang="en-US" dirty="0"/>
           </a:p>
         </p:txBody>
       </p:sp>
@@ -11381,7 +11381,7 @@
               <a:rPr lang="en-US" smtClean="0"/>
               <a:t>‹#›</a:t>
             </a:fld>
-            <a:endParaRPr lang="en-US"/>
+            <a:endParaRPr lang="en-US" dirty="0"/>
           </a:p>
         </p:txBody>
       </p:sp>
@@ -11507,9 +11507,9 @@
           <a:p>
             <a:fld id="{180E51A3-104B-B744-9E20-3025749670C7}" type="datetimeFigureOut">
               <a:rPr lang="en-US" smtClean="0"/>
-              <a:t>6/1/16</a:t>
+              <a:t>6/2/16</a:t>
             </a:fld>
-            <a:endParaRPr lang="en-US"/>
+            <a:endParaRPr lang="en-US" dirty="0"/>
           </a:p>
         </p:txBody>
       </p:sp>
@@ -11528,7 +11528,7 @@
           <a:bodyPr/>
           <a:lstStyle/>
           <a:p>
-            <a:endParaRPr lang="en-US"/>
+            <a:endParaRPr lang="en-US" dirty="0"/>
           </a:p>
         </p:txBody>
       </p:sp>
@@ -11551,7 +11551,7 @@
               <a:rPr lang="en-US" smtClean="0"/>
               <a:t>‹#›</a:t>
             </a:fld>
-            <a:endParaRPr lang="en-US"/>
+            <a:endParaRPr lang="en-US" dirty="0"/>
           </a:p>
         </p:txBody>
       </p:sp>
@@ -11751,9 +11751,9 @@
           <a:p>
             <a:fld id="{180E51A3-104B-B744-9E20-3025749670C7}" type="datetimeFigureOut">
               <a:rPr lang="en-US" smtClean="0"/>
-              <a:t>6/1/16</a:t>
+              <a:t>6/2/16</a:t>
             </a:fld>
-            <a:endParaRPr lang="en-US"/>
+            <a:endParaRPr lang="en-US" dirty="0"/>
           </a:p>
         </p:txBody>
       </p:sp>
@@ -11772,7 +11772,7 @@
           <a:bodyPr/>
           <a:lstStyle/>
           <a:p>
-            <a:endParaRPr lang="en-US"/>
+            <a:endParaRPr lang="en-US" dirty="0"/>
           </a:p>
         </p:txBody>
       </p:sp>
@@ -11795,7 +11795,7 @@
               <a:rPr lang="en-US" smtClean="0"/>
               <a:t>‹#›</a:t>
             </a:fld>
-            <a:endParaRPr lang="en-US"/>
+            <a:endParaRPr lang="en-US" dirty="0"/>
           </a:p>
         </p:txBody>
       </p:sp>
@@ -11983,9 +11983,9 @@
           <a:p>
             <a:fld id="{180E51A3-104B-B744-9E20-3025749670C7}" type="datetimeFigureOut">
               <a:rPr lang="en-US" smtClean="0"/>
-              <a:t>6/1/16</a:t>
+              <a:t>6/2/16</a:t>
             </a:fld>
-            <a:endParaRPr lang="en-US"/>
+            <a:endParaRPr lang="en-US" dirty="0"/>
           </a:p>
         </p:txBody>
       </p:sp>
@@ -12004,7 +12004,7 @@
           <a:bodyPr/>
           <a:lstStyle/>
           <a:p>
-            <a:endParaRPr lang="en-US"/>
+            <a:endParaRPr lang="en-US" dirty="0"/>
           </a:p>
         </p:txBody>
       </p:sp>
@@ -12027,7 +12027,7 @@
               <a:rPr lang="en-US" smtClean="0"/>
               <a:t>‹#›</a:t>
             </a:fld>
-            <a:endParaRPr lang="en-US"/>
+            <a:endParaRPr lang="en-US" dirty="0"/>
           </a:p>
         </p:txBody>
       </p:sp>
@@ -12350,9 +12350,9 @@
           <a:p>
             <a:fld id="{180E51A3-104B-B744-9E20-3025749670C7}" type="datetimeFigureOut">
               <a:rPr lang="en-US" smtClean="0"/>
-              <a:t>6/1/16</a:t>
+              <a:t>6/2/16</a:t>
             </a:fld>
-            <a:endParaRPr lang="en-US"/>
+            <a:endParaRPr lang="en-US" dirty="0"/>
           </a:p>
         </p:txBody>
       </p:sp>
@@ -12371,7 +12371,7 @@
           <a:bodyPr/>
           <a:lstStyle/>
           <a:p>
-            <a:endParaRPr lang="en-US"/>
+            <a:endParaRPr lang="en-US" dirty="0"/>
           </a:p>
         </p:txBody>
       </p:sp>
@@ -12394,7 +12394,7 @@
               <a:rPr lang="en-US" smtClean="0"/>
               <a:t>‹#›</a:t>
             </a:fld>
-            <a:endParaRPr lang="en-US"/>
+            <a:endParaRPr lang="en-US" dirty="0"/>
           </a:p>
         </p:txBody>
       </p:sp>
@@ -12468,9 +12468,9 @@
           <a:p>
             <a:fld id="{180E51A3-104B-B744-9E20-3025749670C7}" type="datetimeFigureOut">
               <a:rPr lang="en-US" smtClean="0"/>
-              <a:t>6/1/16</a:t>
+              <a:t>6/2/16</a:t>
             </a:fld>
-            <a:endParaRPr lang="en-US"/>
+            <a:endParaRPr lang="en-US" dirty="0"/>
           </a:p>
         </p:txBody>
       </p:sp>
@@ -12489,7 +12489,7 @@
           <a:bodyPr/>
           <a:lstStyle/>
           <a:p>
-            <a:endParaRPr lang="en-US"/>
+            <a:endParaRPr lang="en-US" dirty="0"/>
           </a:p>
         </p:txBody>
       </p:sp>
@@ -12512,7 +12512,7 @@
               <a:rPr lang="en-US" smtClean="0"/>
               <a:t>‹#›</a:t>
             </a:fld>
-            <a:endParaRPr lang="en-US"/>
+            <a:endParaRPr lang="en-US" dirty="0"/>
           </a:p>
         </p:txBody>
       </p:sp>
@@ -12563,9 +12563,9 @@
           <a:p>
             <a:fld id="{180E51A3-104B-B744-9E20-3025749670C7}" type="datetimeFigureOut">
               <a:rPr lang="en-US" smtClean="0"/>
-              <a:t>6/1/16</a:t>
+              <a:t>6/2/16</a:t>
             </a:fld>
-            <a:endParaRPr lang="en-US"/>
+            <a:endParaRPr lang="en-US" dirty="0"/>
           </a:p>
         </p:txBody>
       </p:sp>
@@ -12584,7 +12584,7 @@
           <a:bodyPr/>
           <a:lstStyle/>
           <a:p>
-            <a:endParaRPr lang="en-US"/>
+            <a:endParaRPr lang="en-US" dirty="0"/>
           </a:p>
         </p:txBody>
       </p:sp>
@@ -12607,7 +12607,7 @@
               <a:rPr lang="en-US" smtClean="0"/>
               <a:t>‹#›</a:t>
             </a:fld>
-            <a:endParaRPr lang="en-US"/>
+            <a:endParaRPr lang="en-US" dirty="0"/>
           </a:p>
         </p:txBody>
       </p:sp>
@@ -12840,9 +12840,9 @@
           <a:p>
             <a:fld id="{180E51A3-104B-B744-9E20-3025749670C7}" type="datetimeFigureOut">
               <a:rPr lang="en-US" smtClean="0"/>
-              <a:t>6/1/16</a:t>
+              <a:t>6/2/16</a:t>
             </a:fld>
-            <a:endParaRPr lang="en-US"/>
+            <a:endParaRPr lang="en-US" dirty="0"/>
           </a:p>
         </p:txBody>
       </p:sp>
@@ -12861,7 +12861,7 @@
           <a:bodyPr/>
           <a:lstStyle/>
           <a:p>
-            <a:endParaRPr lang="en-US"/>
+            <a:endParaRPr lang="en-US" dirty="0"/>
           </a:p>
         </p:txBody>
       </p:sp>
@@ -12884,7 +12884,7 @@
               <a:rPr lang="en-US" smtClean="0"/>
               <a:t>‹#›</a:t>
             </a:fld>
-            <a:endParaRPr lang="en-US"/>
+            <a:endParaRPr lang="en-US" dirty="0"/>
           </a:p>
         </p:txBody>
       </p:sp>
@@ -13008,7 +13008,7 @@
           </a:lstStyle>
           <a:p>
             <a:r>
-              <a:rPr lang="en-US" smtClean="0"/>
+              <a:rPr lang="en-US" dirty="0" smtClean="0"/>
               <a:t>Drag picture to placeholder or click icon to add</a:t>
             </a:r>
             <a:endParaRPr lang="en-US" dirty="0"/>
@@ -13097,9 +13097,9 @@
           <a:p>
             <a:fld id="{180E51A3-104B-B744-9E20-3025749670C7}" type="datetimeFigureOut">
               <a:rPr lang="en-US" smtClean="0"/>
-              <a:t>6/1/16</a:t>
+              <a:t>6/2/16</a:t>
             </a:fld>
-            <a:endParaRPr lang="en-US"/>
+            <a:endParaRPr lang="en-US" dirty="0"/>
           </a:p>
         </p:txBody>
       </p:sp>
@@ -13118,7 +13118,7 @@
           <a:bodyPr/>
           <a:lstStyle/>
           <a:p>
-            <a:endParaRPr lang="en-US"/>
+            <a:endParaRPr lang="en-US" dirty="0"/>
           </a:p>
         </p:txBody>
       </p:sp>
@@ -13141,7 +13141,7 @@
               <a:rPr lang="en-US" smtClean="0"/>
               <a:t>‹#›</a:t>
             </a:fld>
-            <a:endParaRPr lang="en-US"/>
+            <a:endParaRPr lang="en-US" dirty="0"/>
           </a:p>
         </p:txBody>
       </p:sp>
@@ -13310,9 +13310,9 @@
           <a:p>
             <a:fld id="{180E51A3-104B-B744-9E20-3025749670C7}" type="datetimeFigureOut">
               <a:rPr lang="en-US" smtClean="0"/>
-              <a:t>6/1/16</a:t>
+              <a:t>6/2/16</a:t>
             </a:fld>
-            <a:endParaRPr lang="en-US"/>
+            <a:endParaRPr lang="en-US" dirty="0"/>
           </a:p>
         </p:txBody>
       </p:sp>
@@ -13349,7 +13349,7 @@
             </a:lvl1pPr>
           </a:lstStyle>
           <a:p>
-            <a:endParaRPr lang="en-US"/>
+            <a:endParaRPr lang="en-US" dirty="0"/>
           </a:p>
         </p:txBody>
       </p:sp>
@@ -13390,7 +13390,7 @@
               <a:rPr lang="en-US" smtClean="0"/>
               <a:t>‹#›</a:t>
             </a:fld>
-            <a:endParaRPr lang="en-US"/>
+            <a:endParaRPr lang="en-US" dirty="0"/>
           </a:p>
         </p:txBody>
       </p:sp>
@@ -13947,7 +13947,7 @@
           <a:p>
             <a:pPr algn="ctr"/>
             <a:r>
-              <a:rPr lang="en-US" sz="3600" dirty="0" err="1" smtClean="0">
+              <a:rPr lang="en-US" sz="3600" dirty="0" smtClean="0">
                 <a:solidFill>
                   <a:srgbClr val="3498DB"/>
                 </a:solidFill>
@@ -13975,7 +13975,7 @@
         <p:spPr>
           <a:xfrm>
             <a:off x="962526" y="6038789"/>
-            <a:ext cx="7749673" cy="7140333"/>
+            <a:ext cx="7749673" cy="7494276"/>
           </a:xfrm>
           <a:prstGeom prst="rect">
             <a:avLst/>
@@ -14067,7 +14067,23 @@
                 <a:ea typeface="Helvetica" charset="0"/>
                 <a:cs typeface="Helvetica" charset="0"/>
               </a:rPr>
-              <a:t>Early on in the Digital Repository Service development process we decided not to rely on Google Analytics to collect statistics. While Google Analytics </a:t>
+              <a:t>Early on in the Digital Repository Service </a:t>
+            </a:r>
+            <a:r>
+              <a:rPr lang="en-US" sz="2300" dirty="0" smtClean="0">
+                <a:latin typeface="Helvetica" charset="0"/>
+                <a:ea typeface="Helvetica" charset="0"/>
+                <a:cs typeface="Helvetica" charset="0"/>
+              </a:rPr>
+              <a:t>(DRS) development </a:t>
+            </a:r>
+            <a:r>
+              <a:rPr lang="en-US" sz="2300" dirty="0">
+                <a:latin typeface="Helvetica" charset="0"/>
+                <a:ea typeface="Helvetica" charset="0"/>
+                <a:cs typeface="Helvetica" charset="0"/>
+              </a:rPr>
+              <a:t>process we decided not to rely on Google Analytics to collect statistics. While Google Analytics </a:t>
             </a:r>
             <a:r>
               <a:rPr lang="en-US" sz="2300" dirty="0" smtClean="0">
@@ -14165,7 +14181,55 @@
                 <a:ea typeface="Helvetica" charset="0"/>
                 <a:cs typeface="Helvetica" charset="0"/>
               </a:rPr>
-              <a:t>A seemingly endless number of bots exist to crawl publicly available repository content for harvesting and indexing. These bots help increase the discovery of repository content, but they can also greatly inflate usage statistics. Usage statistics are often gathered using third-party tools, like Google Analytics, which may or may not report their collection methods, and may not be aware of the difference between human and bot consumption. Although content owners tend to prefer higher numbers regardless of the consumer, we want to be able to defend the statistics we are gathering for our repository and declare them to be a genuine reflection of the use of our content by people, not bots.</a:t>
+              <a:t>A seemingly endless number of bots exist to crawl publicly available repository content for harvesting and indexing. These bots help increase the discovery of repository content, but they can also greatly inflate usage statistics. Usage statistics are often gathered </a:t>
+            </a:r>
+            <a:r>
+              <a:rPr lang="en-US" sz="2300" dirty="0" smtClean="0">
+                <a:latin typeface="Helvetica" charset="0"/>
+                <a:ea typeface="Helvetica" charset="0"/>
+                <a:cs typeface="Helvetica" charset="0"/>
+              </a:rPr>
+              <a:t>and analyzed using </a:t>
+            </a:r>
+            <a:r>
+              <a:rPr lang="en-US" sz="2300" dirty="0">
+                <a:latin typeface="Helvetica" charset="0"/>
+                <a:ea typeface="Helvetica" charset="0"/>
+                <a:cs typeface="Helvetica" charset="0"/>
+              </a:rPr>
+              <a:t>third-party tools, like Google Analytics, which may or may not </a:t>
+            </a:r>
+            <a:r>
+              <a:rPr lang="en-US" sz="2300" dirty="0" smtClean="0">
+                <a:latin typeface="Helvetica" charset="0"/>
+                <a:ea typeface="Helvetica" charset="0"/>
+                <a:cs typeface="Helvetica" charset="0"/>
+              </a:rPr>
+              <a:t>be open about its </a:t>
+            </a:r>
+            <a:r>
+              <a:rPr lang="en-US" sz="2300" dirty="0">
+                <a:latin typeface="Helvetica" charset="0"/>
+                <a:ea typeface="Helvetica" charset="0"/>
+                <a:cs typeface="Helvetica" charset="0"/>
+              </a:rPr>
+              <a:t>collection methods, and may not </a:t>
+            </a:r>
+            <a:r>
+              <a:rPr lang="en-US" sz="2300" dirty="0" smtClean="0">
+                <a:latin typeface="Helvetica" charset="0"/>
+                <a:ea typeface="Helvetica" charset="0"/>
+                <a:cs typeface="Helvetica" charset="0"/>
+              </a:rPr>
+              <a:t>differentiate </a:t>
+            </a:r>
+            <a:r>
+              <a:rPr lang="en-US" sz="2300" dirty="0">
+                <a:latin typeface="Helvetica" charset="0"/>
+                <a:ea typeface="Helvetica" charset="0"/>
+                <a:cs typeface="Helvetica" charset="0"/>
+              </a:rPr>
+              <a:t>human and bot consumption. Although content owners tend to prefer higher numbers regardless of the consumer, we want to be able to defend the statistics we are gathering for our repository and declare them to be a genuine reflection of the use of our content by people, not bots.</a:t>
             </a:r>
           </a:p>
         </p:txBody>
@@ -14253,10 +14317,26 @@
                 <a:ea typeface="Helvetica" charset="0"/>
                 <a:cs typeface="Helvetica" charset="0"/>
               </a:rPr>
-              <a:t>We designed a simple method for collecting and processing our usage statistics that allows us to filter out the non-human consumption of our content. Raw, unfiltered DRS usage statistics are stored in </a:t>
+              <a:t>We designed a simple method for collecting and processing our usage statistics that allows us to filter out the non-human consumption of our content. Raw, unfiltered </a:t>
             </a:r>
             <a:r>
-              <a:rPr lang="en-US" sz="2300" smtClean="0">
+              <a:rPr lang="en-US" sz="2300">
+                <a:latin typeface="Helvetica" charset="0"/>
+                <a:ea typeface="Helvetica" charset="0"/>
+                <a:cs typeface="Helvetica" charset="0"/>
+              </a:rPr>
+              <a:t>DRS</a:t>
+            </a:r>
+            <a:r>
+              <a:rPr lang="en-US" sz="2300" dirty="0">
+                <a:latin typeface="Helvetica" charset="0"/>
+                <a:ea typeface="Helvetica" charset="0"/>
+                <a:cs typeface="Helvetica" charset="0"/>
+              </a:rPr>
+              <a:t> usage statistics are stored in </a:t>
+            </a:r>
+            <a:r>
+              <a:rPr lang="en-US" sz="2300" dirty="0" smtClean="0">
                 <a:latin typeface="Helvetica" charset="0"/>
                 <a:ea typeface="Helvetica" charset="0"/>
                 <a:cs typeface="Helvetica" charset="0"/>
@@ -14351,7 +14431,7 @@
           <p:nvPr>
             <p:extLst>
               <p:ext uri="{D42A27DB-BD31-4B8C-83A1-F6EECF244321}">
-                <p14:modId xmlns:p14="http://schemas.microsoft.com/office/powerpoint/2010/main" val="606100655"/>
+                <p14:modId xmlns:p14="http://schemas.microsoft.com/office/powerpoint/2010/main" val="448767735"/>
               </p:ext>
             </p:extLst>
           </p:nvPr>
@@ -14530,7 +14610,7 @@
                     <a:p>
                       <a:pPr algn="ctr" fontAlgn="b"/>
                       <a:r>
-                        <a:rPr lang="en-US" sz="2000" b="1" i="0" u="none" strike="noStrike" dirty="0" err="1">
+                        <a:rPr lang="en-US" sz="2000" b="1" i="0" u="none" strike="noStrike">
                           <a:solidFill>
                             <a:srgbClr val="2C3E50"/>
                           </a:solidFill>
@@ -14663,7 +14743,7 @@
                     <a:p>
                       <a:pPr algn="ctr" fontAlgn="b"/>
                       <a:r>
-                        <a:rPr lang="en-US" sz="2000" b="1" i="0" u="none" strike="noStrike" dirty="0" err="1">
+                        <a:rPr lang="en-US" sz="2000" b="1" i="0" u="none" strike="noStrike">
                           <a:solidFill>
                             <a:srgbClr val="2C3E50"/>
                           </a:solidFill>
@@ -14858,7 +14938,7 @@
                     <a:p>
                       <a:pPr algn="ctr" fontAlgn="b"/>
                       <a:r>
-                        <a:rPr lang="en-US" sz="2000" b="1" i="0" u="none" strike="noStrike" dirty="0" err="1">
+                        <a:rPr lang="en-US" sz="2000" b="1" i="0" u="none" strike="noStrike">
                           <a:solidFill>
                             <a:srgbClr val="2C3E50"/>
                           </a:solidFill>
@@ -14991,7 +15071,7 @@
                     <a:p>
                       <a:pPr algn="ctr" fontAlgn="b"/>
                       <a:r>
-                        <a:rPr lang="en-US" sz="2000" b="1" i="0" u="none" strike="noStrike" dirty="0" err="1">
+                        <a:rPr lang="en-US" sz="2000" b="1" i="0" u="none" strike="noStrike">
                           <a:solidFill>
                             <a:srgbClr val="2C3E50"/>
                           </a:solidFill>
@@ -15062,7 +15142,7 @@
                     <a:p>
                       <a:pPr algn="ctr" fontAlgn="b"/>
                       <a:r>
-                        <a:rPr lang="en-US" sz="2000" b="1" i="0" u="none" strike="noStrike" dirty="0">
+                        <a:rPr lang="en-US" sz="2000" b="1" i="0" u="none" strike="noStrike">
                           <a:solidFill>
                             <a:srgbClr val="2C3E50"/>
                           </a:solidFill>
@@ -15073,6 +15153,15 @@
                         </a:rPr>
                         <a:t>updated_at</a:t>
                       </a:r>
+                      <a:endParaRPr lang="en-US" sz="2000" b="1" i="0" u="none" strike="noStrike" dirty="0">
+                        <a:solidFill>
+                          <a:srgbClr val="2C3E50"/>
+                        </a:solidFill>
+                        <a:effectLst/>
+                        <a:latin typeface="Helvetica" charset="0"/>
+                        <a:ea typeface="Helvetica" charset="0"/>
+                        <a:cs typeface="Helvetica" charset="0"/>
+                      </a:endParaRPr>
                     </a:p>
                   </a:txBody>
                   <a:tcPr marL="12700" marR="12700" marT="12700" marB="0" anchor="ctr">
@@ -15188,7 +15277,7 @@
                     <a:p>
                       <a:pPr algn="l" fontAlgn="b"/>
                       <a:r>
-                        <a:rPr lang="is-IS" sz="2000" b="0" i="0" u="none" strike="noStrike" dirty="0">
+                        <a:rPr lang="is-IS" sz="2000" b="0" i="0" u="none" strike="noStrike">
                           <a:solidFill>
                             <a:srgbClr val="000000"/>
                           </a:solidFill>
@@ -15324,7 +15413,7 @@
                         <a:t>5f79a9934</a:t>
                       </a:r>
                       <a:r>
-                        <a:rPr lang="is-IS" sz="2000" b="0" i="0" u="none" strike="noStrike" dirty="0" smtClean="0">
+                        <a:rPr lang="is-IS" sz="2000" b="0" i="0" u="none" strike="noStrike" smtClean="0">
                           <a:solidFill>
                             <a:srgbClr val="000000"/>
                           </a:solidFill>
@@ -15469,7 +15558,7 @@
                         <a:t>108.20.51</a:t>
                       </a:r>
                       <a:r>
-                        <a:rPr lang="is-IS" sz="2000" b="0" i="0" u="none" strike="noStrike" dirty="0" smtClean="0">
+                        <a:rPr lang="is-IS" sz="2000" b="0" i="0" u="none" strike="noStrike" smtClean="0">
                           <a:solidFill>
                             <a:srgbClr val="000000"/>
                           </a:solidFill>
@@ -15688,7 +15777,7 @@
                         <a:t>iPad; CPU OS</a:t>
                       </a:r>
                       <a:r>
-                        <a:rPr lang="is-IS" sz="2000" b="0" i="0" u="none" strike="noStrike" dirty="0" smtClean="0">
+                        <a:rPr lang="is-IS" sz="2000" b="0" i="0" u="none" strike="noStrike" smtClean="0">
                           <a:solidFill>
                             <a:srgbClr val="000000"/>
                           </a:solidFill>
@@ -16009,7 +16098,7 @@
                     <a:p>
                       <a:pPr algn="l" fontAlgn="b"/>
                       <a:r>
-                        <a:rPr lang="is-IS" sz="2000" b="0" i="0" u="none" strike="noStrike" dirty="0">
+                        <a:rPr lang="is-IS" sz="2000" b="0" i="0" u="none" strike="noStrike">
                           <a:solidFill>
                             <a:srgbClr val="000000"/>
                           </a:solidFill>
@@ -16145,7 +16234,7 @@
                         <a:t>a745a871e</a:t>
                       </a:r>
                       <a:r>
-                        <a:rPr lang="is-IS" sz="2000" b="0" i="0" u="none" strike="noStrike" dirty="0" smtClean="0">
+                        <a:rPr lang="is-IS" sz="2000" b="0" i="0" u="none" strike="noStrike" smtClean="0">
                           <a:solidFill>
                             <a:srgbClr val="000000"/>
                           </a:solidFill>
@@ -16216,7 +16305,7 @@
                     <a:p>
                       <a:pPr algn="l" fontAlgn="b"/>
                       <a:r>
-                        <a:rPr lang="en-US" sz="2000" b="0" i="0" u="none" strike="noStrike">
+                        <a:rPr lang="en-US" sz="2000" b="0" i="0" u="none" strike="noStrike" dirty="0">
                           <a:solidFill>
                             <a:srgbClr val="000000"/>
                           </a:solidFill>
@@ -16290,7 +16379,7 @@
                         <a:t>129.10.107</a:t>
                       </a:r>
                       <a:r>
-                        <a:rPr lang="is-IS" sz="2000" b="0" i="0" u="none" strike="noStrike" dirty="0" smtClean="0">
+                        <a:rPr lang="is-IS" sz="2000" b="0" i="0" u="none" strike="noStrike" smtClean="0">
                           <a:solidFill>
                             <a:srgbClr val="000000"/>
                           </a:solidFill>
@@ -16361,7 +16450,7 @@
                     <a:p>
                       <a:pPr algn="l" fontAlgn="b"/>
                       <a:r>
-                        <a:rPr lang="en-US" sz="2000" b="0" i="0" u="none" strike="noStrike">
+                        <a:rPr lang="en-US" sz="2000" b="0" i="0" u="none" strike="noStrike" dirty="0">
                           <a:solidFill>
                             <a:srgbClr val="000000"/>
                           </a:solidFill>
@@ -16423,7 +16512,7 @@
                     <a:p>
                       <a:pPr algn="l" fontAlgn="b"/>
                       <a:r>
-                        <a:rPr lang="en-US" sz="2000" b="0" i="0" u="none" strike="noStrike">
+                        <a:rPr lang="en-US" sz="2000" b="0" i="0" u="none" strike="noStrike" dirty="0">
                           <a:solidFill>
                             <a:srgbClr val="000000"/>
                           </a:solidFill>
@@ -16485,18 +16574,6 @@
                     <a:p>
                       <a:pPr algn="l" fontAlgn="b"/>
                       <a:r>
-                        <a:rPr lang="it-IT" sz="2000" b="0" i="0" u="none" strike="noStrike" dirty="0" err="1">
-                          <a:solidFill>
-                            <a:srgbClr val="000000"/>
-                          </a:solidFill>
-                          <a:effectLst/>
-                          <a:latin typeface="Helvetica" charset="0"/>
-                          <a:ea typeface="Helvetica" charset="0"/>
-                          <a:cs typeface="Helvetica" charset="0"/>
-                        </a:rPr>
-                        <a:t>Mozilla</a:t>
-                      </a:r>
-                      <a:r>
                         <a:rPr lang="it-IT" sz="2000" b="0" i="0" u="none" strike="noStrike" dirty="0">
                           <a:solidFill>
                             <a:srgbClr val="000000"/>
@@ -16506,7 +16583,7 @@
                           <a:ea typeface="Helvetica" charset="0"/>
                           <a:cs typeface="Helvetica" charset="0"/>
                         </a:rPr>
-                        <a:t>/5.0 (Windows NT </a:t>
+                        <a:t>Mozilla/5.0 (Windows NT </a:t>
                       </a:r>
                       <a:r>
                         <a:rPr lang="it-IT" sz="2000" b="0" i="0" u="none" strike="noStrike" dirty="0" smtClean="0">
@@ -16521,7 +16598,7 @@
                         <a:t>6.1</a:t>
                       </a:r>
                       <a:r>
-                        <a:rPr lang="is-IS" sz="2000" b="0" i="0" u="none" strike="noStrike" dirty="0" smtClean="0">
+                        <a:rPr lang="is-IS" sz="2000" b="0" i="0" u="none" strike="noStrike" smtClean="0">
                           <a:solidFill>
                             <a:srgbClr val="000000"/>
                           </a:solidFill>
@@ -16541,192 +16618,6 @@
                         <a:ea typeface="Helvetica" charset="0"/>
                         <a:cs typeface="Helvetica" charset="0"/>
                       </a:endParaRPr>
-                    </a:p>
-                  </a:txBody>
-                  <a:tcPr marL="12700" marR="12700" marT="12700" marB="0" anchor="ctr">
-                    <a:lnL w="12700" cap="flat" cmpd="sng" algn="ctr">
-                      <a:solidFill>
-                        <a:schemeClr val="tx1"/>
-                      </a:solidFill>
-                      <a:prstDash val="solid"/>
-                      <a:round/>
-                      <a:headEnd type="none" w="med" len="med"/>
-                      <a:tailEnd type="none" w="med" len="med"/>
-                    </a:lnL>
-                    <a:lnR w="12700" cap="flat" cmpd="sng" algn="ctr">
-                      <a:solidFill>
-                        <a:schemeClr val="tx1"/>
-                      </a:solidFill>
-                      <a:prstDash val="solid"/>
-                      <a:round/>
-                      <a:headEnd type="none" w="med" len="med"/>
-                      <a:tailEnd type="none" w="med" len="med"/>
-                    </a:lnR>
-                    <a:lnT w="12700" cap="flat" cmpd="sng" algn="ctr">
-                      <a:solidFill>
-                        <a:schemeClr val="tx1"/>
-                      </a:solidFill>
-                      <a:prstDash val="solid"/>
-                      <a:round/>
-                      <a:headEnd type="none" w="med" len="med"/>
-                      <a:tailEnd type="none" w="med" len="med"/>
-                    </a:lnT>
-                    <a:lnB w="12700" cap="flat" cmpd="sng" algn="ctr">
-                      <a:solidFill>
-                        <a:schemeClr val="tx1"/>
-                      </a:solidFill>
-                      <a:prstDash val="solid"/>
-                      <a:round/>
-                      <a:headEnd type="none" w="med" len="med"/>
-                      <a:tailEnd type="none" w="med" len="med"/>
-                    </a:lnB>
-                    <a:solidFill>
-                      <a:srgbClr val="ECF0F1"/>
-                    </a:solidFill>
-                  </a:tcPr>
-                </a:tc>
-                <a:tc>
-                  <a:txBody>
-                    <a:bodyPr/>
-                    <a:lstStyle/>
-                    <a:p>
-                      <a:pPr algn="l" fontAlgn="b"/>
-                      <a:r>
-                        <a:rPr lang="en-US" sz="2000" b="0" i="0" u="none" strike="noStrike">
-                          <a:solidFill>
-                            <a:srgbClr val="000000"/>
-                          </a:solidFill>
-                          <a:effectLst/>
-                          <a:latin typeface="Helvetica" charset="0"/>
-                          <a:ea typeface="Helvetica" charset="0"/>
-                          <a:cs typeface="Helvetica" charset="0"/>
-                        </a:rPr>
-                        <a:t>TRUE</a:t>
-                      </a:r>
-                    </a:p>
-                  </a:txBody>
-                  <a:tcPr marL="12700" marR="12700" marT="12700" marB="0" anchor="ctr">
-                    <a:lnL w="12700" cap="flat" cmpd="sng" algn="ctr">
-                      <a:solidFill>
-                        <a:schemeClr val="tx1"/>
-                      </a:solidFill>
-                      <a:prstDash val="solid"/>
-                      <a:round/>
-                      <a:headEnd type="none" w="med" len="med"/>
-                      <a:tailEnd type="none" w="med" len="med"/>
-                    </a:lnL>
-                    <a:lnR w="12700" cap="flat" cmpd="sng" algn="ctr">
-                      <a:solidFill>
-                        <a:schemeClr val="tx1"/>
-                      </a:solidFill>
-                      <a:prstDash val="solid"/>
-                      <a:round/>
-                      <a:headEnd type="none" w="med" len="med"/>
-                      <a:tailEnd type="none" w="med" len="med"/>
-                    </a:lnR>
-                    <a:lnT w="12700" cap="flat" cmpd="sng" algn="ctr">
-                      <a:solidFill>
-                        <a:schemeClr val="tx1"/>
-                      </a:solidFill>
-                      <a:prstDash val="solid"/>
-                      <a:round/>
-                      <a:headEnd type="none" w="med" len="med"/>
-                      <a:tailEnd type="none" w="med" len="med"/>
-                    </a:lnT>
-                    <a:lnB w="12700" cap="flat" cmpd="sng" algn="ctr">
-                      <a:solidFill>
-                        <a:schemeClr val="tx1"/>
-                      </a:solidFill>
-                      <a:prstDash val="solid"/>
-                      <a:round/>
-                      <a:headEnd type="none" w="med" len="med"/>
-                      <a:tailEnd type="none" w="med" len="med"/>
-                    </a:lnB>
-                    <a:solidFill>
-                      <a:srgbClr val="ECF0F1"/>
-                    </a:solidFill>
-                  </a:tcPr>
-                </a:tc>
-                <a:tc>
-                  <a:txBody>
-                    <a:bodyPr/>
-                    <a:lstStyle/>
-                    <a:p>
-                      <a:pPr algn="l" fontAlgn="b"/>
-                      <a:r>
-                        <a:rPr lang="en-US" sz="2000" b="0" i="0" u="none" strike="noStrike">
-                          <a:solidFill>
-                            <a:srgbClr val="000000"/>
-                          </a:solidFill>
-                          <a:effectLst/>
-                          <a:latin typeface="Helvetica" charset="0"/>
-                          <a:ea typeface="Helvetica" charset="0"/>
-                          <a:cs typeface="Helvetica" charset="0"/>
-                        </a:rPr>
-                        <a:t>5/21/15 12:32</a:t>
-                      </a:r>
-                    </a:p>
-                  </a:txBody>
-                  <a:tcPr marL="12700" marR="12700" marT="12700" marB="0" anchor="ctr">
-                    <a:lnL w="12700" cap="flat" cmpd="sng" algn="ctr">
-                      <a:solidFill>
-                        <a:schemeClr val="tx1"/>
-                      </a:solidFill>
-                      <a:prstDash val="solid"/>
-                      <a:round/>
-                      <a:headEnd type="none" w="med" len="med"/>
-                      <a:tailEnd type="none" w="med" len="med"/>
-                    </a:lnL>
-                    <a:lnR w="12700" cap="flat" cmpd="sng" algn="ctr">
-                      <a:solidFill>
-                        <a:schemeClr val="tx1"/>
-                      </a:solidFill>
-                      <a:prstDash val="solid"/>
-                      <a:round/>
-                      <a:headEnd type="none" w="med" len="med"/>
-                      <a:tailEnd type="none" w="med" len="med"/>
-                    </a:lnR>
-                    <a:lnT w="12700" cap="flat" cmpd="sng" algn="ctr">
-                      <a:solidFill>
-                        <a:schemeClr val="tx1"/>
-                      </a:solidFill>
-                      <a:prstDash val="solid"/>
-                      <a:round/>
-                      <a:headEnd type="none" w="med" len="med"/>
-                      <a:tailEnd type="none" w="med" len="med"/>
-                    </a:lnT>
-                    <a:lnB w="12700" cap="flat" cmpd="sng" algn="ctr">
-                      <a:solidFill>
-                        <a:schemeClr val="tx1"/>
-                      </a:solidFill>
-                      <a:prstDash val="solid"/>
-                      <a:round/>
-                      <a:headEnd type="none" w="med" len="med"/>
-                      <a:tailEnd type="none" w="med" len="med"/>
-                    </a:lnB>
-                    <a:solidFill>
-                      <a:srgbClr val="ECF0F1"/>
-                    </a:solidFill>
-                  </a:tcPr>
-                </a:tc>
-                <a:tc>
-                  <a:txBody>
-                    <a:bodyPr/>
-                    <a:lstStyle/>
-                    <a:p>
-                      <a:pPr algn="l" fontAlgn="b"/>
-                      <a:r>
-                        <a:rPr lang="bg-BG" sz="2000" b="0" i="0" u="none" strike="noStrike">
-                          <a:solidFill>
-                            <a:srgbClr val="000000"/>
-                          </a:solidFill>
-                          <a:effectLst/>
-                          <a:latin typeface="Helvetica" charset="0"/>
-                          <a:ea typeface="Helvetica" charset="0"/>
-                          <a:cs typeface="Helvetica" charset="0"/>
-                        </a:rPr>
-                        <a:t>1/22/16 1:58</a:t>
-                      </a:r>
                     </a:p>
                   </a:txBody>
                   <a:tcPr marL="12700" marR="12700" marT="12700" marB="0" anchor="ctr">
@@ -16833,6 +16724,192 @@
                     </a:solidFill>
                   </a:tcPr>
                 </a:tc>
+                <a:tc>
+                  <a:txBody>
+                    <a:bodyPr/>
+                    <a:lstStyle/>
+                    <a:p>
+                      <a:pPr algn="l" fontAlgn="b"/>
+                      <a:r>
+                        <a:rPr lang="en-US" sz="2000" b="0" i="0" u="none" strike="noStrike" dirty="0">
+                          <a:solidFill>
+                            <a:srgbClr val="000000"/>
+                          </a:solidFill>
+                          <a:effectLst/>
+                          <a:latin typeface="Helvetica" charset="0"/>
+                          <a:ea typeface="Helvetica" charset="0"/>
+                          <a:cs typeface="Helvetica" charset="0"/>
+                        </a:rPr>
+                        <a:t>5/21/15 12:32</a:t>
+                      </a:r>
+                    </a:p>
+                  </a:txBody>
+                  <a:tcPr marL="12700" marR="12700" marT="12700" marB="0" anchor="ctr">
+                    <a:lnL w="12700" cap="flat" cmpd="sng" algn="ctr">
+                      <a:solidFill>
+                        <a:schemeClr val="tx1"/>
+                      </a:solidFill>
+                      <a:prstDash val="solid"/>
+                      <a:round/>
+                      <a:headEnd type="none" w="med" len="med"/>
+                      <a:tailEnd type="none" w="med" len="med"/>
+                    </a:lnL>
+                    <a:lnR w="12700" cap="flat" cmpd="sng" algn="ctr">
+                      <a:solidFill>
+                        <a:schemeClr val="tx1"/>
+                      </a:solidFill>
+                      <a:prstDash val="solid"/>
+                      <a:round/>
+                      <a:headEnd type="none" w="med" len="med"/>
+                      <a:tailEnd type="none" w="med" len="med"/>
+                    </a:lnR>
+                    <a:lnT w="12700" cap="flat" cmpd="sng" algn="ctr">
+                      <a:solidFill>
+                        <a:schemeClr val="tx1"/>
+                      </a:solidFill>
+                      <a:prstDash val="solid"/>
+                      <a:round/>
+                      <a:headEnd type="none" w="med" len="med"/>
+                      <a:tailEnd type="none" w="med" len="med"/>
+                    </a:lnT>
+                    <a:lnB w="12700" cap="flat" cmpd="sng" algn="ctr">
+                      <a:solidFill>
+                        <a:schemeClr val="tx1"/>
+                      </a:solidFill>
+                      <a:prstDash val="solid"/>
+                      <a:round/>
+                      <a:headEnd type="none" w="med" len="med"/>
+                      <a:tailEnd type="none" w="med" len="med"/>
+                    </a:lnB>
+                    <a:solidFill>
+                      <a:srgbClr val="ECF0F1"/>
+                    </a:solidFill>
+                  </a:tcPr>
+                </a:tc>
+                <a:tc>
+                  <a:txBody>
+                    <a:bodyPr/>
+                    <a:lstStyle/>
+                    <a:p>
+                      <a:pPr algn="l" fontAlgn="b"/>
+                      <a:r>
+                        <a:rPr lang="bg-BG" sz="2000" b="0" i="0" u="none" strike="noStrike" dirty="0">
+                          <a:solidFill>
+                            <a:srgbClr val="000000"/>
+                          </a:solidFill>
+                          <a:effectLst/>
+                          <a:latin typeface="Helvetica" charset="0"/>
+                          <a:ea typeface="Helvetica" charset="0"/>
+                          <a:cs typeface="Helvetica" charset="0"/>
+                        </a:rPr>
+                        <a:t>1/22/16 1:58</a:t>
+                      </a:r>
+                    </a:p>
+                  </a:txBody>
+                  <a:tcPr marL="12700" marR="12700" marT="12700" marB="0" anchor="ctr">
+                    <a:lnL w="12700" cap="flat" cmpd="sng" algn="ctr">
+                      <a:solidFill>
+                        <a:schemeClr val="tx1"/>
+                      </a:solidFill>
+                      <a:prstDash val="solid"/>
+                      <a:round/>
+                      <a:headEnd type="none" w="med" len="med"/>
+                      <a:tailEnd type="none" w="med" len="med"/>
+                    </a:lnL>
+                    <a:lnR w="12700" cap="flat" cmpd="sng" algn="ctr">
+                      <a:solidFill>
+                        <a:schemeClr val="tx1"/>
+                      </a:solidFill>
+                      <a:prstDash val="solid"/>
+                      <a:round/>
+                      <a:headEnd type="none" w="med" len="med"/>
+                      <a:tailEnd type="none" w="med" len="med"/>
+                    </a:lnR>
+                    <a:lnT w="12700" cap="flat" cmpd="sng" algn="ctr">
+                      <a:solidFill>
+                        <a:schemeClr val="tx1"/>
+                      </a:solidFill>
+                      <a:prstDash val="solid"/>
+                      <a:round/>
+                      <a:headEnd type="none" w="med" len="med"/>
+                      <a:tailEnd type="none" w="med" len="med"/>
+                    </a:lnT>
+                    <a:lnB w="12700" cap="flat" cmpd="sng" algn="ctr">
+                      <a:solidFill>
+                        <a:schemeClr val="tx1"/>
+                      </a:solidFill>
+                      <a:prstDash val="solid"/>
+                      <a:round/>
+                      <a:headEnd type="none" w="med" len="med"/>
+                      <a:tailEnd type="none" w="med" len="med"/>
+                    </a:lnB>
+                    <a:solidFill>
+                      <a:srgbClr val="ECF0F1"/>
+                    </a:solidFill>
+                  </a:tcPr>
+                </a:tc>
+                <a:tc>
+                  <a:txBody>
+                    <a:bodyPr/>
+                    <a:lstStyle/>
+                    <a:p>
+                      <a:pPr algn="l" fontAlgn="b"/>
+                      <a:r>
+                        <a:rPr lang="en-US" sz="2000" b="0" i="0" u="none" strike="noStrike" dirty="0">
+                          <a:solidFill>
+                            <a:srgbClr val="000000"/>
+                          </a:solidFill>
+                          <a:effectLst/>
+                          <a:latin typeface="Helvetica" charset="0"/>
+                          <a:ea typeface="Helvetica" charset="0"/>
+                          <a:cs typeface="Helvetica" charset="0"/>
+                        </a:rPr>
+                        <a:t>TRUE</a:t>
+                      </a:r>
+                    </a:p>
+                  </a:txBody>
+                  <a:tcPr marL="12700" marR="12700" marT="12700" marB="0" anchor="ctr">
+                    <a:lnL w="12700" cap="flat" cmpd="sng" algn="ctr">
+                      <a:solidFill>
+                        <a:schemeClr val="tx1"/>
+                      </a:solidFill>
+                      <a:prstDash val="solid"/>
+                      <a:round/>
+                      <a:headEnd type="none" w="med" len="med"/>
+                      <a:tailEnd type="none" w="med" len="med"/>
+                    </a:lnL>
+                    <a:lnR w="12700" cap="flat" cmpd="sng" algn="ctr">
+                      <a:solidFill>
+                        <a:schemeClr val="tx1"/>
+                      </a:solidFill>
+                      <a:prstDash val="solid"/>
+                      <a:round/>
+                      <a:headEnd type="none" w="med" len="med"/>
+                      <a:tailEnd type="none" w="med" len="med"/>
+                    </a:lnR>
+                    <a:lnT w="12700" cap="flat" cmpd="sng" algn="ctr">
+                      <a:solidFill>
+                        <a:schemeClr val="tx1"/>
+                      </a:solidFill>
+                      <a:prstDash val="solid"/>
+                      <a:round/>
+                      <a:headEnd type="none" w="med" len="med"/>
+                      <a:tailEnd type="none" w="med" len="med"/>
+                    </a:lnT>
+                    <a:lnB w="12700" cap="flat" cmpd="sng" algn="ctr">
+                      <a:solidFill>
+                        <a:schemeClr val="tx1"/>
+                      </a:solidFill>
+                      <a:prstDash val="solid"/>
+                      <a:round/>
+                      <a:headEnd type="none" w="med" len="med"/>
+                      <a:tailEnd type="none" w="med" len="med"/>
+                    </a:lnB>
+                    <a:solidFill>
+                      <a:srgbClr val="ECF0F1"/>
+                    </a:solidFill>
+                  </a:tcPr>
+                </a:tc>
               </a:tr>
               <a:tr h="257408">
                 <a:tc>
@@ -16842,7 +16919,7 @@
                     <a:p>
                       <a:pPr algn="l" fontAlgn="b"/>
                       <a:r>
-                        <a:rPr lang="is-IS" sz="2000" b="0" i="0" u="none" strike="noStrike" dirty="0">
+                        <a:rPr lang="is-IS" sz="2000" b="0" i="0" u="none" strike="noStrike">
                           <a:solidFill>
                             <a:srgbClr val="000000"/>
                           </a:solidFill>
@@ -16978,7 +17055,7 @@
                         <a:t>a745a8715</a:t>
                       </a:r>
                       <a:r>
-                        <a:rPr lang="is-IS" sz="2000" b="0" i="0" u="none" strike="noStrike" dirty="0" smtClean="0">
+                        <a:rPr lang="is-IS" sz="2000" b="0" i="0" u="none" strike="noStrike" smtClean="0">
                           <a:solidFill>
                             <a:srgbClr val="000000"/>
                           </a:solidFill>
@@ -17049,7 +17126,7 @@
                     <a:p>
                       <a:pPr algn="l" fontAlgn="b"/>
                       <a:r>
-                        <a:rPr lang="en-US" sz="2000" b="0" i="0" u="none" strike="noStrike">
+                        <a:rPr lang="en-US" sz="2000" b="0" i="0" u="none" strike="noStrike" dirty="0">
                           <a:solidFill>
                             <a:srgbClr val="000000"/>
                           </a:solidFill>
@@ -17123,7 +17200,7 @@
                         <a:t>129.10.107</a:t>
                       </a:r>
                       <a:r>
-                        <a:rPr lang="is-IS" sz="2000" b="0" i="0" u="none" strike="noStrike" dirty="0" smtClean="0">
+                        <a:rPr lang="is-IS" sz="2000" b="0" i="0" u="none" strike="noStrike" smtClean="0">
                           <a:solidFill>
                             <a:srgbClr val="000000"/>
                           </a:solidFill>
@@ -17256,7 +17333,7 @@
                     <a:p>
                       <a:pPr algn="l" fontAlgn="b"/>
                       <a:r>
-                        <a:rPr lang="en-US" sz="2000" b="0" i="0" u="none" strike="noStrike">
+                        <a:rPr lang="en-US" sz="2000" b="0" i="0" u="none" strike="noStrike" dirty="0">
                           <a:solidFill>
                             <a:srgbClr val="000000"/>
                           </a:solidFill>
@@ -17318,18 +17395,6 @@
                     <a:p>
                       <a:pPr algn="l" fontAlgn="b"/>
                       <a:r>
-                        <a:rPr lang="it-IT" sz="2000" b="0" i="0" u="none" strike="noStrike" dirty="0" err="1">
-                          <a:solidFill>
-                            <a:srgbClr val="000000"/>
-                          </a:solidFill>
-                          <a:effectLst/>
-                          <a:latin typeface="Helvetica" charset="0"/>
-                          <a:ea typeface="Helvetica" charset="0"/>
-                          <a:cs typeface="Helvetica" charset="0"/>
-                        </a:rPr>
-                        <a:t>Mozilla</a:t>
-                      </a:r>
-                      <a:r>
                         <a:rPr lang="it-IT" sz="2000" b="0" i="0" u="none" strike="noStrike" dirty="0">
                           <a:solidFill>
                             <a:srgbClr val="000000"/>
@@ -17339,7 +17404,7 @@
                           <a:ea typeface="Helvetica" charset="0"/>
                           <a:cs typeface="Helvetica" charset="0"/>
                         </a:rPr>
-                        <a:t>/5.0 (Windows NT </a:t>
+                        <a:t>Mozilla/5.0 (Windows NT </a:t>
                       </a:r>
                       <a:r>
                         <a:rPr lang="it-IT" sz="2000" b="0" i="0" u="none" strike="noStrike" dirty="0" smtClean="0">
@@ -17354,7 +17419,7 @@
                         <a:t>6.1</a:t>
                       </a:r>
                       <a:r>
-                        <a:rPr lang="is-IS" sz="2000" b="0" i="0" u="none" strike="noStrike" dirty="0" smtClean="0">
+                        <a:rPr lang="is-IS" sz="2000" b="0" i="0" u="none" strike="noStrike" smtClean="0">
                           <a:solidFill>
                             <a:srgbClr val="000000"/>
                           </a:solidFill>
@@ -17675,7 +17740,7 @@
                     <a:p>
                       <a:pPr algn="l" fontAlgn="b"/>
                       <a:r>
-                        <a:rPr lang="is-IS" sz="2000" b="0" i="0" u="none" strike="noStrike" dirty="0">
+                        <a:rPr lang="is-IS" sz="2000" b="0" i="0" u="none" strike="noStrike">
                           <a:solidFill>
                             <a:srgbClr val="000000"/>
                           </a:solidFill>
@@ -17811,7 +17876,7 @@
                         <a:t>e5d85e81e</a:t>
                       </a:r>
                       <a:r>
-                        <a:rPr lang="is-IS" sz="2000" b="0" i="0" u="none" strike="noStrike" dirty="0" smtClean="0">
+                        <a:rPr lang="is-IS" sz="2000" b="0" i="0" u="none" strike="noStrike" smtClean="0">
                           <a:solidFill>
                             <a:srgbClr val="000000"/>
                           </a:solidFill>
@@ -17956,7 +18021,7 @@
                         <a:t>129.10.106</a:t>
                       </a:r>
                       <a:r>
-                        <a:rPr lang="is-IS" sz="2000" b="0" i="0" u="none" strike="noStrike" dirty="0" smtClean="0">
+                        <a:rPr lang="is-IS" sz="2000" b="0" i="0" u="none" strike="noStrike" smtClean="0">
                           <a:solidFill>
                             <a:srgbClr val="000000"/>
                           </a:solidFill>
@@ -18051,7 +18116,7 @@
                         <a:t>repository</a:t>
                       </a:r>
                       <a:r>
-                        <a:rPr lang="is-IS" sz="2000" b="0" i="0" u="none" strike="noStrike" dirty="0" smtClean="0">
+                        <a:rPr lang="is-IS" sz="2000" b="0" i="0" u="none" strike="noStrike" smtClean="0">
                           <a:solidFill>
                             <a:srgbClr val="000000"/>
                           </a:solidFill>
@@ -18184,18 +18249,6 @@
                     <a:p>
                       <a:pPr algn="l" fontAlgn="b"/>
                       <a:r>
-                        <a:rPr lang="it-IT" sz="2000" b="0" i="0" u="none" strike="noStrike" dirty="0" err="1">
-                          <a:solidFill>
-                            <a:srgbClr val="000000"/>
-                          </a:solidFill>
-                          <a:effectLst/>
-                          <a:latin typeface="Helvetica" charset="0"/>
-                          <a:ea typeface="Helvetica" charset="0"/>
-                          <a:cs typeface="Helvetica" charset="0"/>
-                        </a:rPr>
-                        <a:t>Mozilla</a:t>
-                      </a:r>
-                      <a:r>
                         <a:rPr lang="it-IT" sz="2000" b="0" i="0" u="none" strike="noStrike" dirty="0">
                           <a:solidFill>
                             <a:srgbClr val="000000"/>
@@ -18205,7 +18258,7 @@
                           <a:ea typeface="Helvetica" charset="0"/>
                           <a:cs typeface="Helvetica" charset="0"/>
                         </a:rPr>
-                        <a:t>/5.0 (Windows NT </a:t>
+                        <a:t>Mozilla/5.0 (Windows NT </a:t>
                       </a:r>
                       <a:r>
                         <a:rPr lang="it-IT" sz="2000" b="0" i="0" u="none" strike="noStrike" dirty="0" smtClean="0">
@@ -18220,7 +18273,7 @@
                         <a:t>6.1</a:t>
                       </a:r>
                       <a:r>
-                        <a:rPr lang="is-IS" sz="2000" b="0" i="0" u="none" strike="noStrike" dirty="0" smtClean="0">
+                        <a:rPr lang="is-IS" sz="2000" b="0" i="0" u="none" strike="noStrike" smtClean="0">
                           <a:solidFill>
                             <a:srgbClr val="000000"/>
                           </a:solidFill>
@@ -18663,7 +18716,27 @@
                 <a:latin typeface="Gotham Medium"/>
                 <a:cs typeface="Gotham Medium"/>
               </a:rPr>
-              <a:t>One Year of DRS Activity</a:t>
+              <a:t>One Year of </a:t>
+            </a:r>
+            <a:r>
+              <a:rPr lang="en-US" sz="3600" smtClean="0">
+                <a:solidFill>
+                  <a:srgbClr val="2C3E50"/>
+                </a:solidFill>
+                <a:latin typeface="Gotham Medium"/>
+                <a:cs typeface="Gotham Medium"/>
+              </a:rPr>
+              <a:t>DRS</a:t>
+            </a:r>
+            <a:r>
+              <a:rPr lang="en-US" sz="3600" dirty="0" smtClean="0">
+                <a:solidFill>
+                  <a:srgbClr val="2C3E50"/>
+                </a:solidFill>
+                <a:latin typeface="Gotham Medium"/>
+                <a:cs typeface="Gotham Medium"/>
+              </a:rPr>
+              <a:t> Activity</a:t>
             </a:r>
           </a:p>
           <a:p>
@@ -18741,7 +18814,27 @@
                 <a:latin typeface="Gotham Medium"/>
                 <a:cs typeface="Gotham Medium"/>
               </a:rPr>
-              <a:t>Popular DRS Genres</a:t>
+              <a:t>Popular </a:t>
+            </a:r>
+            <a:r>
+              <a:rPr lang="en-US" sz="3600" smtClean="0">
+                <a:solidFill>
+                  <a:srgbClr val="2C3E50"/>
+                </a:solidFill>
+                <a:latin typeface="Gotham Medium"/>
+                <a:cs typeface="Gotham Medium"/>
+              </a:rPr>
+              <a:t>DRS</a:t>
+            </a:r>
+            <a:r>
+              <a:rPr lang="en-US" sz="3600" dirty="0" smtClean="0">
+                <a:solidFill>
+                  <a:srgbClr val="2C3E50"/>
+                </a:solidFill>
+                <a:latin typeface="Gotham Medium"/>
+                <a:cs typeface="Gotham Medium"/>
+              </a:rPr>
+              <a:t> Genres</a:t>
             </a:r>
           </a:p>
           <a:p>
@@ -18835,7 +18928,27 @@
                 <a:latin typeface="Gotham Medium"/>
                 <a:cs typeface="Gotham Medium"/>
               </a:rPr>
-              <a:t>April 2016 DRS Activity: Humans vs. Bots</a:t>
+              <a:t>April 2016 </a:t>
+            </a:r>
+            <a:r>
+              <a:rPr lang="en-US" sz="3800" smtClean="0">
+                <a:solidFill>
+                  <a:srgbClr val="2C3E50"/>
+                </a:solidFill>
+                <a:latin typeface="Gotham Medium"/>
+                <a:cs typeface="Gotham Medium"/>
+              </a:rPr>
+              <a:t>DRS</a:t>
+            </a:r>
+            <a:r>
+              <a:rPr lang="en-US" sz="3800" dirty="0" smtClean="0">
+                <a:solidFill>
+                  <a:srgbClr val="2C3E50"/>
+                </a:solidFill>
+                <a:latin typeface="Gotham Medium"/>
+                <a:cs typeface="Gotham Medium"/>
+              </a:rPr>
+              <a:t> Activity: Humans vs. Bots</a:t>
             </a:r>
             <a:endParaRPr lang="en-US" sz="3800" dirty="0">
               <a:solidFill>
@@ -18921,7 +19034,7 @@
           <a:lstStyle/>
           <a:p>
             <a:pPr algn="ctr"/>
-            <a:endParaRPr lang="en-US"/>
+            <a:endParaRPr lang="en-US" dirty="0"/>
           </a:p>
         </p:txBody>
       </p:sp>
@@ -18999,7 +19112,7 @@
           <a:lstStyle/>
           <a:p>
             <a:pPr algn="ctr"/>
-            <a:endParaRPr lang="en-US"/>
+            <a:endParaRPr lang="en-US" dirty="0"/>
           </a:p>
         </p:txBody>
       </p:sp>
@@ -19144,7 +19257,7 @@
           <a:lstStyle/>
           <a:p>
             <a:pPr algn="ctr"/>
-            <a:endParaRPr lang="en-US"/>
+            <a:endParaRPr lang="en-US" dirty="0"/>
           </a:p>
         </p:txBody>
       </p:sp>
@@ -19191,7 +19304,7 @@
           <a:lstStyle/>
           <a:p>
             <a:pPr algn="ctr"/>
-            <a:endParaRPr lang="en-US"/>
+            <a:endParaRPr lang="en-US" dirty="0"/>
           </a:p>
         </p:txBody>
       </p:sp>
@@ -19264,14 +19377,21 @@
               <a:t>For more information about the DRS visit </a:t>
             </a:r>
             <a:r>
-              <a:rPr lang="en-US" sz="2300" dirty="0" err="1" smtClean="0">
+              <a:rPr lang="en-US" sz="2300" dirty="0" smtClean="0">
                 <a:solidFill>
                   <a:srgbClr val="2B84D2"/>
                 </a:solidFill>
                 <a:latin typeface="Helvetica"/>
                 <a:cs typeface="Helvetica"/>
               </a:rPr>
-              <a:t>dsg.neu.edu</a:t>
+              <a:t>dsg.neu.edu/resources/drs </a:t>
+            </a:r>
+            <a:r>
+              <a:rPr lang="en-US" sz="2300" dirty="0" smtClean="0">
+                <a:latin typeface="Helvetica"/>
+                <a:cs typeface="Helvetica"/>
+              </a:rPr>
+              <a:t>or  </a:t>
             </a:r>
             <a:r>
               <a:rPr lang="en-US" sz="2300" dirty="0" smtClean="0">
@@ -19281,64 +19401,7 @@
                 <a:latin typeface="Helvetica"/>
                 <a:cs typeface="Helvetica"/>
               </a:rPr>
-              <a:t>/resources/</a:t>
-            </a:r>
-            <a:r>
-              <a:rPr lang="en-US" sz="2300" dirty="0" err="1" smtClean="0">
-                <a:solidFill>
-                  <a:srgbClr val="2B84D2"/>
-                </a:solidFill>
-                <a:latin typeface="Helvetica"/>
-                <a:cs typeface="Helvetica"/>
-              </a:rPr>
-              <a:t>drs</a:t>
-            </a:r>
-            <a:r>
-              <a:rPr lang="en-US" sz="2300" dirty="0" smtClean="0">
-                <a:solidFill>
-                  <a:srgbClr val="2B84D2"/>
-                </a:solidFill>
-                <a:latin typeface="Helvetica"/>
-                <a:cs typeface="Helvetica"/>
-              </a:rPr>
-              <a:t> </a:t>
-            </a:r>
-            <a:r>
-              <a:rPr lang="en-US" sz="2300" dirty="0" smtClean="0">
-                <a:latin typeface="Helvetica"/>
-                <a:cs typeface="Helvetica"/>
-              </a:rPr>
-              <a:t>or  </a:t>
-            </a:r>
-            <a:r>
-              <a:rPr lang="en-US" sz="2300" dirty="0" err="1" smtClean="0">
-                <a:solidFill>
-                  <a:srgbClr val="2B84D2"/>
-                </a:solidFill>
-                <a:latin typeface="Helvetica"/>
-                <a:cs typeface="Helvetica"/>
-              </a:rPr>
-              <a:t>github.com</a:t>
-            </a:r>
-            <a:r>
-              <a:rPr lang="en-US" sz="2300" dirty="0" smtClean="0">
-                <a:solidFill>
-                  <a:srgbClr val="2B84D2"/>
-                </a:solidFill>
-                <a:latin typeface="Helvetica"/>
-                <a:cs typeface="Helvetica"/>
-              </a:rPr>
-              <a:t>/NEU-Libraries/</a:t>
-            </a:r>
-            <a:r>
-              <a:rPr lang="en-US" sz="2300" dirty="0" err="1" smtClean="0">
-                <a:solidFill>
-                  <a:srgbClr val="2B84D2"/>
-                </a:solidFill>
-                <a:latin typeface="Helvetica"/>
-                <a:cs typeface="Helvetica"/>
-              </a:rPr>
-              <a:t>cerberus</a:t>
+              <a:t>github.com/NEU-Libraries/cerberus</a:t>
             </a:r>
             <a:endParaRPr lang="en-US" sz="2300" dirty="0">
               <a:solidFill>
@@ -19634,39 +19697,7 @@
                 <a:ea typeface="Helvetica" charset="0"/>
                 <a:cs typeface="Helvetica" charset="0"/>
               </a:rPr>
-              <a:t>archive*, *bot*, *crawl*, *curl*, *java*, *lynx*, *</a:t>
-            </a:r>
-            <a:r>
-              <a:rPr lang="en-US" sz="2300" dirty="0" err="1">
-                <a:latin typeface="Helvetica" charset="0"/>
-                <a:ea typeface="Helvetica" charset="0"/>
-                <a:cs typeface="Helvetica" charset="0"/>
-              </a:rPr>
-              <a:t>nutch</a:t>
-            </a:r>
-            <a:r>
-              <a:rPr lang="en-US" sz="2300" dirty="0">
-                <a:latin typeface="Helvetica" charset="0"/>
-                <a:ea typeface="Helvetica" charset="0"/>
-                <a:cs typeface="Helvetica" charset="0"/>
-              </a:rPr>
-              <a:t>*, *scrape*, *</a:t>
-            </a:r>
-            <a:r>
-              <a:rPr lang="en-US" sz="2300" dirty="0" err="1">
-                <a:latin typeface="Helvetica" charset="0"/>
-                <a:ea typeface="Helvetica" charset="0"/>
-                <a:cs typeface="Helvetica" charset="0"/>
-              </a:rPr>
-              <a:t>scrapy</a:t>
-            </a:r>
-            <a:r>
-              <a:rPr lang="en-US" sz="2300" dirty="0">
-                <a:latin typeface="Helvetica" charset="0"/>
-                <a:ea typeface="Helvetica" charset="0"/>
-                <a:cs typeface="Helvetica" charset="0"/>
-              </a:rPr>
-              <a:t>*, *slurp*, and *spider*</a:t>
+              <a:t>archive*, *bot*, *crawl*, *curl*, *java*, *lynx*, *nutch*, *scrape*, *scrapy*, *slurp*, and *spider*</a:t>
             </a:r>
           </a:p>
         </p:txBody>
@@ -19918,7 +19949,7 @@
           <a:lstStyle/>
           <a:p>
             <a:pPr algn="ctr"/>
-            <a:endParaRPr lang="en-US"/>
+            <a:endParaRPr lang="en-US" dirty="0"/>
           </a:p>
         </p:txBody>
       </p:sp>
@@ -19996,7 +20027,7 @@
           <a:lstStyle/>
           <a:p>
             <a:pPr algn="ctr"/>
-            <a:endParaRPr lang="en-US"/>
+            <a:endParaRPr lang="en-US" dirty="0"/>
           </a:p>
         </p:txBody>
       </p:sp>
@@ -20074,7 +20105,7 @@
           <a:lstStyle/>
           <a:p>
             <a:pPr algn="ctr"/>
-            <a:endParaRPr lang="en-US"/>
+            <a:endParaRPr lang="en-US" dirty="0"/>
           </a:p>
         </p:txBody>
       </p:sp>
@@ -20152,7 +20183,7 @@
           <a:lstStyle/>
           <a:p>
             <a:pPr algn="ctr"/>
-            <a:endParaRPr lang="en-US"/>
+            <a:endParaRPr lang="en-US" dirty="0"/>
           </a:p>
         </p:txBody>
       </p:sp>
@@ -20230,7 +20261,7 @@
           <a:lstStyle/>
           <a:p>
             <a:pPr algn="ctr"/>
-            <a:endParaRPr lang="en-US"/>
+            <a:endParaRPr lang="en-US" dirty="0"/>
           </a:p>
         </p:txBody>
       </p:sp>
@@ -20308,7 +20339,7 @@
           <a:lstStyle/>
           <a:p>
             <a:pPr algn="ctr"/>
-            <a:endParaRPr lang="en-US"/>
+            <a:endParaRPr lang="en-US" dirty="0"/>
           </a:p>
         </p:txBody>
       </p:sp>
@@ -20386,7 +20417,7 @@
           <a:lstStyle/>
           <a:p>
             <a:pPr algn="ctr"/>
-            <a:endParaRPr lang="en-US"/>
+            <a:endParaRPr lang="en-US" dirty="0"/>
           </a:p>
         </p:txBody>
       </p:sp>
@@ -20464,7 +20495,7 @@
           <a:lstStyle/>
           <a:p>
             <a:pPr algn="ctr"/>
-            <a:endParaRPr lang="en-US"/>
+            <a:endParaRPr lang="en-US" dirty="0"/>
           </a:p>
         </p:txBody>
       </p:sp>
@@ -20542,7 +20573,7 @@
           <a:lstStyle/>
           <a:p>
             <a:pPr algn="ctr"/>
-            <a:endParaRPr lang="en-US"/>
+            <a:endParaRPr lang="en-US" dirty="0"/>
           </a:p>
         </p:txBody>
       </p:sp>
@@ -20620,7 +20651,7 @@
           <a:lstStyle/>
           <a:p>
             <a:pPr algn="ctr"/>
-            <a:endParaRPr lang="en-US"/>
+            <a:endParaRPr lang="en-US" dirty="0"/>
           </a:p>
         </p:txBody>
       </p:sp>
@@ -20698,7 +20729,7 @@
           <a:lstStyle/>
           <a:p>
             <a:pPr algn="ctr"/>
-            <a:endParaRPr lang="en-US"/>
+            <a:endParaRPr lang="en-US" dirty="0"/>
           </a:p>
         </p:txBody>
       </p:sp>
@@ -20776,7 +20807,7 @@
           <a:lstStyle/>
           <a:p>
             <a:pPr algn="ctr"/>
-            <a:endParaRPr lang="en-US"/>
+            <a:endParaRPr lang="en-US" dirty="0"/>
           </a:p>
         </p:txBody>
       </p:sp>
@@ -20823,7 +20854,7 @@
           <a:lstStyle/>
           <a:p>
             <a:pPr algn="ctr"/>
-            <a:endParaRPr lang="en-US"/>
+            <a:endParaRPr lang="en-US" dirty="0"/>
           </a:p>
         </p:txBody>
       </p:sp>
@@ -20870,7 +20901,7 @@
           <a:lstStyle/>
           <a:p>
             <a:pPr algn="ctr"/>
-            <a:endParaRPr lang="en-US"/>
+            <a:endParaRPr lang="en-US" dirty="0"/>
           </a:p>
         </p:txBody>
       </p:sp>
@@ -20917,7 +20948,7 @@
           <a:lstStyle/>
           <a:p>
             <a:pPr algn="ctr"/>
-            <a:endParaRPr lang="en-US"/>
+            <a:endParaRPr lang="en-US" dirty="0"/>
           </a:p>
         </p:txBody>
       </p:sp>
@@ -21050,7 +21081,7 @@
           <a:p>
             <a:pPr algn="ctr"/>
             <a:r>
-              <a:rPr lang="en-US" sz="3600" dirty="0" err="1" smtClean="0">
+              <a:rPr lang="en-US" sz="3600" dirty="0" smtClean="0">
                 <a:solidFill>
                   <a:srgbClr val="3498DB"/>
                 </a:solidFill>
@@ -21223,7 +21254,7 @@
           <a:lstStyle/>
           <a:p>
             <a:pPr algn="ctr"/>
-            <a:endParaRPr lang="en-US"/>
+            <a:endParaRPr lang="en-US" dirty="0"/>
           </a:p>
         </p:txBody>
       </p:sp>
@@ -21301,7 +21332,7 @@
           <a:lstStyle/>
           <a:p>
             <a:pPr algn="ctr"/>
-            <a:endParaRPr lang="en-US"/>
+            <a:endParaRPr lang="en-US" dirty="0"/>
           </a:p>
         </p:txBody>
       </p:sp>
@@ -21379,7 +21410,7 @@
           <a:lstStyle/>
           <a:p>
             <a:pPr algn="ctr"/>
-            <a:endParaRPr lang="en-US"/>
+            <a:endParaRPr lang="en-US" dirty="0"/>
           </a:p>
         </p:txBody>
       </p:sp>
@@ -21529,7 +21560,7 @@
               <a:t>Sarah Sweeney, </a:t>
             </a:r>
             <a:r>
-              <a:rPr lang="en-US" sz="5400" dirty="0" err="1">
+              <a:rPr lang="en-US" sz="5400" dirty="0">
                 <a:solidFill>
                   <a:srgbClr val="2C3E50"/>
                 </a:solidFill>
@@ -21539,14 +21570,6 @@
               </a:rPr>
               <a:t>sj.sweeney@neu.edu</a:t>
             </a:r>
-            <a:endParaRPr lang="en-US" sz="5400" dirty="0">
-              <a:solidFill>
-                <a:srgbClr val="2C3E50"/>
-              </a:solidFill>
-              <a:latin typeface="Gotham Book" charset="0"/>
-              <a:ea typeface="Gotham Book" charset="0"/>
-              <a:cs typeface="Gotham Book" charset="0"/>
-            </a:endParaRPr>
           </a:p>
         </p:txBody>
       </p:sp>
@@ -21624,7 +21647,7 @@
           <a:lstStyle/>
           <a:p>
             <a:pPr algn="ctr"/>
-            <a:endParaRPr lang="en-US"/>
+            <a:endParaRPr lang="en-US" dirty="0"/>
           </a:p>
         </p:txBody>
       </p:sp>
@@ -21702,7 +21725,7 @@
           <a:lstStyle/>
           <a:p>
             <a:pPr algn="ctr"/>
-            <a:endParaRPr lang="en-US"/>
+            <a:endParaRPr lang="en-US" dirty="0"/>
           </a:p>
         </p:txBody>
       </p:sp>
@@ -21780,7 +21803,7 @@
           <a:lstStyle/>
           <a:p>
             <a:pPr algn="ctr"/>
-            <a:endParaRPr lang="en-US"/>
+            <a:endParaRPr lang="en-US" dirty="0"/>
           </a:p>
         </p:txBody>
       </p:sp>
@@ -22024,7 +22047,7 @@
           <a:p>
             <a:pPr algn="ctr"/>
             <a:r>
-              <a:rPr lang="en-US" sz="3600" dirty="0" err="1" smtClean="0">
+              <a:rPr lang="en-US" sz="3600" dirty="0" smtClean="0">
                 <a:solidFill>
                   <a:srgbClr val="3498DB"/>
                 </a:solidFill>
@@ -22333,7 +22356,7 @@
               <a:t>We designed a simple method for collecting and processing our usage statistics that allows us to filter out the non-human consumption of our content. Raw, unfiltered DRS usage statistics are stored in </a:t>
             </a:r>
             <a:r>
-              <a:rPr lang="en-US" sz="2300" smtClean="0">
+              <a:rPr lang="en-US" sz="2300" dirty="0" smtClean="0">
                 <a:latin typeface="Helvetica" charset="0"/>
                 <a:ea typeface="Helvetica" charset="0"/>
                 <a:cs typeface="Helvetica" charset="0"/>
@@ -22607,7 +22630,7 @@
                     <a:p>
                       <a:pPr algn="ctr" fontAlgn="b"/>
                       <a:r>
-                        <a:rPr lang="en-US" sz="2000" b="1" i="0" u="none" strike="noStrike" dirty="0" err="1">
+                        <a:rPr lang="en-US" sz="2000" b="1" i="0" u="none" strike="noStrike" dirty="0">
                           <a:solidFill>
                             <a:srgbClr val="2C3E50"/>
                           </a:solidFill>
@@ -22618,15 +22641,6 @@
                         </a:rPr>
                         <a:t>session_id</a:t>
                       </a:r>
-                      <a:endParaRPr lang="en-US" sz="2000" b="1" i="0" u="none" strike="noStrike" dirty="0">
-                        <a:solidFill>
-                          <a:srgbClr val="2C3E50"/>
-                        </a:solidFill>
-                        <a:effectLst/>
-                        <a:latin typeface="Helvetica" charset="0"/>
-                        <a:ea typeface="Helvetica" charset="0"/>
-                        <a:cs typeface="Helvetica" charset="0"/>
-                      </a:endParaRPr>
                     </a:p>
                   </a:txBody>
                   <a:tcPr marL="12700" marR="12700" marT="12700" marB="0" anchor="ctr">
@@ -22740,7 +22754,7 @@
                     <a:p>
                       <a:pPr algn="ctr" fontAlgn="b"/>
                       <a:r>
-                        <a:rPr lang="en-US" sz="2000" b="1" i="0" u="none" strike="noStrike" dirty="0" err="1">
+                        <a:rPr lang="en-US" sz="2000" b="1" i="0" u="none" strike="noStrike" dirty="0">
                           <a:solidFill>
                             <a:srgbClr val="2C3E50"/>
                           </a:solidFill>
@@ -22751,15 +22765,6 @@
                         </a:rPr>
                         <a:t>ip_address</a:t>
                       </a:r>
-                      <a:endParaRPr lang="en-US" sz="2000" b="1" i="0" u="none" strike="noStrike" dirty="0">
-                        <a:solidFill>
-                          <a:srgbClr val="2C3E50"/>
-                        </a:solidFill>
-                        <a:effectLst/>
-                        <a:latin typeface="Helvetica" charset="0"/>
-                        <a:ea typeface="Helvetica" charset="0"/>
-                        <a:cs typeface="Helvetica" charset="0"/>
-                      </a:endParaRPr>
                     </a:p>
                   </a:txBody>
                   <a:tcPr marL="12700" marR="12700" marT="12700" marB="0" anchor="ctr">
@@ -22935,7 +22940,7 @@
                     <a:p>
                       <a:pPr algn="ctr" fontAlgn="b"/>
                       <a:r>
-                        <a:rPr lang="en-US" sz="2000" b="1" i="0" u="none" strike="noStrike" dirty="0" err="1">
+                        <a:rPr lang="en-US" sz="2000" b="1" i="0" u="none" strike="noStrike" dirty="0">
                           <a:solidFill>
                             <a:srgbClr val="2C3E50"/>
                           </a:solidFill>
@@ -22946,15 +22951,6 @@
                         </a:rPr>
                         <a:t>user_agent</a:t>
                       </a:r>
-                      <a:endParaRPr lang="en-US" sz="2000" b="1" i="0" u="none" strike="noStrike" dirty="0">
-                        <a:solidFill>
-                          <a:srgbClr val="2C3E50"/>
-                        </a:solidFill>
-                        <a:effectLst/>
-                        <a:latin typeface="Helvetica" charset="0"/>
-                        <a:ea typeface="Helvetica" charset="0"/>
-                        <a:cs typeface="Helvetica" charset="0"/>
-                      </a:endParaRPr>
                     </a:p>
                   </a:txBody>
                   <a:tcPr marL="12700" marR="12700" marT="12700" marB="0" anchor="ctr">
@@ -23068,7 +23064,7 @@
                     <a:p>
                       <a:pPr algn="ctr" fontAlgn="b"/>
                       <a:r>
-                        <a:rPr lang="en-US" sz="2000" b="1" i="0" u="none" strike="noStrike" dirty="0" err="1">
+                        <a:rPr lang="en-US" sz="2000" b="1" i="0" u="none" strike="noStrike" dirty="0">
                           <a:solidFill>
                             <a:srgbClr val="2C3E50"/>
                           </a:solidFill>
@@ -23079,15 +23075,6 @@
                         </a:rPr>
                         <a:t>created_at</a:t>
                       </a:r>
-                      <a:endParaRPr lang="en-US" sz="2000" b="1" i="0" u="none" strike="noStrike" dirty="0">
-                        <a:solidFill>
-                          <a:srgbClr val="2C3E50"/>
-                        </a:solidFill>
-                        <a:effectLst/>
-                        <a:latin typeface="Helvetica" charset="0"/>
-                        <a:ea typeface="Helvetica" charset="0"/>
-                        <a:cs typeface="Helvetica" charset="0"/>
-                      </a:endParaRPr>
                     </a:p>
                   </a:txBody>
                   <a:tcPr marL="12700" marR="12700" marT="12700" marB="0" anchor="ctr">
@@ -23265,7 +23252,7 @@
                     <a:p>
                       <a:pPr algn="l" fontAlgn="b"/>
                       <a:r>
-                        <a:rPr lang="is-IS" sz="2000" b="0" i="0" u="none" strike="noStrike" dirty="0">
+                        <a:rPr lang="is-IS" sz="2000" b="0" i="0" u="none" strike="noStrike">
                           <a:solidFill>
                             <a:srgbClr val="000000"/>
                           </a:solidFill>
@@ -23401,7 +23388,7 @@
                         <a:t>5f79a9934</a:t>
                       </a:r>
                       <a:r>
-                        <a:rPr lang="is-IS" sz="2000" b="0" i="0" u="none" strike="noStrike" dirty="0" smtClean="0">
+                        <a:rPr lang="is-IS" sz="2000" b="0" i="0" u="none" strike="noStrike" smtClean="0">
                           <a:solidFill>
                             <a:srgbClr val="000000"/>
                           </a:solidFill>
@@ -23546,7 +23533,7 @@
                         <a:t>108.20.51</a:t>
                       </a:r>
                       <a:r>
-                        <a:rPr lang="is-IS" sz="2000" b="0" i="0" u="none" strike="noStrike" dirty="0" smtClean="0">
+                        <a:rPr lang="is-IS" sz="2000" b="0" i="0" u="none" strike="noStrike" smtClean="0">
                           <a:solidFill>
                             <a:srgbClr val="000000"/>
                           </a:solidFill>
@@ -23765,7 +23752,7 @@
                         <a:t>iPad; CPU OS</a:t>
                       </a:r>
                       <a:r>
-                        <a:rPr lang="is-IS" sz="2000" b="0" i="0" u="none" strike="noStrike" dirty="0" smtClean="0">
+                        <a:rPr lang="is-IS" sz="2000" b="0" i="0" u="none" strike="noStrike" smtClean="0">
                           <a:solidFill>
                             <a:srgbClr val="000000"/>
                           </a:solidFill>
@@ -24086,7 +24073,7 @@
                     <a:p>
                       <a:pPr algn="l" fontAlgn="b"/>
                       <a:r>
-                        <a:rPr lang="is-IS" sz="2000" b="0" i="0" u="none" strike="noStrike" dirty="0">
+                        <a:rPr lang="is-IS" sz="2000" b="0" i="0" u="none" strike="noStrike">
                           <a:solidFill>
                             <a:srgbClr val="000000"/>
                           </a:solidFill>
@@ -24222,7 +24209,7 @@
                         <a:t>a745a871e</a:t>
                       </a:r>
                       <a:r>
-                        <a:rPr lang="is-IS" sz="2000" b="0" i="0" u="none" strike="noStrike" dirty="0" smtClean="0">
+                        <a:rPr lang="is-IS" sz="2000" b="0" i="0" u="none" strike="noStrike" smtClean="0">
                           <a:solidFill>
                             <a:srgbClr val="000000"/>
                           </a:solidFill>
@@ -24293,7 +24280,7 @@
                     <a:p>
                       <a:pPr algn="l" fontAlgn="b"/>
                       <a:r>
-                        <a:rPr lang="en-US" sz="2000" b="0" i="0" u="none" strike="noStrike">
+                        <a:rPr lang="en-US" sz="2000" b="0" i="0" u="none" strike="noStrike" dirty="0">
                           <a:solidFill>
                             <a:srgbClr val="000000"/>
                           </a:solidFill>
@@ -24367,7 +24354,7 @@
                         <a:t>129.10.107</a:t>
                       </a:r>
                       <a:r>
-                        <a:rPr lang="is-IS" sz="2000" b="0" i="0" u="none" strike="noStrike" dirty="0" smtClean="0">
+                        <a:rPr lang="is-IS" sz="2000" b="0" i="0" u="none" strike="noStrike" smtClean="0">
                           <a:solidFill>
                             <a:srgbClr val="000000"/>
                           </a:solidFill>
@@ -24438,7 +24425,7 @@
                     <a:p>
                       <a:pPr algn="l" fontAlgn="b"/>
                       <a:r>
-                        <a:rPr lang="en-US" sz="2000" b="0" i="0" u="none" strike="noStrike">
+                        <a:rPr lang="en-US" sz="2000" b="0" i="0" u="none" strike="noStrike" dirty="0">
                           <a:solidFill>
                             <a:srgbClr val="000000"/>
                           </a:solidFill>
@@ -24500,7 +24487,7 @@
                     <a:p>
                       <a:pPr algn="l" fontAlgn="b"/>
                       <a:r>
-                        <a:rPr lang="en-US" sz="2000" b="0" i="0" u="none" strike="noStrike">
+                        <a:rPr lang="en-US" sz="2000" b="0" i="0" u="none" strike="noStrike" dirty="0">
                           <a:solidFill>
                             <a:srgbClr val="000000"/>
                           </a:solidFill>
@@ -24562,18 +24549,6 @@
                     <a:p>
                       <a:pPr algn="l" fontAlgn="b"/>
                       <a:r>
-                        <a:rPr lang="it-IT" sz="2000" b="0" i="0" u="none" strike="noStrike" dirty="0" err="1">
-                          <a:solidFill>
-                            <a:srgbClr val="000000"/>
-                          </a:solidFill>
-                          <a:effectLst/>
-                          <a:latin typeface="Helvetica" charset="0"/>
-                          <a:ea typeface="Helvetica" charset="0"/>
-                          <a:cs typeface="Helvetica" charset="0"/>
-                        </a:rPr>
-                        <a:t>Mozilla</a:t>
-                      </a:r>
-                      <a:r>
                         <a:rPr lang="it-IT" sz="2000" b="0" i="0" u="none" strike="noStrike" dirty="0">
                           <a:solidFill>
                             <a:srgbClr val="000000"/>
@@ -24583,7 +24558,7 @@
                           <a:ea typeface="Helvetica" charset="0"/>
                           <a:cs typeface="Helvetica" charset="0"/>
                         </a:rPr>
-                        <a:t>/5.0 (Windows NT </a:t>
+                        <a:t>Mozilla/5.0 (Windows NT </a:t>
                       </a:r>
                       <a:r>
                         <a:rPr lang="it-IT" sz="2000" b="0" i="0" u="none" strike="noStrike" dirty="0" smtClean="0">
@@ -24598,7 +24573,7 @@
                         <a:t>6.1</a:t>
                       </a:r>
                       <a:r>
-                        <a:rPr lang="is-IS" sz="2000" b="0" i="0" u="none" strike="noStrike" dirty="0" smtClean="0">
+                        <a:rPr lang="is-IS" sz="2000" b="0" i="0" u="none" strike="noStrike" smtClean="0">
                           <a:solidFill>
                             <a:srgbClr val="000000"/>
                           </a:solidFill>
@@ -24618,192 +24593,6 @@
                         <a:ea typeface="Helvetica" charset="0"/>
                         <a:cs typeface="Helvetica" charset="0"/>
                       </a:endParaRPr>
-                    </a:p>
-                  </a:txBody>
-                  <a:tcPr marL="12700" marR="12700" marT="12700" marB="0" anchor="ctr">
-                    <a:lnL w="12700" cap="flat" cmpd="sng" algn="ctr">
-                      <a:solidFill>
-                        <a:schemeClr val="tx1"/>
-                      </a:solidFill>
-                      <a:prstDash val="solid"/>
-                      <a:round/>
-                      <a:headEnd type="none" w="med" len="med"/>
-                      <a:tailEnd type="none" w="med" len="med"/>
-                    </a:lnL>
-                    <a:lnR w="12700" cap="flat" cmpd="sng" algn="ctr">
-                      <a:solidFill>
-                        <a:schemeClr val="tx1"/>
-                      </a:solidFill>
-                      <a:prstDash val="solid"/>
-                      <a:round/>
-                      <a:headEnd type="none" w="med" len="med"/>
-                      <a:tailEnd type="none" w="med" len="med"/>
-                    </a:lnR>
-                    <a:lnT w="12700" cap="flat" cmpd="sng" algn="ctr">
-                      <a:solidFill>
-                        <a:schemeClr val="tx1"/>
-                      </a:solidFill>
-                      <a:prstDash val="solid"/>
-                      <a:round/>
-                      <a:headEnd type="none" w="med" len="med"/>
-                      <a:tailEnd type="none" w="med" len="med"/>
-                    </a:lnT>
-                    <a:lnB w="12700" cap="flat" cmpd="sng" algn="ctr">
-                      <a:solidFill>
-                        <a:schemeClr val="tx1"/>
-                      </a:solidFill>
-                      <a:prstDash val="solid"/>
-                      <a:round/>
-                      <a:headEnd type="none" w="med" len="med"/>
-                      <a:tailEnd type="none" w="med" len="med"/>
-                    </a:lnB>
-                    <a:solidFill>
-                      <a:srgbClr val="ECF0F1"/>
-                    </a:solidFill>
-                  </a:tcPr>
-                </a:tc>
-                <a:tc>
-                  <a:txBody>
-                    <a:bodyPr/>
-                    <a:lstStyle/>
-                    <a:p>
-                      <a:pPr algn="l" fontAlgn="b"/>
-                      <a:r>
-                        <a:rPr lang="en-US" sz="2000" b="0" i="0" u="none" strike="noStrike">
-                          <a:solidFill>
-                            <a:srgbClr val="000000"/>
-                          </a:solidFill>
-                          <a:effectLst/>
-                          <a:latin typeface="Helvetica" charset="0"/>
-                          <a:ea typeface="Helvetica" charset="0"/>
-                          <a:cs typeface="Helvetica" charset="0"/>
-                        </a:rPr>
-                        <a:t>TRUE</a:t>
-                      </a:r>
-                    </a:p>
-                  </a:txBody>
-                  <a:tcPr marL="12700" marR="12700" marT="12700" marB="0" anchor="ctr">
-                    <a:lnL w="12700" cap="flat" cmpd="sng" algn="ctr">
-                      <a:solidFill>
-                        <a:schemeClr val="tx1"/>
-                      </a:solidFill>
-                      <a:prstDash val="solid"/>
-                      <a:round/>
-                      <a:headEnd type="none" w="med" len="med"/>
-                      <a:tailEnd type="none" w="med" len="med"/>
-                    </a:lnL>
-                    <a:lnR w="12700" cap="flat" cmpd="sng" algn="ctr">
-                      <a:solidFill>
-                        <a:schemeClr val="tx1"/>
-                      </a:solidFill>
-                      <a:prstDash val="solid"/>
-                      <a:round/>
-                      <a:headEnd type="none" w="med" len="med"/>
-                      <a:tailEnd type="none" w="med" len="med"/>
-                    </a:lnR>
-                    <a:lnT w="12700" cap="flat" cmpd="sng" algn="ctr">
-                      <a:solidFill>
-                        <a:schemeClr val="tx1"/>
-                      </a:solidFill>
-                      <a:prstDash val="solid"/>
-                      <a:round/>
-                      <a:headEnd type="none" w="med" len="med"/>
-                      <a:tailEnd type="none" w="med" len="med"/>
-                    </a:lnT>
-                    <a:lnB w="12700" cap="flat" cmpd="sng" algn="ctr">
-                      <a:solidFill>
-                        <a:schemeClr val="tx1"/>
-                      </a:solidFill>
-                      <a:prstDash val="solid"/>
-                      <a:round/>
-                      <a:headEnd type="none" w="med" len="med"/>
-                      <a:tailEnd type="none" w="med" len="med"/>
-                    </a:lnB>
-                    <a:solidFill>
-                      <a:srgbClr val="ECF0F1"/>
-                    </a:solidFill>
-                  </a:tcPr>
-                </a:tc>
-                <a:tc>
-                  <a:txBody>
-                    <a:bodyPr/>
-                    <a:lstStyle/>
-                    <a:p>
-                      <a:pPr algn="l" fontAlgn="b"/>
-                      <a:r>
-                        <a:rPr lang="en-US" sz="2000" b="0" i="0" u="none" strike="noStrike">
-                          <a:solidFill>
-                            <a:srgbClr val="000000"/>
-                          </a:solidFill>
-                          <a:effectLst/>
-                          <a:latin typeface="Helvetica" charset="0"/>
-                          <a:ea typeface="Helvetica" charset="0"/>
-                          <a:cs typeface="Helvetica" charset="0"/>
-                        </a:rPr>
-                        <a:t>5/21/15 12:32</a:t>
-                      </a:r>
-                    </a:p>
-                  </a:txBody>
-                  <a:tcPr marL="12700" marR="12700" marT="12700" marB="0" anchor="ctr">
-                    <a:lnL w="12700" cap="flat" cmpd="sng" algn="ctr">
-                      <a:solidFill>
-                        <a:schemeClr val="tx1"/>
-                      </a:solidFill>
-                      <a:prstDash val="solid"/>
-                      <a:round/>
-                      <a:headEnd type="none" w="med" len="med"/>
-                      <a:tailEnd type="none" w="med" len="med"/>
-                    </a:lnL>
-                    <a:lnR w="12700" cap="flat" cmpd="sng" algn="ctr">
-                      <a:solidFill>
-                        <a:schemeClr val="tx1"/>
-                      </a:solidFill>
-                      <a:prstDash val="solid"/>
-                      <a:round/>
-                      <a:headEnd type="none" w="med" len="med"/>
-                      <a:tailEnd type="none" w="med" len="med"/>
-                    </a:lnR>
-                    <a:lnT w="12700" cap="flat" cmpd="sng" algn="ctr">
-                      <a:solidFill>
-                        <a:schemeClr val="tx1"/>
-                      </a:solidFill>
-                      <a:prstDash val="solid"/>
-                      <a:round/>
-                      <a:headEnd type="none" w="med" len="med"/>
-                      <a:tailEnd type="none" w="med" len="med"/>
-                    </a:lnT>
-                    <a:lnB w="12700" cap="flat" cmpd="sng" algn="ctr">
-                      <a:solidFill>
-                        <a:schemeClr val="tx1"/>
-                      </a:solidFill>
-                      <a:prstDash val="solid"/>
-                      <a:round/>
-                      <a:headEnd type="none" w="med" len="med"/>
-                      <a:tailEnd type="none" w="med" len="med"/>
-                    </a:lnB>
-                    <a:solidFill>
-                      <a:srgbClr val="ECF0F1"/>
-                    </a:solidFill>
-                  </a:tcPr>
-                </a:tc>
-                <a:tc>
-                  <a:txBody>
-                    <a:bodyPr/>
-                    <a:lstStyle/>
-                    <a:p>
-                      <a:pPr algn="l" fontAlgn="b"/>
-                      <a:r>
-                        <a:rPr lang="bg-BG" sz="2000" b="0" i="0" u="none" strike="noStrike">
-                          <a:solidFill>
-                            <a:srgbClr val="000000"/>
-                          </a:solidFill>
-                          <a:effectLst/>
-                          <a:latin typeface="Helvetica" charset="0"/>
-                          <a:ea typeface="Helvetica" charset="0"/>
-                          <a:cs typeface="Helvetica" charset="0"/>
-                        </a:rPr>
-                        <a:t>1/22/16 1:58</a:t>
-                      </a:r>
                     </a:p>
                   </a:txBody>
                   <a:tcPr marL="12700" marR="12700" marT="12700" marB="0" anchor="ctr">
@@ -24910,6 +24699,192 @@
                     </a:solidFill>
                   </a:tcPr>
                 </a:tc>
+                <a:tc>
+                  <a:txBody>
+                    <a:bodyPr/>
+                    <a:lstStyle/>
+                    <a:p>
+                      <a:pPr algn="l" fontAlgn="b"/>
+                      <a:r>
+                        <a:rPr lang="en-US" sz="2000" b="0" i="0" u="none" strike="noStrike" dirty="0">
+                          <a:solidFill>
+                            <a:srgbClr val="000000"/>
+                          </a:solidFill>
+                          <a:effectLst/>
+                          <a:latin typeface="Helvetica" charset="0"/>
+                          <a:ea typeface="Helvetica" charset="0"/>
+                          <a:cs typeface="Helvetica" charset="0"/>
+                        </a:rPr>
+                        <a:t>5/21/15 12:32</a:t>
+                      </a:r>
+                    </a:p>
+                  </a:txBody>
+                  <a:tcPr marL="12700" marR="12700" marT="12700" marB="0" anchor="ctr">
+                    <a:lnL w="12700" cap="flat" cmpd="sng" algn="ctr">
+                      <a:solidFill>
+                        <a:schemeClr val="tx1"/>
+                      </a:solidFill>
+                      <a:prstDash val="solid"/>
+                      <a:round/>
+                      <a:headEnd type="none" w="med" len="med"/>
+                      <a:tailEnd type="none" w="med" len="med"/>
+                    </a:lnL>
+                    <a:lnR w="12700" cap="flat" cmpd="sng" algn="ctr">
+                      <a:solidFill>
+                        <a:schemeClr val="tx1"/>
+                      </a:solidFill>
+                      <a:prstDash val="solid"/>
+                      <a:round/>
+                      <a:headEnd type="none" w="med" len="med"/>
+                      <a:tailEnd type="none" w="med" len="med"/>
+                    </a:lnR>
+                    <a:lnT w="12700" cap="flat" cmpd="sng" algn="ctr">
+                      <a:solidFill>
+                        <a:schemeClr val="tx1"/>
+                      </a:solidFill>
+                      <a:prstDash val="solid"/>
+                      <a:round/>
+                      <a:headEnd type="none" w="med" len="med"/>
+                      <a:tailEnd type="none" w="med" len="med"/>
+                    </a:lnT>
+                    <a:lnB w="12700" cap="flat" cmpd="sng" algn="ctr">
+                      <a:solidFill>
+                        <a:schemeClr val="tx1"/>
+                      </a:solidFill>
+                      <a:prstDash val="solid"/>
+                      <a:round/>
+                      <a:headEnd type="none" w="med" len="med"/>
+                      <a:tailEnd type="none" w="med" len="med"/>
+                    </a:lnB>
+                    <a:solidFill>
+                      <a:srgbClr val="ECF0F1"/>
+                    </a:solidFill>
+                  </a:tcPr>
+                </a:tc>
+                <a:tc>
+                  <a:txBody>
+                    <a:bodyPr/>
+                    <a:lstStyle/>
+                    <a:p>
+                      <a:pPr algn="l" fontAlgn="b"/>
+                      <a:r>
+                        <a:rPr lang="bg-BG" sz="2000" b="0" i="0" u="none" strike="noStrike" dirty="0">
+                          <a:solidFill>
+                            <a:srgbClr val="000000"/>
+                          </a:solidFill>
+                          <a:effectLst/>
+                          <a:latin typeface="Helvetica" charset="0"/>
+                          <a:ea typeface="Helvetica" charset="0"/>
+                          <a:cs typeface="Helvetica" charset="0"/>
+                        </a:rPr>
+                        <a:t>1/22/16 1:58</a:t>
+                      </a:r>
+                    </a:p>
+                  </a:txBody>
+                  <a:tcPr marL="12700" marR="12700" marT="12700" marB="0" anchor="ctr">
+                    <a:lnL w="12700" cap="flat" cmpd="sng" algn="ctr">
+                      <a:solidFill>
+                        <a:schemeClr val="tx1"/>
+                      </a:solidFill>
+                      <a:prstDash val="solid"/>
+                      <a:round/>
+                      <a:headEnd type="none" w="med" len="med"/>
+                      <a:tailEnd type="none" w="med" len="med"/>
+                    </a:lnL>
+                    <a:lnR w="12700" cap="flat" cmpd="sng" algn="ctr">
+                      <a:solidFill>
+                        <a:schemeClr val="tx1"/>
+                      </a:solidFill>
+                      <a:prstDash val="solid"/>
+                      <a:round/>
+                      <a:headEnd type="none" w="med" len="med"/>
+                      <a:tailEnd type="none" w="med" len="med"/>
+                    </a:lnR>
+                    <a:lnT w="12700" cap="flat" cmpd="sng" algn="ctr">
+                      <a:solidFill>
+                        <a:schemeClr val="tx1"/>
+                      </a:solidFill>
+                      <a:prstDash val="solid"/>
+                      <a:round/>
+                      <a:headEnd type="none" w="med" len="med"/>
+                      <a:tailEnd type="none" w="med" len="med"/>
+                    </a:lnT>
+                    <a:lnB w="12700" cap="flat" cmpd="sng" algn="ctr">
+                      <a:solidFill>
+                        <a:schemeClr val="tx1"/>
+                      </a:solidFill>
+                      <a:prstDash val="solid"/>
+                      <a:round/>
+                      <a:headEnd type="none" w="med" len="med"/>
+                      <a:tailEnd type="none" w="med" len="med"/>
+                    </a:lnB>
+                    <a:solidFill>
+                      <a:srgbClr val="ECF0F1"/>
+                    </a:solidFill>
+                  </a:tcPr>
+                </a:tc>
+                <a:tc>
+                  <a:txBody>
+                    <a:bodyPr/>
+                    <a:lstStyle/>
+                    <a:p>
+                      <a:pPr algn="l" fontAlgn="b"/>
+                      <a:r>
+                        <a:rPr lang="en-US" sz="2000" b="0" i="0" u="none" strike="noStrike" dirty="0">
+                          <a:solidFill>
+                            <a:srgbClr val="000000"/>
+                          </a:solidFill>
+                          <a:effectLst/>
+                          <a:latin typeface="Helvetica" charset="0"/>
+                          <a:ea typeface="Helvetica" charset="0"/>
+                          <a:cs typeface="Helvetica" charset="0"/>
+                        </a:rPr>
+                        <a:t>TRUE</a:t>
+                      </a:r>
+                    </a:p>
+                  </a:txBody>
+                  <a:tcPr marL="12700" marR="12700" marT="12700" marB="0" anchor="ctr">
+                    <a:lnL w="12700" cap="flat" cmpd="sng" algn="ctr">
+                      <a:solidFill>
+                        <a:schemeClr val="tx1"/>
+                      </a:solidFill>
+                      <a:prstDash val="solid"/>
+                      <a:round/>
+                      <a:headEnd type="none" w="med" len="med"/>
+                      <a:tailEnd type="none" w="med" len="med"/>
+                    </a:lnL>
+                    <a:lnR w="12700" cap="flat" cmpd="sng" algn="ctr">
+                      <a:solidFill>
+                        <a:schemeClr val="tx1"/>
+                      </a:solidFill>
+                      <a:prstDash val="solid"/>
+                      <a:round/>
+                      <a:headEnd type="none" w="med" len="med"/>
+                      <a:tailEnd type="none" w="med" len="med"/>
+                    </a:lnR>
+                    <a:lnT w="12700" cap="flat" cmpd="sng" algn="ctr">
+                      <a:solidFill>
+                        <a:schemeClr val="tx1"/>
+                      </a:solidFill>
+                      <a:prstDash val="solid"/>
+                      <a:round/>
+                      <a:headEnd type="none" w="med" len="med"/>
+                      <a:tailEnd type="none" w="med" len="med"/>
+                    </a:lnT>
+                    <a:lnB w="12700" cap="flat" cmpd="sng" algn="ctr">
+                      <a:solidFill>
+                        <a:schemeClr val="tx1"/>
+                      </a:solidFill>
+                      <a:prstDash val="solid"/>
+                      <a:round/>
+                      <a:headEnd type="none" w="med" len="med"/>
+                      <a:tailEnd type="none" w="med" len="med"/>
+                    </a:lnB>
+                    <a:solidFill>
+                      <a:srgbClr val="ECF0F1"/>
+                    </a:solidFill>
+                  </a:tcPr>
+                </a:tc>
               </a:tr>
               <a:tr h="257408">
                 <a:tc>
@@ -24919,7 +24894,7 @@
                     <a:p>
                       <a:pPr algn="l" fontAlgn="b"/>
                       <a:r>
-                        <a:rPr lang="is-IS" sz="2000" b="0" i="0" u="none" strike="noStrike" dirty="0">
+                        <a:rPr lang="is-IS" sz="2000" b="0" i="0" u="none" strike="noStrike">
                           <a:solidFill>
                             <a:srgbClr val="000000"/>
                           </a:solidFill>
@@ -25055,7 +25030,7 @@
                         <a:t>a745a8715</a:t>
                       </a:r>
                       <a:r>
-                        <a:rPr lang="is-IS" sz="2000" b="0" i="0" u="none" strike="noStrike" dirty="0" smtClean="0">
+                        <a:rPr lang="is-IS" sz="2000" b="0" i="0" u="none" strike="noStrike" smtClean="0">
                           <a:solidFill>
                             <a:srgbClr val="000000"/>
                           </a:solidFill>
@@ -25126,7 +25101,7 @@
                     <a:p>
                       <a:pPr algn="l" fontAlgn="b"/>
                       <a:r>
-                        <a:rPr lang="en-US" sz="2000" b="0" i="0" u="none" strike="noStrike">
+                        <a:rPr lang="en-US" sz="2000" b="0" i="0" u="none" strike="noStrike" dirty="0">
                           <a:solidFill>
                             <a:srgbClr val="000000"/>
                           </a:solidFill>
@@ -25200,7 +25175,7 @@
                         <a:t>129.10.107</a:t>
                       </a:r>
                       <a:r>
-                        <a:rPr lang="is-IS" sz="2000" b="0" i="0" u="none" strike="noStrike" dirty="0" smtClean="0">
+                        <a:rPr lang="is-IS" sz="2000" b="0" i="0" u="none" strike="noStrike" smtClean="0">
                           <a:solidFill>
                             <a:srgbClr val="000000"/>
                           </a:solidFill>
@@ -25333,7 +25308,7 @@
                     <a:p>
                       <a:pPr algn="l" fontAlgn="b"/>
                       <a:r>
-                        <a:rPr lang="en-US" sz="2000" b="0" i="0" u="none" strike="noStrike">
+                        <a:rPr lang="en-US" sz="2000" b="0" i="0" u="none" strike="noStrike" dirty="0">
                           <a:solidFill>
                             <a:srgbClr val="000000"/>
                           </a:solidFill>
@@ -25395,18 +25370,6 @@
                     <a:p>
                       <a:pPr algn="l" fontAlgn="b"/>
                       <a:r>
-                        <a:rPr lang="it-IT" sz="2000" b="0" i="0" u="none" strike="noStrike" dirty="0" err="1">
-                          <a:solidFill>
-                            <a:srgbClr val="000000"/>
-                          </a:solidFill>
-                          <a:effectLst/>
-                          <a:latin typeface="Helvetica" charset="0"/>
-                          <a:ea typeface="Helvetica" charset="0"/>
-                          <a:cs typeface="Helvetica" charset="0"/>
-                        </a:rPr>
-                        <a:t>Mozilla</a:t>
-                      </a:r>
-                      <a:r>
                         <a:rPr lang="it-IT" sz="2000" b="0" i="0" u="none" strike="noStrike" dirty="0">
                           <a:solidFill>
                             <a:srgbClr val="000000"/>
@@ -25416,7 +25379,7 @@
                           <a:ea typeface="Helvetica" charset="0"/>
                           <a:cs typeface="Helvetica" charset="0"/>
                         </a:rPr>
-                        <a:t>/5.0 (Windows NT </a:t>
+                        <a:t>Mozilla/5.0 (Windows NT </a:t>
                       </a:r>
                       <a:r>
                         <a:rPr lang="it-IT" sz="2000" b="0" i="0" u="none" strike="noStrike" dirty="0" smtClean="0">
@@ -25431,7 +25394,7 @@
                         <a:t>6.1</a:t>
                       </a:r>
                       <a:r>
-                        <a:rPr lang="is-IS" sz="2000" b="0" i="0" u="none" strike="noStrike" dirty="0" smtClean="0">
+                        <a:rPr lang="is-IS" sz="2000" b="0" i="0" u="none" strike="noStrike" smtClean="0">
                           <a:solidFill>
                             <a:srgbClr val="000000"/>
                           </a:solidFill>
@@ -25752,7 +25715,7 @@
                     <a:p>
                       <a:pPr algn="l" fontAlgn="b"/>
                       <a:r>
-                        <a:rPr lang="is-IS" sz="2000" b="0" i="0" u="none" strike="noStrike" dirty="0">
+                        <a:rPr lang="is-IS" sz="2000" b="0" i="0" u="none" strike="noStrike">
                           <a:solidFill>
                             <a:srgbClr val="000000"/>
                           </a:solidFill>
@@ -25888,7 +25851,7 @@
                         <a:t>e5d85e81e</a:t>
                       </a:r>
                       <a:r>
-                        <a:rPr lang="is-IS" sz="2000" b="0" i="0" u="none" strike="noStrike" dirty="0" smtClean="0">
+                        <a:rPr lang="is-IS" sz="2000" b="0" i="0" u="none" strike="noStrike" smtClean="0">
                           <a:solidFill>
                             <a:srgbClr val="000000"/>
                           </a:solidFill>
@@ -26033,7 +25996,7 @@
                         <a:t>129.10.106</a:t>
                       </a:r>
                       <a:r>
-                        <a:rPr lang="is-IS" sz="2000" b="0" i="0" u="none" strike="noStrike" dirty="0" smtClean="0">
+                        <a:rPr lang="is-IS" sz="2000" b="0" i="0" u="none" strike="noStrike" smtClean="0">
                           <a:solidFill>
                             <a:srgbClr val="000000"/>
                           </a:solidFill>
@@ -26128,7 +26091,7 @@
                         <a:t>repository</a:t>
                       </a:r>
                       <a:r>
-                        <a:rPr lang="is-IS" sz="2000" b="0" i="0" u="none" strike="noStrike" dirty="0" smtClean="0">
+                        <a:rPr lang="is-IS" sz="2000" b="0" i="0" u="none" strike="noStrike" smtClean="0">
                           <a:solidFill>
                             <a:srgbClr val="000000"/>
                           </a:solidFill>
@@ -26261,18 +26224,6 @@
                     <a:p>
                       <a:pPr algn="l" fontAlgn="b"/>
                       <a:r>
-                        <a:rPr lang="it-IT" sz="2000" b="0" i="0" u="none" strike="noStrike" dirty="0" err="1">
-                          <a:solidFill>
-                            <a:srgbClr val="000000"/>
-                          </a:solidFill>
-                          <a:effectLst/>
-                          <a:latin typeface="Helvetica" charset="0"/>
-                          <a:ea typeface="Helvetica" charset="0"/>
-                          <a:cs typeface="Helvetica" charset="0"/>
-                        </a:rPr>
-                        <a:t>Mozilla</a:t>
-                      </a:r>
-                      <a:r>
                         <a:rPr lang="it-IT" sz="2000" b="0" i="0" u="none" strike="noStrike" dirty="0">
                           <a:solidFill>
                             <a:srgbClr val="000000"/>
@@ -26282,7 +26233,7 @@
                           <a:ea typeface="Helvetica" charset="0"/>
                           <a:cs typeface="Helvetica" charset="0"/>
                         </a:rPr>
-                        <a:t>/5.0 (Windows NT </a:t>
+                        <a:t>Mozilla/5.0 (Windows NT </a:t>
                       </a:r>
                       <a:r>
                         <a:rPr lang="it-IT" sz="2000" b="0" i="0" u="none" strike="noStrike" dirty="0" smtClean="0">
@@ -26297,7 +26248,7 @@
                         <a:t>6.1</a:t>
                       </a:r>
                       <a:r>
-                        <a:rPr lang="is-IS" sz="2000" b="0" i="0" u="none" strike="noStrike" dirty="0" smtClean="0">
+                        <a:rPr lang="is-IS" sz="2000" b="0" i="0" u="none" strike="noStrike" smtClean="0">
                           <a:solidFill>
                             <a:srgbClr val="000000"/>
                           </a:solidFill>
@@ -26998,7 +26949,7 @@
           <a:lstStyle/>
           <a:p>
             <a:pPr algn="ctr"/>
-            <a:endParaRPr lang="en-US"/>
+            <a:endParaRPr lang="en-US" dirty="0"/>
           </a:p>
         </p:txBody>
       </p:sp>
@@ -27076,7 +27027,7 @@
           <a:lstStyle/>
           <a:p>
             <a:pPr algn="ctr"/>
-            <a:endParaRPr lang="en-US"/>
+            <a:endParaRPr lang="en-US" dirty="0"/>
           </a:p>
         </p:txBody>
       </p:sp>
@@ -27221,7 +27172,7 @@
           <a:lstStyle/>
           <a:p>
             <a:pPr algn="ctr"/>
-            <a:endParaRPr lang="en-US"/>
+            <a:endParaRPr lang="en-US" dirty="0"/>
           </a:p>
         </p:txBody>
       </p:sp>
@@ -27268,7 +27219,7 @@
           <a:lstStyle/>
           <a:p>
             <a:pPr algn="ctr"/>
-            <a:endParaRPr lang="en-US"/>
+            <a:endParaRPr lang="en-US" dirty="0"/>
           </a:p>
         </p:txBody>
       </p:sp>
@@ -27341,14 +27292,21 @@
               <a:t>For more information about the DRS visit </a:t>
             </a:r>
             <a:r>
-              <a:rPr lang="en-US" sz="2300" dirty="0" err="1" smtClean="0">
+              <a:rPr lang="en-US" sz="2300" dirty="0" smtClean="0">
                 <a:solidFill>
                   <a:srgbClr val="2B84D2"/>
                 </a:solidFill>
                 <a:latin typeface="Helvetica"/>
                 <a:cs typeface="Helvetica"/>
               </a:rPr>
-              <a:t>dsg.neu.edu</a:t>
+              <a:t>dsg.neu.edu/resources/drs </a:t>
+            </a:r>
+            <a:r>
+              <a:rPr lang="en-US" sz="2300" dirty="0" smtClean="0">
+                <a:latin typeface="Helvetica"/>
+                <a:cs typeface="Helvetica"/>
+              </a:rPr>
+              <a:t>or  </a:t>
             </a:r>
             <a:r>
               <a:rPr lang="en-US" sz="2300" dirty="0" smtClean="0">
@@ -27358,64 +27316,7 @@
                 <a:latin typeface="Helvetica"/>
                 <a:cs typeface="Helvetica"/>
               </a:rPr>
-              <a:t>/resources/</a:t>
-            </a:r>
-            <a:r>
-              <a:rPr lang="en-US" sz="2300" dirty="0" err="1" smtClean="0">
-                <a:solidFill>
-                  <a:srgbClr val="2B84D2"/>
-                </a:solidFill>
-                <a:latin typeface="Helvetica"/>
-                <a:cs typeface="Helvetica"/>
-              </a:rPr>
-              <a:t>drs</a:t>
-            </a:r>
-            <a:r>
-              <a:rPr lang="en-US" sz="2300" dirty="0" smtClean="0">
-                <a:solidFill>
-                  <a:srgbClr val="2B84D2"/>
-                </a:solidFill>
-                <a:latin typeface="Helvetica"/>
-                <a:cs typeface="Helvetica"/>
-              </a:rPr>
-              <a:t> </a:t>
-            </a:r>
-            <a:r>
-              <a:rPr lang="en-US" sz="2300" dirty="0" smtClean="0">
-                <a:latin typeface="Helvetica"/>
-                <a:cs typeface="Helvetica"/>
-              </a:rPr>
-              <a:t>or  </a:t>
-            </a:r>
-            <a:r>
-              <a:rPr lang="en-US" sz="2300" dirty="0" err="1" smtClean="0">
-                <a:solidFill>
-                  <a:srgbClr val="2B84D2"/>
-                </a:solidFill>
-                <a:latin typeface="Helvetica"/>
-                <a:cs typeface="Helvetica"/>
-              </a:rPr>
-              <a:t>github.com</a:t>
-            </a:r>
-            <a:r>
-              <a:rPr lang="en-US" sz="2300" dirty="0" smtClean="0">
-                <a:solidFill>
-                  <a:srgbClr val="2B84D2"/>
-                </a:solidFill>
-                <a:latin typeface="Helvetica"/>
-                <a:cs typeface="Helvetica"/>
-              </a:rPr>
-              <a:t>/NEU-Libraries/</a:t>
-            </a:r>
-            <a:r>
-              <a:rPr lang="en-US" sz="2300" dirty="0" err="1" smtClean="0">
-                <a:solidFill>
-                  <a:srgbClr val="2B84D2"/>
-                </a:solidFill>
-                <a:latin typeface="Helvetica"/>
-                <a:cs typeface="Helvetica"/>
-              </a:rPr>
-              <a:t>cerberus</a:t>
+              <a:t>github.com/NEU-Libraries/cerberus</a:t>
             </a:r>
             <a:endParaRPr lang="en-US" sz="2300" dirty="0">
               <a:solidFill>
@@ -27711,39 +27612,7 @@
                 <a:ea typeface="Helvetica" charset="0"/>
                 <a:cs typeface="Helvetica" charset="0"/>
               </a:rPr>
-              <a:t>archive*, *bot*, *crawl*, *curl*, *java*, *lynx*, *</a:t>
-            </a:r>
-            <a:r>
-              <a:rPr lang="en-US" sz="2300" dirty="0" err="1">
-                <a:latin typeface="Helvetica" charset="0"/>
-                <a:ea typeface="Helvetica" charset="0"/>
-                <a:cs typeface="Helvetica" charset="0"/>
-              </a:rPr>
-              <a:t>nutch</a:t>
-            </a:r>
-            <a:r>
-              <a:rPr lang="en-US" sz="2300" dirty="0">
-                <a:latin typeface="Helvetica" charset="0"/>
-                <a:ea typeface="Helvetica" charset="0"/>
-                <a:cs typeface="Helvetica" charset="0"/>
-              </a:rPr>
-              <a:t>*, *scrape*, *</a:t>
-            </a:r>
-            <a:r>
-              <a:rPr lang="en-US" sz="2300" dirty="0" err="1">
-                <a:latin typeface="Helvetica" charset="0"/>
-                <a:ea typeface="Helvetica" charset="0"/>
-                <a:cs typeface="Helvetica" charset="0"/>
-              </a:rPr>
-              <a:t>scrapy</a:t>
-            </a:r>
-            <a:r>
-              <a:rPr lang="en-US" sz="2300" dirty="0">
-                <a:latin typeface="Helvetica" charset="0"/>
-                <a:ea typeface="Helvetica" charset="0"/>
-                <a:cs typeface="Helvetica" charset="0"/>
-              </a:rPr>
-              <a:t>*, *slurp*, and *spider*</a:t>
+              <a:t>archive*, *bot*, *crawl*, *curl*, *java*, *lynx*, *nutch*, *scrape*, *scrapy*, *slurp*, and *spider*</a:t>
             </a:r>
           </a:p>
         </p:txBody>
@@ -27995,7 +27864,7 @@
           <a:lstStyle/>
           <a:p>
             <a:pPr algn="ctr"/>
-            <a:endParaRPr lang="en-US"/>
+            <a:endParaRPr lang="en-US" dirty="0"/>
           </a:p>
         </p:txBody>
       </p:sp>
@@ -28073,7 +27942,7 @@
           <a:lstStyle/>
           <a:p>
             <a:pPr algn="ctr"/>
-            <a:endParaRPr lang="en-US"/>
+            <a:endParaRPr lang="en-US" dirty="0"/>
           </a:p>
         </p:txBody>
       </p:sp>
@@ -28180,7 +28049,7 @@
           <a:lstStyle/>
           <a:p>
             <a:pPr algn="ctr"/>
-            <a:endParaRPr lang="en-US"/>
+            <a:endParaRPr lang="en-US" dirty="0"/>
           </a:p>
         </p:txBody>
       </p:sp>
@@ -28258,7 +28127,7 @@
           <a:lstStyle/>
           <a:p>
             <a:pPr algn="ctr"/>
-            <a:endParaRPr lang="en-US"/>
+            <a:endParaRPr lang="en-US" dirty="0"/>
           </a:p>
         </p:txBody>
       </p:sp>
@@ -28336,7 +28205,7 @@
           <a:lstStyle/>
           <a:p>
             <a:pPr algn="ctr"/>
-            <a:endParaRPr lang="en-US"/>
+            <a:endParaRPr lang="en-US" dirty="0"/>
           </a:p>
         </p:txBody>
       </p:sp>
@@ -28414,7 +28283,7 @@
           <a:lstStyle/>
           <a:p>
             <a:pPr algn="ctr"/>
-            <a:endParaRPr lang="en-US"/>
+            <a:endParaRPr lang="en-US" dirty="0"/>
           </a:p>
         </p:txBody>
       </p:sp>
@@ -28492,7 +28361,7 @@
           <a:lstStyle/>
           <a:p>
             <a:pPr algn="ctr"/>
-            <a:endParaRPr lang="en-US"/>
+            <a:endParaRPr lang="en-US" dirty="0"/>
           </a:p>
         </p:txBody>
       </p:sp>
@@ -28570,7 +28439,7 @@
           <a:lstStyle/>
           <a:p>
             <a:pPr algn="ctr"/>
-            <a:endParaRPr lang="en-US"/>
+            <a:endParaRPr lang="en-US" dirty="0"/>
           </a:p>
         </p:txBody>
       </p:sp>
@@ -28648,7 +28517,7 @@
           <a:lstStyle/>
           <a:p>
             <a:pPr algn="ctr"/>
-            <a:endParaRPr lang="en-US"/>
+            <a:endParaRPr lang="en-US" dirty="0"/>
           </a:p>
         </p:txBody>
       </p:sp>
@@ -28726,7 +28595,7 @@
           <a:lstStyle/>
           <a:p>
             <a:pPr algn="ctr"/>
-            <a:endParaRPr lang="en-US"/>
+            <a:endParaRPr lang="en-US" dirty="0"/>
           </a:p>
         </p:txBody>
       </p:sp>
@@ -28804,7 +28673,7 @@
           <a:lstStyle/>
           <a:p>
             <a:pPr algn="ctr"/>
-            <a:endParaRPr lang="en-US"/>
+            <a:endParaRPr lang="en-US" dirty="0"/>
           </a:p>
         </p:txBody>
       </p:sp>
@@ -28882,7 +28751,7 @@
           <a:lstStyle/>
           <a:p>
             <a:pPr algn="ctr"/>
-            <a:endParaRPr lang="en-US"/>
+            <a:endParaRPr lang="en-US" dirty="0"/>
           </a:p>
         </p:txBody>
       </p:sp>
@@ -28960,7 +28829,7 @@
           <a:lstStyle/>
           <a:p>
             <a:pPr algn="ctr"/>
-            <a:endParaRPr lang="en-US"/>
+            <a:endParaRPr lang="en-US" dirty="0"/>
           </a:p>
         </p:txBody>
       </p:sp>
@@ -29038,7 +28907,7 @@
           <a:lstStyle/>
           <a:p>
             <a:pPr algn="ctr"/>
-            <a:endParaRPr lang="en-US"/>
+            <a:endParaRPr lang="en-US" dirty="0"/>
           </a:p>
         </p:txBody>
       </p:sp>
@@ -29116,7 +28985,7 @@
           <a:lstStyle/>
           <a:p>
             <a:pPr algn="ctr"/>
-            <a:endParaRPr lang="en-US"/>
+            <a:endParaRPr lang="en-US" dirty="0"/>
           </a:p>
         </p:txBody>
       </p:sp>
@@ -29163,7 +29032,7 @@
           <a:lstStyle/>
           <a:p>
             <a:pPr algn="ctr"/>
-            <a:endParaRPr lang="en-US"/>
+            <a:endParaRPr lang="en-US" dirty="0"/>
           </a:p>
         </p:txBody>
       </p:sp>
@@ -29210,7 +29079,7 @@
           <a:lstStyle/>
           <a:p>
             <a:pPr algn="ctr"/>
-            <a:endParaRPr lang="en-US"/>
+            <a:endParaRPr lang="en-US" dirty="0"/>
           </a:p>
         </p:txBody>
       </p:sp>
@@ -29257,7 +29126,7 @@
           <a:lstStyle/>
           <a:p>
             <a:pPr algn="ctr"/>
-            <a:endParaRPr lang="en-US"/>
+            <a:endParaRPr lang="en-US" dirty="0"/>
           </a:p>
         </p:txBody>
       </p:sp>
@@ -29390,7 +29259,7 @@
           <a:p>
             <a:pPr algn="ctr"/>
             <a:r>
-              <a:rPr lang="en-US" sz="3600" dirty="0" err="1" smtClean="0">
+              <a:rPr lang="en-US" sz="3600" dirty="0" smtClean="0">
                 <a:solidFill>
                   <a:srgbClr val="3498DB"/>
                 </a:solidFill>
@@ -29563,7 +29432,7 @@
           <a:lstStyle/>
           <a:p>
             <a:pPr algn="ctr"/>
-            <a:endParaRPr lang="en-US"/>
+            <a:endParaRPr lang="en-US" dirty="0"/>
           </a:p>
         </p:txBody>
       </p:sp>
@@ -29641,7 +29510,7 @@
           <a:lstStyle/>
           <a:p>
             <a:pPr algn="ctr"/>
-            <a:endParaRPr lang="en-US"/>
+            <a:endParaRPr lang="en-US" dirty="0"/>
           </a:p>
         </p:txBody>
       </p:sp>
@@ -29719,7 +29588,7 @@
           <a:lstStyle/>
           <a:p>
             <a:pPr algn="ctr"/>
-            <a:endParaRPr lang="en-US"/>
+            <a:endParaRPr lang="en-US" dirty="0"/>
           </a:p>
         </p:txBody>
       </p:sp>
@@ -29869,7 +29738,7 @@
               <a:t>Sarah Sweeney, </a:t>
             </a:r>
             <a:r>
-              <a:rPr lang="en-US" sz="5400" dirty="0" err="1">
+              <a:rPr lang="en-US" sz="5400" dirty="0">
                 <a:solidFill>
                   <a:srgbClr val="2C3E50"/>
                 </a:solidFill>
@@ -29879,14 +29748,6 @@
               </a:rPr>
               <a:t>sj.sweeney@neu.edu</a:t>
             </a:r>
-            <a:endParaRPr lang="en-US" sz="5400" dirty="0">
-              <a:solidFill>
-                <a:srgbClr val="2C3E50"/>
-              </a:solidFill>
-              <a:latin typeface="Gotham Book" charset="0"/>
-              <a:ea typeface="Gotham Book" charset="0"/>
-              <a:cs typeface="Gotham Book" charset="0"/>
-            </a:endParaRPr>
           </a:p>
         </p:txBody>
       </p:sp>
@@ -30003,7 +29864,7 @@
               </a:lnSpc>
             </a:pPr>
             <a:r>
-              <a:rPr lang="en-US" sz="2300" dirty="0" err="1" smtClean="0">
+              <a:rPr lang="en-US" sz="2300" dirty="0" smtClean="0">
                 <a:solidFill>
                   <a:srgbClr val="2B84D2"/>
                 </a:solidFill>
@@ -30023,16 +29884,6 @@
               <a:t>/resources/</a:t>
             </a:r>
             <a:r>
-              <a:rPr lang="en-US" sz="2300" dirty="0" err="1" smtClean="0">
-                <a:solidFill>
-                  <a:srgbClr val="2B84D2"/>
-                </a:solidFill>
-                <a:latin typeface="Helvetica"/>
-                <a:cs typeface="Helvetica"/>
-              </a:rPr>
-              <a:t>drs</a:t>
-            </a:r>
-            <a:r>
               <a:rPr lang="en-US" sz="2300" dirty="0" smtClean="0">
                 <a:solidFill>
                   <a:srgbClr val="2B84D2"/>
@@ -30040,7 +29891,7 @@
                 <a:latin typeface="Helvetica"/>
                 <a:cs typeface="Helvetica"/>
               </a:rPr>
-              <a:t> </a:t>
+              <a:t>drs </a:t>
             </a:r>
             <a:r>
               <a:rPr lang="en-US" sz="2300" dirty="0" smtClean="0">
@@ -30057,7 +29908,7 @@
               </a:lnSpc>
             </a:pPr>
             <a:r>
-              <a:rPr lang="en-US" sz="2300" dirty="0" err="1" smtClean="0">
+              <a:rPr lang="en-US" sz="2300" dirty="0" smtClean="0">
                 <a:solidFill>
                   <a:srgbClr val="2B84D2"/>
                 </a:solidFill>
@@ -30074,25 +29925,8 @@
                 <a:latin typeface="Helvetica"/>
                 <a:cs typeface="Helvetica"/>
               </a:rPr>
-              <a:t>/NEU-Libraries/</a:t>
+              <a:t>/NEU-Libraries/cerberus</a:t>
             </a:r>
-            <a:r>
-              <a:rPr lang="en-US" sz="2300" dirty="0" err="1">
-                <a:solidFill>
-                  <a:srgbClr val="2B84D2"/>
-                </a:solidFill>
-                <a:latin typeface="Helvetica"/>
-                <a:cs typeface="Helvetica"/>
-              </a:rPr>
-              <a:t>cerberus</a:t>
-            </a:r>
-            <a:endParaRPr lang="en-US" sz="2300" dirty="0">
-              <a:solidFill>
-                <a:srgbClr val="2B84D2"/>
-              </a:solidFill>
-              <a:latin typeface="Helvetica"/>
-              <a:cs typeface="Helvetica"/>
-            </a:endParaRPr>
           </a:p>
         </p:txBody>
       </p:sp>
@@ -30344,7 +30178,7 @@
           <a:lstStyle/>
           <a:p>
             <a:pPr algn="ctr"/>
-            <a:endParaRPr lang="en-US"/>
+            <a:endParaRPr lang="en-US" dirty="0"/>
           </a:p>
         </p:txBody>
       </p:sp>
@@ -30392,7 +30226,7 @@
           <a:lstStyle/>
           <a:p>
             <a:pPr algn="ctr"/>
-            <a:endParaRPr lang="en-US"/>
+            <a:endParaRPr lang="en-US" dirty="0"/>
           </a:p>
         </p:txBody>
       </p:sp>
@@ -30440,7 +30274,7 @@
           <a:lstStyle/>
           <a:p>
             <a:pPr algn="ctr"/>
-            <a:endParaRPr lang="en-US"/>
+            <a:endParaRPr lang="en-US" dirty="0"/>
           </a:p>
         </p:txBody>
       </p:sp>
@@ -30488,7 +30322,7 @@
           <a:lstStyle/>
           <a:p>
             <a:pPr algn="ctr"/>
-            <a:endParaRPr lang="en-US"/>
+            <a:endParaRPr lang="en-US" dirty="0"/>
           </a:p>
         </p:txBody>
       </p:sp>
@@ -30795,7 +30629,7 @@
           <a:lstStyle/>
           <a:p>
             <a:pPr algn="ctr"/>
-            <a:endParaRPr lang="en-US">
+            <a:endParaRPr lang="en-US" dirty="0">
               <a:latin typeface="Helvetica"/>
               <a:cs typeface="Helvetica"/>
             </a:endParaRPr>
@@ -30843,7 +30677,7 @@
           <a:lstStyle/>
           <a:p>
             <a:pPr algn="ctr"/>
-            <a:endParaRPr lang="en-US">
+            <a:endParaRPr lang="en-US" dirty="0">
               <a:latin typeface="Helvetica"/>
               <a:cs typeface="Helvetica"/>
             </a:endParaRPr>
@@ -30891,7 +30725,7 @@
           <a:lstStyle/>
           <a:p>
             <a:pPr algn="ctr"/>
-            <a:endParaRPr lang="en-US">
+            <a:endParaRPr lang="en-US" dirty="0">
               <a:latin typeface="Helvetica"/>
               <a:cs typeface="Helvetica"/>
             </a:endParaRPr>
@@ -30939,7 +30773,7 @@
           <a:lstStyle/>
           <a:p>
             <a:pPr algn="ctr"/>
-            <a:endParaRPr lang="en-US">
+            <a:endParaRPr lang="en-US" dirty="0">
               <a:latin typeface="Helvetica"/>
               <a:cs typeface="Helvetica"/>
             </a:endParaRPr>

</xml_diff>